<commit_message>
Synced non localizable files from repo .
</commit_message>
<xml_diff>
--- a/help/data-sheets/assets/BusinessSupportDatasheet.pptx
+++ b/help/data-sheets/assets/BusinessSupportDatasheet.pptx
@@ -144,7 +144,9 @@
 <p1510:revInfo xmlns:a="http://schemas.openxmlformats.org/drawingml/2006/main" xmlns:r="http://schemas.openxmlformats.org/officeDocument/2006/relationships" xmlns:p1510="http://schemas.microsoft.com/office/powerpoint/2015/10/main">
   <p1510:revLst>
     <p1510:client id="{06B13378-B080-7F0F-51A5-F9203CEE57ED}" v="370" dt="2021-08-25T22:26:24.850"/>
+    <p1510:client id="{71D6CFBF-0EA2-99B0-93F4-22F19EF0AE4E}" v="2" dt="2021-09-22T19:06:58.732"/>
     <p1510:client id="{9E385600-BF81-FC49-9ED0-E33BC37F7908}" v="55" dt="2021-08-04T08:16:13.478"/>
+    <p1510:client id="{AFB92C2B-405E-C597-0988-18F97C53104C}" v="37" dt="2021-09-22T18:53:28.028"/>
     <p1510:client id="{CA5D33DF-AE75-BCA1-B9BC-A7CD44D2F3C7}" v="2" dt="2021-08-25T22:38:18.624"/>
   </p1510:revLst>
 </p1510:revInfo>
@@ -152,6 +154,30 @@
 
 <file path=ppt/changesInfos/changesInfo1.xml><?xml version="1.0" encoding="utf-8"?>
 <pc:chgInfo xmlns:a="http://schemas.openxmlformats.org/drawingml/2006/main" xmlns:r="http://schemas.openxmlformats.org/officeDocument/2006/relationships" xmlns:ac="http://schemas.microsoft.com/office/drawing/2013/main/command" xmlns:pc="http://schemas.microsoft.com/office/powerpoint/2013/main/command">
+  <pc:docChgLst>
+    <pc:chgData name="Akilah Johnson" userId="S::akjohnso@adobe.com::2fa3aa60-0c9c-4d06-bae2-795983241227" providerId="AD" clId="Web-{71D6CFBF-0EA2-99B0-93F4-22F19EF0AE4E}"/>
+    <pc:docChg chg="modSld">
+      <pc:chgData name="Akilah Johnson" userId="S::akjohnso@adobe.com::2fa3aa60-0c9c-4d06-bae2-795983241227" providerId="AD" clId="Web-{71D6CFBF-0EA2-99B0-93F4-22F19EF0AE4E}" dt="2021-09-22T19:06:58.732" v="1" actId="1076"/>
+      <pc:docMkLst>
+        <pc:docMk/>
+      </pc:docMkLst>
+      <pc:sldChg chg="modSp">
+        <pc:chgData name="Akilah Johnson" userId="S::akjohnso@adobe.com::2fa3aa60-0c9c-4d06-bae2-795983241227" providerId="AD" clId="Web-{71D6CFBF-0EA2-99B0-93F4-22F19EF0AE4E}" dt="2021-09-22T19:06:58.732" v="1" actId="1076"/>
+        <pc:sldMkLst>
+          <pc:docMk/>
+          <pc:sldMk cId="1050037809" sldId="261"/>
+        </pc:sldMkLst>
+        <pc:spChg chg="mod">
+          <ac:chgData name="Akilah Johnson" userId="S::akjohnso@adobe.com::2fa3aa60-0c9c-4d06-bae2-795983241227" providerId="AD" clId="Web-{71D6CFBF-0EA2-99B0-93F4-22F19EF0AE4E}" dt="2021-09-22T19:06:58.732" v="1" actId="1076"/>
+          <ac:spMkLst>
+            <pc:docMk/>
+            <pc:sldMk cId="1050037809" sldId="261"/>
+            <ac:spMk id="64" creationId="{41467BDC-3D83-D844-B922-CD07E94E5AAB}"/>
+          </ac:spMkLst>
+        </pc:spChg>
+      </pc:sldChg>
+    </pc:docChg>
+  </pc:docChgLst>
   <pc:docChgLst>
     <pc:chgData name="Andy Witt" userId="S::awitt@adobe.com::e9157bdf-53b2-40e4-9459-936793d75696" providerId="AD" clId="Web-{06B13378-B080-7F0F-51A5-F9203CEE57ED}"/>
     <pc:docChg chg="modSld">
@@ -167,6 +193,38 @@
         </pc:sldMkLst>
         <pc:graphicFrameChg chg="mod modGraphic">
           <ac:chgData name="Andy Witt" userId="S::awitt@adobe.com::e9157bdf-53b2-40e4-9459-936793d75696" providerId="AD" clId="Web-{06B13378-B080-7F0F-51A5-F9203CEE57ED}" dt="2021-08-25T22:25:13.647" v="363"/>
+          <ac:graphicFrameMkLst>
+            <pc:docMk/>
+            <pc:sldMk cId="1050037809" sldId="261"/>
+            <ac:graphicFrameMk id="25" creationId="{3A91F5B0-3974-A14D-A146-FB590F2AAD18}"/>
+          </ac:graphicFrameMkLst>
+        </pc:graphicFrameChg>
+      </pc:sldChg>
+    </pc:docChg>
+  </pc:docChgLst>
+  <pc:docChgLst>
+    <pc:chgData name="Akilah Johnson" userId="S::akjohnso@adobe.com::2fa3aa60-0c9c-4d06-bae2-795983241227" providerId="AD" clId="Web-{AFB92C2B-405E-C597-0988-18F97C53104C}"/>
+    <pc:docChg chg="modSld">
+      <pc:chgData name="Akilah Johnson" userId="S::akjohnso@adobe.com::2fa3aa60-0c9c-4d06-bae2-795983241227" providerId="AD" clId="Web-{AFB92C2B-405E-C597-0988-18F97C53104C}" dt="2021-09-22T18:53:26.184" v="29"/>
+      <pc:docMkLst>
+        <pc:docMk/>
+      </pc:docMkLst>
+      <pc:sldChg chg="modSp">
+        <pc:chgData name="Akilah Johnson" userId="S::akjohnso@adobe.com::2fa3aa60-0c9c-4d06-bae2-795983241227" providerId="AD" clId="Web-{AFB92C2B-405E-C597-0988-18F97C53104C}" dt="2021-09-22T18:53:26.184" v="29"/>
+        <pc:sldMkLst>
+          <pc:docMk/>
+          <pc:sldMk cId="1050037809" sldId="261"/>
+        </pc:sldMkLst>
+        <pc:spChg chg="mod">
+          <ac:chgData name="Akilah Johnson" userId="S::akjohnso@adobe.com::2fa3aa60-0c9c-4d06-bae2-795983241227" providerId="AD" clId="Web-{AFB92C2B-405E-C597-0988-18F97C53104C}" dt="2021-09-22T18:53:05.841" v="5" actId="20577"/>
+          <ac:spMkLst>
+            <pc:docMk/>
+            <pc:sldMk cId="1050037809" sldId="261"/>
+            <ac:spMk id="64" creationId="{41467BDC-3D83-D844-B922-CD07E94E5AAB}"/>
+          </ac:spMkLst>
+        </pc:spChg>
+        <pc:graphicFrameChg chg="mod modGraphic">
+          <ac:chgData name="Akilah Johnson" userId="S::akjohnso@adobe.com::2fa3aa60-0c9c-4d06-bae2-795983241227" providerId="AD" clId="Web-{AFB92C2B-405E-C597-0988-18F97C53104C}" dt="2021-09-22T18:53:26.184" v="29"/>
           <ac:graphicFrameMkLst>
             <pc:docMk/>
             <pc:sldMk cId="1050037809" sldId="261"/>
@@ -285,7 +343,7 @@
           <a:p>
             <a:fld id="{FB81873C-0B24-F04A-98A1-90E0A78F7E8A}" type="datetimeFigureOut">
               <a:rPr lang="en-US" smtClean="0"/>
-              <a:t>8/27/2021</a:t>
+              <a:t>9/22/2021</a:t>
             </a:fld>
             <a:endParaRPr lang="en-US"/>
           </a:p>
@@ -596,7 +654,7 @@
           <a:bodyPr/>
           <a:lstStyle/>
           <a:p>
-            <a:endParaRPr lang="en-US" dirty="0"/>
+            <a:endParaRPr lang="en-US"/>
           </a:p>
         </p:txBody>
       </p:sp>
@@ -680,7 +738,7 @@
           <a:bodyPr/>
           <a:lstStyle/>
           <a:p>
-            <a:endParaRPr lang="en-US" dirty="0"/>
+            <a:endParaRPr lang="en-US"/>
           </a:p>
         </p:txBody>
       </p:sp>
@@ -764,7 +822,7 @@
           <a:bodyPr/>
           <a:lstStyle/>
           <a:p>
-            <a:endParaRPr lang="en-US" dirty="0"/>
+            <a:endParaRPr lang="en-US"/>
           </a:p>
         </p:txBody>
       </p:sp>
@@ -908,7 +966,7 @@
           <a:p>
             <a:fld id="{1D8BD707-D9CF-40AE-B4C6-C98DA3205C09}" type="datetimeFigureOut">
               <a:rPr lang="en-US"/>
-              <a:t>8/27/2021</a:t>
+              <a:t>9/22/2021</a:t>
             </a:fld>
             <a:endParaRPr lang="en-US"/>
           </a:p>
@@ -996,23 +1054,23 @@
               </a:spcBef>
             </a:pPr>
             <a:r>
-              <a:rPr spc="-5" dirty="0"/>
+              <a:rPr spc="-5"/>
               <a:t>©202</a:t>
             </a:r>
             <a:r>
-              <a:rPr lang="en-US" spc="-5" dirty="0"/>
+              <a:rPr lang="en-US" spc="-5"/>
               <a:t>1 </a:t>
             </a:r>
             <a:r>
-              <a:rPr spc="-5" dirty="0"/>
+              <a:rPr spc="-5"/>
               <a:t>Adobe. All Rights Reserved. Adobe</a:t>
             </a:r>
             <a:r>
-              <a:rPr spc="60" dirty="0"/>
+              <a:rPr spc="60"/>
               <a:t> </a:t>
             </a:r>
             <a:r>
-              <a:rPr spc="-5" dirty="0"/>
+              <a:rPr spc="-5"/>
               <a:t>Confidential.</a:t>
             </a:r>
           </a:p>
@@ -1100,7 +1158,7 @@
           <a:p>
             <a:fld id="{1D8BD707-D9CF-40AE-B4C6-C98DA3205C09}" type="datetimeFigureOut">
               <a:rPr lang="en-US"/>
-              <a:t>8/27/2021</a:t>
+              <a:t>9/22/2021</a:t>
             </a:fld>
             <a:endParaRPr lang="en-US"/>
           </a:p>
@@ -1188,23 +1246,23 @@
               </a:spcBef>
             </a:pPr>
             <a:r>
-              <a:rPr spc="-5" dirty="0"/>
+              <a:rPr spc="-5"/>
               <a:t>©202</a:t>
             </a:r>
             <a:r>
-              <a:rPr lang="en-US" spc="-5" dirty="0"/>
+              <a:rPr lang="en-US" spc="-5"/>
               <a:t>1</a:t>
             </a:r>
             <a:r>
-              <a:rPr spc="-5" dirty="0"/>
+              <a:rPr spc="-5"/>
               <a:t> Adobe. All Rights Reserved. Adobe</a:t>
             </a:r>
             <a:r>
-              <a:rPr spc="60" dirty="0"/>
+              <a:rPr spc="60"/>
               <a:t> </a:t>
             </a:r>
             <a:r>
-              <a:rPr spc="-5" dirty="0"/>
+              <a:rPr spc="-5"/>
               <a:t>Confidential.</a:t>
             </a:r>
           </a:p>
@@ -1359,23 +1417,23 @@
               </a:spcBef>
             </a:pPr>
             <a:r>
-              <a:rPr spc="-5" dirty="0"/>
+              <a:rPr spc="-5"/>
               <a:t>©202</a:t>
             </a:r>
             <a:r>
-              <a:rPr lang="en-US" spc="-5" dirty="0"/>
+              <a:rPr lang="en-US" spc="-5"/>
               <a:t>1</a:t>
             </a:r>
             <a:r>
-              <a:rPr spc="-5" dirty="0"/>
+              <a:rPr spc="-5"/>
               <a:t> Adobe. All Rights Reserved. Adobe</a:t>
             </a:r>
             <a:r>
-              <a:rPr spc="60" dirty="0"/>
+              <a:rPr spc="60"/>
               <a:t> </a:t>
             </a:r>
             <a:r>
-              <a:rPr spc="-5" dirty="0"/>
+              <a:rPr spc="-5"/>
               <a:t>Confidential.</a:t>
             </a:r>
           </a:p>
@@ -1418,7 +1476,7 @@
           <a:p>
             <a:fld id="{1D8BD707-D9CF-40AE-B4C6-C98DA3205C09}" type="datetimeFigureOut">
               <a:rPr lang="en-US"/>
-              <a:t>8/27/2021</a:t>
+              <a:t>9/22/2021</a:t>
             </a:fld>
             <a:endParaRPr lang="en-US"/>
           </a:p>
@@ -1694,7 +1752,7 @@
               </a:spcBef>
             </a:pPr>
             <a:r>
-              <a:rPr sz="1400" b="1" u="heavy" spc="10" dirty="0">
+              <a:rPr sz="1400" b="1" u="heavy" spc="10">
                 <a:solidFill>
                   <a:srgbClr val="020302"/>
                 </a:solidFill>
@@ -1709,7 +1767,7 @@
               <a:t>Service </a:t>
             </a:r>
             <a:r>
-              <a:rPr sz="1400" b="1" u="heavy" spc="-10" dirty="0">
+              <a:rPr sz="1400" b="1" u="heavy" spc="-10">
                 <a:solidFill>
                   <a:srgbClr val="020302"/>
                 </a:solidFill>
@@ -1724,7 +1782,7 @@
               <a:t>Level </a:t>
             </a:r>
             <a:r>
-              <a:rPr sz="1400" b="1" u="heavy" spc="-45" dirty="0">
+              <a:rPr sz="1400" b="1" u="heavy" spc="-45">
                 <a:solidFill>
                   <a:srgbClr val="020302"/>
                 </a:solidFill>
@@ -1739,7 +1797,7 @@
               <a:t>Targets: </a:t>
             </a:r>
             <a:r>
-              <a:rPr sz="1400" b="1" u="heavy" spc="-10" dirty="0">
+              <a:rPr sz="1400" b="1" u="heavy" spc="-10">
                 <a:solidFill>
                   <a:srgbClr val="020302"/>
                 </a:solidFill>
@@ -1754,7 +1812,7 @@
               <a:t>Initial</a:t>
             </a:r>
             <a:r>
-              <a:rPr sz="1400" b="1" u="heavy" spc="-140" dirty="0">
+              <a:rPr sz="1400" b="1" u="heavy" spc="-140">
                 <a:solidFill>
                   <a:srgbClr val="020302"/>
                 </a:solidFill>
@@ -1769,7 +1827,7 @@
               <a:t> </a:t>
             </a:r>
             <a:r>
-              <a:rPr sz="1400" b="1" u="heavy" spc="-15" dirty="0">
+              <a:rPr sz="1400" b="1" u="heavy" spc="-15">
                 <a:solidFill>
                   <a:srgbClr val="020302"/>
                 </a:solidFill>
@@ -1853,18 +1911,18 @@
               </a:spcBef>
             </a:pPr>
             <a:r>
-              <a:rPr sz="2300" dirty="0">
+              <a:rPr sz="2300">
                 <a:latin typeface="Adobe Clean" panose="020B0503020404020204" pitchFamily="34" charset="0"/>
               </a:rPr>
               <a:t>ADOBE </a:t>
             </a:r>
             <a:r>
-              <a:rPr lang="en-US" sz="2300" dirty="0">
+              <a:rPr lang="en-US" sz="2300">
                 <a:latin typeface="Adobe Clean" panose="020B0503020404020204" pitchFamily="34" charset="0"/>
               </a:rPr>
               <a:t>SUPPORT OFFERINGS</a:t>
             </a:r>
-            <a:endParaRPr sz="2300" dirty="0">
+            <a:endParaRPr sz="2300">
               <a:latin typeface="Adobe Clean" panose="020B0503020404020204" pitchFamily="34" charset="0"/>
             </a:endParaRPr>
           </a:p>
@@ -1900,7 +1958,7 @@
               </a:spcBef>
             </a:pPr>
             <a:r>
-              <a:rPr lang="en-US" sz="900" dirty="0">
+              <a:rPr lang="en-US" sz="900">
                 <a:solidFill>
                   <a:schemeClr val="bg1"/>
                 </a:solidFill>
@@ -1909,7 +1967,7 @@
               <a:t>Online | </a:t>
             </a:r>
             <a:r>
-              <a:rPr lang="en-US" sz="900" b="1" dirty="0">
+              <a:rPr lang="en-US" sz="900" b="1">
                 <a:solidFill>
                   <a:schemeClr val="bg1"/>
                 </a:solidFill>
@@ -1918,7 +1976,7 @@
               <a:t>Business</a:t>
             </a:r>
             <a:r>
-              <a:rPr lang="en-US" sz="900" dirty="0">
+              <a:rPr lang="en-US" sz="900">
                 <a:solidFill>
                   <a:schemeClr val="bg1"/>
                 </a:solidFill>
@@ -1937,7 +1995,7 @@
               </a:spcBef>
             </a:pPr>
             <a:r>
-              <a:rPr lang="en-US" sz="900" dirty="0">
+              <a:rPr lang="en-US" sz="900">
                 <a:solidFill>
                   <a:schemeClr val="bg1"/>
                 </a:solidFill>
@@ -1945,7 +2003,7 @@
               </a:rPr>
               <a:t>Adobe provides a comprehensive range of technical resources to help support your business, included as part of your Experience Cloud license subscription and enhanced in the BUSINESS support package. BUSINESS support includes access to personalized learning paths and monitored community forums via the Adobe Experience League. You can also take advantage of our detailed and in-depth technical product documentation and current release notes. BUSINESS customers also benefit from access to our technical support teams for any product query via either the telephone or the support web portal, to help protect your business at the most critical times. BUSINESS customers will receive regular communications and updates from their Account Support Lead in addition to support case escalation management for your most critical of support requests. </a:t>
             </a:r>
-            <a:endParaRPr lang="en-US" sz="900" dirty="0">
+            <a:endParaRPr lang="en-US" sz="900">
               <a:solidFill>
                 <a:schemeClr val="bg1"/>
               </a:solidFill>
@@ -2018,23 +2076,23 @@
               </a:spcBef>
             </a:pPr>
             <a:r>
-              <a:rPr spc="-5" dirty="0"/>
+              <a:rPr spc="-5"/>
               <a:t>©202</a:t>
             </a:r>
             <a:r>
-              <a:rPr lang="en-US" spc="-5" dirty="0"/>
+              <a:rPr lang="en-US" spc="-5"/>
               <a:t>1</a:t>
             </a:r>
             <a:r>
-              <a:rPr spc="-5" dirty="0"/>
+              <a:rPr spc="-5"/>
               <a:t> Adobe. All Rights Reserved. Adobe</a:t>
             </a:r>
             <a:r>
-              <a:rPr spc="60" dirty="0"/>
+              <a:rPr spc="60"/>
               <a:t> </a:t>
             </a:r>
             <a:r>
-              <a:rPr spc="-5" dirty="0"/>
+              <a:rPr spc="-5"/>
               <a:t>Confidential.</a:t>
             </a:r>
           </a:p>
@@ -2102,7 +2160,7 @@
                         </a:spcBef>
                       </a:pPr>
                       <a:r>
-                        <a:rPr sz="900" spc="0" dirty="0">
+                        <a:rPr sz="900" spc="0">
                           <a:solidFill>
                             <a:srgbClr val="020302"/>
                           </a:solidFill>
@@ -2111,7 +2169,7 @@
                         </a:rPr>
                         <a:t>Priority</a:t>
                       </a:r>
-                      <a:endParaRPr sz="900" spc="0" dirty="0">
+                      <a:endParaRPr sz="900" spc="0">
                         <a:latin typeface="Adobe Clean"/>
                         <a:cs typeface="Adobe Clean"/>
                       </a:endParaRPr>
@@ -2161,7 +2219,7 @@
                         </a:spcBef>
                       </a:pPr>
                       <a:r>
-                        <a:rPr sz="900" spc="0" dirty="0">
+                        <a:rPr sz="900" spc="0">
                           <a:solidFill>
                             <a:srgbClr val="020302"/>
                           </a:solidFill>
@@ -2170,7 +2228,7 @@
                         </a:rPr>
                         <a:t>Online Support</a:t>
                       </a:r>
-                      <a:endParaRPr sz="900" spc="0" dirty="0">
+                      <a:endParaRPr sz="900" spc="0">
                         <a:latin typeface="Adobe Clean"/>
                         <a:cs typeface="Adobe Clean"/>
                       </a:endParaRPr>
@@ -2220,7 +2278,7 @@
                         </a:spcBef>
                       </a:pPr>
                       <a:r>
-                        <a:rPr sz="900" spc="0" dirty="0">
+                        <a:rPr sz="900" spc="0">
                           <a:solidFill>
                             <a:srgbClr val="FFFFFF"/>
                           </a:solidFill>
@@ -2230,7 +2288,7 @@
                         <a:t>Business</a:t>
                       </a:r>
                       <a:r>
-                        <a:rPr lang="en-US" sz="900" spc="0" dirty="0">
+                        <a:rPr lang="en-US" sz="900" spc="0">
                           <a:solidFill>
                             <a:srgbClr val="FFFFFF"/>
                           </a:solidFill>
@@ -2240,7 +2298,7 @@
                         <a:t> </a:t>
                       </a:r>
                       <a:r>
-                        <a:rPr sz="900" spc="0" dirty="0">
+                        <a:rPr sz="900" spc="0">
                           <a:solidFill>
                             <a:srgbClr val="FFFFFF"/>
                           </a:solidFill>
@@ -2249,7 +2307,7 @@
                         </a:rPr>
                         <a:t>Support</a:t>
                       </a:r>
-                      <a:endParaRPr sz="900" spc="0" dirty="0">
+                      <a:endParaRPr sz="900" spc="0">
                         <a:latin typeface="Adobe Clean"/>
                         <a:cs typeface="Adobe Clean"/>
                       </a:endParaRPr>
@@ -2306,7 +2364,7 @@
                         </a:spcBef>
                       </a:pPr>
                       <a:r>
-                        <a:rPr sz="900" b="1" spc="0" dirty="0">
+                        <a:rPr sz="900" b="1" spc="0">
                           <a:solidFill>
                             <a:srgbClr val="020302"/>
                           </a:solidFill>
@@ -2315,7 +2373,7 @@
                         </a:rPr>
                         <a:t>PRIORITY 1</a:t>
                       </a:r>
-                      <a:endParaRPr sz="900" spc="0" dirty="0">
+                      <a:endParaRPr sz="900" spc="0">
                         <a:latin typeface="Adobe Clean"/>
                         <a:cs typeface="Adobe Clean"/>
                       </a:endParaRPr>
@@ -2339,7 +2397,7 @@
                         <a:defRPr/>
                       </a:pPr>
                       <a:r>
-                        <a:rPr lang="en-US" sz="900" b="0" i="0" spc="0" dirty="0">
+                        <a:rPr lang="en-US" sz="900" b="0" i="0" spc="0">
                           <a:solidFill>
                             <a:srgbClr val="000000"/>
                           </a:solidFill>
@@ -2348,7 +2406,7 @@
                         </a:rPr>
                         <a:t>Customer's production business functions are down or have significant data loss or service degradation and immediate attention is required to restore functionality and usability</a:t>
                       </a:r>
-                      <a:endParaRPr lang="en-US" sz="900" b="0" i="0" spc="0" dirty="0">
+                      <a:endParaRPr lang="en-US" sz="900" b="0" i="0" spc="0">
                         <a:latin typeface="Adobe Clean Light" panose="020B0303020404020204" pitchFamily="34" charset="0"/>
                         <a:cs typeface="AdobeClean-Light"/>
                       </a:endParaRPr>
@@ -2395,7 +2453,7 @@
                         </a:spcBef>
                       </a:pPr>
                       <a:r>
-                        <a:rPr sz="900" spc="0" dirty="0">
+                        <a:rPr sz="900" spc="0">
                           <a:solidFill>
                             <a:srgbClr val="020302"/>
                           </a:solidFill>
@@ -2405,7 +2463,7 @@
                         <a:t>24x7</a:t>
                       </a:r>
                       <a:r>
-                        <a:rPr lang="en-US" sz="900" spc="0" dirty="0">
+                        <a:rPr lang="en-US" sz="900" spc="0">
                           <a:solidFill>
                             <a:srgbClr val="020302"/>
                           </a:solidFill>
@@ -2415,7 +2473,7 @@
                         <a:t> </a:t>
                       </a:r>
                       <a:r>
-                        <a:rPr sz="900" spc="0" dirty="0">
+                        <a:rPr sz="900" spc="0">
                           <a:solidFill>
                             <a:srgbClr val="020302"/>
                           </a:solidFill>
@@ -2425,7 +2483,7 @@
                         <a:t>/  </a:t>
                       </a:r>
                       <a:r>
-                        <a:rPr lang="en-US" sz="900" spc="0" dirty="0">
+                        <a:rPr lang="en-US" sz="900" spc="0">
                           <a:solidFill>
                             <a:srgbClr val="020302"/>
                           </a:solidFill>
@@ -2435,7 +2493,7 @@
                         <a:t>         </a:t>
                       </a:r>
                       <a:r>
-                        <a:rPr sz="900" spc="0" dirty="0">
+                        <a:rPr sz="900" spc="0">
                           <a:solidFill>
                             <a:srgbClr val="020302"/>
                           </a:solidFill>
@@ -2444,7 +2502,7 @@
                         </a:rPr>
                         <a:t>1 hour</a:t>
                       </a:r>
-                      <a:endParaRPr sz="900" spc="0" dirty="0">
+                      <a:endParaRPr sz="900" spc="0">
                         <a:latin typeface="AdobeClean-Light"/>
                         <a:cs typeface="AdobeClean-Light"/>
                       </a:endParaRPr>
@@ -2491,7 +2549,7 @@
                         </a:spcBef>
                       </a:pPr>
                       <a:r>
-                        <a:rPr sz="900" spc="0" dirty="0">
+                        <a:rPr sz="900" spc="0">
                           <a:solidFill>
                             <a:srgbClr val="020302"/>
                           </a:solidFill>
@@ -2501,7 +2559,7 @@
                         <a:t>24x7</a:t>
                       </a:r>
                       <a:r>
-                        <a:rPr lang="en-US" sz="900" spc="0" dirty="0">
+                        <a:rPr lang="en-US" sz="900" spc="0">
                           <a:solidFill>
                             <a:srgbClr val="020302"/>
                           </a:solidFill>
@@ -2511,7 +2569,7 @@
                         <a:t> </a:t>
                       </a:r>
                       <a:r>
-                        <a:rPr sz="900" spc="0" dirty="0">
+                        <a:rPr sz="900" spc="0">
                           <a:solidFill>
                             <a:srgbClr val="020302"/>
                           </a:solidFill>
@@ -2521,7 +2579,7 @@
                         <a:t>/ </a:t>
                       </a:r>
                       <a:r>
-                        <a:rPr lang="en-US" sz="900" spc="0" dirty="0">
+                        <a:rPr lang="en-US" sz="900" spc="0">
                           <a:solidFill>
                             <a:srgbClr val="020302"/>
                           </a:solidFill>
@@ -2531,7 +2589,7 @@
                         <a:t>        </a:t>
                       </a:r>
                       <a:r>
-                        <a:rPr sz="900" spc="0" dirty="0">
+                        <a:rPr sz="900" spc="0">
                           <a:solidFill>
                             <a:srgbClr val="020302"/>
                           </a:solidFill>
@@ -2540,7 +2598,7 @@
                         </a:rPr>
                         <a:t> 1 hour</a:t>
                       </a:r>
-                      <a:endParaRPr sz="900" spc="0" dirty="0">
+                      <a:endParaRPr sz="900" spc="0">
                         <a:latin typeface="AdobeClean-Light"/>
                         <a:cs typeface="AdobeClean-Light"/>
                       </a:endParaRPr>
@@ -2599,7 +2657,7 @@
                         </a:spcBef>
                       </a:pPr>
                       <a:r>
-                        <a:rPr sz="900" b="1" spc="0" dirty="0">
+                        <a:rPr sz="900" b="1" spc="0">
                           <a:solidFill>
                             <a:srgbClr val="020302"/>
                           </a:solidFill>
@@ -2608,7 +2666,7 @@
                         </a:rPr>
                         <a:t>PRIORITY 2</a:t>
                       </a:r>
-                      <a:endParaRPr sz="900" spc="0" dirty="0">
+                      <a:endParaRPr sz="900" spc="0">
                         <a:latin typeface="Adobe Clean"/>
                         <a:cs typeface="Adobe Clean"/>
                       </a:endParaRPr>
@@ -2623,7 +2681,7 @@
                         </a:spcBef>
                       </a:pPr>
                       <a:r>
-                        <a:rPr lang="en-US" sz="900" b="0" i="0" spc="0" dirty="0">
+                        <a:rPr lang="en-US" sz="900" b="0" i="0" spc="0">
                           <a:solidFill>
                             <a:srgbClr val="000000"/>
                           </a:solidFill>
@@ -2632,7 +2690,7 @@
                         </a:rPr>
                         <a:t>Customer's business functions have major service degradation or potential data loss, or a major feature is impacted </a:t>
                       </a:r>
-                      <a:endParaRPr lang="en-US" sz="900" b="0" i="0" spc="0" dirty="0">
+                      <a:endParaRPr lang="en-US" sz="900" b="0" i="0" spc="0">
                         <a:latin typeface="Adobe Clean Light" panose="020B0303020404020204" pitchFamily="34" charset="0"/>
                         <a:cs typeface="AdobeClean-Light"/>
                       </a:endParaRPr>
@@ -2679,7 +2737,7 @@
                         </a:spcBef>
                       </a:pPr>
                       <a:r>
-                        <a:rPr sz="900" spc="0" dirty="0">
+                        <a:rPr sz="900" spc="0">
                           <a:solidFill>
                             <a:srgbClr val="020302"/>
                           </a:solidFill>
@@ -2689,7 +2747,7 @@
                         <a:t>Business</a:t>
                       </a:r>
                       <a:r>
-                        <a:rPr lang="en-US" sz="900" spc="0" dirty="0">
+                        <a:rPr lang="en-US" sz="900" spc="0">
                           <a:solidFill>
                             <a:srgbClr val="020302"/>
                           </a:solidFill>
@@ -2699,7 +2757,7 @@
                         <a:t> </a:t>
                       </a:r>
                       <a:r>
-                        <a:rPr sz="900" spc="0" dirty="0">
+                        <a:rPr sz="900" spc="0">
                           <a:solidFill>
                             <a:srgbClr val="020302"/>
                           </a:solidFill>
@@ -2709,7 +2767,7 @@
                         <a:t>hours</a:t>
                       </a:r>
                       <a:r>
-                        <a:rPr lang="en-US" sz="900" spc="0" dirty="0">
+                        <a:rPr lang="en-US" sz="900" spc="0">
                           <a:solidFill>
                             <a:srgbClr val="020302"/>
                           </a:solidFill>
@@ -2719,7 +2777,7 @@
                         <a:t> </a:t>
                       </a:r>
                       <a:r>
-                        <a:rPr sz="900" spc="0" dirty="0">
+                        <a:rPr sz="900" spc="0">
                           <a:solidFill>
                             <a:srgbClr val="020302"/>
                           </a:solidFill>
@@ -2729,7 +2787,7 @@
                         <a:t>/  </a:t>
                       </a:r>
                       <a:r>
-                        <a:rPr lang="en-US" sz="900" spc="0" dirty="0">
+                        <a:rPr lang="en-US" sz="900" spc="0">
                           <a:solidFill>
                             <a:srgbClr val="020302"/>
                           </a:solidFill>
@@ -2739,7 +2797,7 @@
                         <a:t>   </a:t>
                       </a:r>
                       <a:r>
-                        <a:rPr sz="900" spc="0" dirty="0">
+                        <a:rPr sz="900" spc="0">
                           <a:solidFill>
                             <a:srgbClr val="020302"/>
                           </a:solidFill>
@@ -2748,7 +2806,7 @@
                         </a:rPr>
                         <a:t>4 hours</a:t>
                       </a:r>
-                      <a:endParaRPr sz="900" spc="0" dirty="0">
+                      <a:endParaRPr sz="900" spc="0">
                         <a:latin typeface="AdobeClean-Light"/>
                         <a:cs typeface="AdobeClean-Light"/>
                       </a:endParaRPr>
@@ -2795,7 +2853,7 @@
                         </a:spcBef>
                       </a:pPr>
                       <a:r>
-                        <a:rPr sz="900" spc="0" dirty="0">
+                        <a:rPr sz="900" spc="0">
                           <a:solidFill>
                             <a:srgbClr val="020302"/>
                           </a:solidFill>
@@ -2805,7 +2863,7 @@
                         <a:t>Business</a:t>
                       </a:r>
                       <a:r>
-                        <a:rPr lang="en-US" sz="900" spc="0" dirty="0">
+                        <a:rPr lang="en-US" sz="900" spc="0">
                           <a:solidFill>
                             <a:srgbClr val="020302"/>
                           </a:solidFill>
@@ -2815,7 +2873,7 @@
                         <a:t> </a:t>
                       </a:r>
                       <a:r>
-                        <a:rPr sz="900" spc="0" dirty="0">
+                        <a:rPr sz="900" spc="0">
                           <a:solidFill>
                             <a:srgbClr val="020302"/>
                           </a:solidFill>
@@ -2825,7 +2883,7 @@
                         <a:t>hours</a:t>
                       </a:r>
                       <a:r>
-                        <a:rPr lang="en-US" sz="900" spc="0" dirty="0">
+                        <a:rPr lang="en-US" sz="900" spc="0">
                           <a:solidFill>
                             <a:srgbClr val="020302"/>
                           </a:solidFill>
@@ -2835,7 +2893,7 @@
                         <a:t> </a:t>
                       </a:r>
                       <a:r>
-                        <a:rPr sz="900" spc="0" dirty="0">
+                        <a:rPr sz="900" spc="0">
                           <a:solidFill>
                             <a:srgbClr val="020302"/>
                           </a:solidFill>
@@ -2845,7 +2903,7 @@
                         <a:t>/  </a:t>
                       </a:r>
                       <a:r>
-                        <a:rPr lang="en-US" sz="900" spc="0" dirty="0">
+                        <a:rPr lang="en-US" sz="900" spc="0">
                           <a:solidFill>
                             <a:srgbClr val="020302"/>
                           </a:solidFill>
@@ -2855,7 +2913,7 @@
                         <a:t>    </a:t>
                       </a:r>
                       <a:r>
-                        <a:rPr sz="900" spc="0" dirty="0">
+                        <a:rPr sz="900" spc="0">
                           <a:solidFill>
                             <a:srgbClr val="020302"/>
                           </a:solidFill>
@@ -2864,7 +2922,7 @@
                         </a:rPr>
                         <a:t>2 hours</a:t>
                       </a:r>
-                      <a:endParaRPr sz="900" spc="0" dirty="0">
+                      <a:endParaRPr sz="900" spc="0">
                         <a:latin typeface="AdobeClean-Light"/>
                         <a:cs typeface="AdobeClean-Light"/>
                       </a:endParaRPr>
@@ -2923,7 +2981,7 @@
                         </a:spcBef>
                       </a:pPr>
                       <a:r>
-                        <a:rPr sz="900" b="1" spc="0" dirty="0">
+                        <a:rPr sz="900" b="1" spc="0">
                           <a:solidFill>
                             <a:srgbClr val="020302"/>
                           </a:solidFill>
@@ -2932,7 +2990,7 @@
                         </a:rPr>
                         <a:t>PRIORITY 3</a:t>
                       </a:r>
-                      <a:endParaRPr sz="900" spc="0" dirty="0">
+                      <a:endParaRPr sz="900" spc="0">
                         <a:latin typeface="Adobe Clean"/>
                         <a:cs typeface="Adobe Clean"/>
                       </a:endParaRPr>
@@ -2947,7 +3005,7 @@
                         </a:spcBef>
                       </a:pPr>
                       <a:r>
-                        <a:rPr kumimoji="0" lang="en-US" sz="900" b="0" i="0" u="none" strike="noStrike" kern="1200" cap="none" spc="0" normalizeH="0" baseline="0" noProof="0" dirty="0">
+                        <a:rPr kumimoji="0" lang="en-US" sz="900" b="0" i="0" u="none" strike="noStrike" kern="1200" cap="none" spc="0" normalizeH="0" baseline="0" noProof="0">
                           <a:ln>
                             <a:noFill/>
                           </a:ln>
@@ -2963,7 +3021,7 @@
                         </a:rPr>
                         <a:t>Customer's business functions have minor service degradation but there exists a solution/workaround allowing business functions to continue </a:t>
                       </a:r>
-                      <a:endParaRPr lang="en-US" sz="900" b="0" i="0" spc="0" dirty="0">
+                      <a:endParaRPr lang="en-US" sz="900" b="0" i="0" spc="0">
                         <a:latin typeface="Adobe Clean Light" panose="020B0303020404020204" pitchFamily="34" charset="0"/>
                         <a:cs typeface="AdobeClean-Light"/>
                       </a:endParaRPr>
@@ -3010,7 +3068,7 @@
                         </a:spcBef>
                       </a:pPr>
                       <a:r>
-                        <a:rPr sz="900" spc="0" dirty="0">
+                        <a:rPr sz="900" spc="0">
                           <a:solidFill>
                             <a:srgbClr val="020302"/>
                           </a:solidFill>
@@ -3020,7 +3078,7 @@
                         <a:t>Business</a:t>
                       </a:r>
                       <a:r>
-                        <a:rPr lang="en-US" sz="900" spc="0" dirty="0">
+                        <a:rPr lang="en-US" sz="900" spc="0">
                           <a:solidFill>
                             <a:srgbClr val="020302"/>
                           </a:solidFill>
@@ -3030,7 +3088,7 @@
                         <a:t> </a:t>
                       </a:r>
                       <a:r>
-                        <a:rPr sz="900" spc="0" dirty="0">
+                        <a:rPr sz="900" spc="0">
                           <a:solidFill>
                             <a:srgbClr val="020302"/>
                           </a:solidFill>
@@ -3040,7 +3098,7 @@
                         <a:t>hours</a:t>
                       </a:r>
                       <a:r>
-                        <a:rPr lang="en-US" sz="900" spc="0" dirty="0">
+                        <a:rPr lang="en-US" sz="900" spc="0">
                           <a:solidFill>
                             <a:srgbClr val="020302"/>
                           </a:solidFill>
@@ -3050,7 +3108,7 @@
                         <a:t> </a:t>
                       </a:r>
                       <a:r>
-                        <a:rPr sz="900" spc="0" dirty="0">
+                        <a:rPr sz="900" spc="0">
                           <a:solidFill>
                             <a:srgbClr val="020302"/>
                           </a:solidFill>
@@ -3060,7 +3118,7 @@
                         <a:t>/  </a:t>
                       </a:r>
                       <a:r>
-                        <a:rPr lang="en-US" sz="900" spc="0" dirty="0">
+                        <a:rPr lang="en-US" sz="900" spc="0">
                           <a:solidFill>
                             <a:srgbClr val="020302"/>
                           </a:solidFill>
@@ -3070,7 +3128,7 @@
                         <a:t>   </a:t>
                       </a:r>
                       <a:r>
-                        <a:rPr sz="900" spc="0" dirty="0">
+                        <a:rPr sz="900" spc="0">
                           <a:solidFill>
                             <a:srgbClr val="020302"/>
                           </a:solidFill>
@@ -3080,7 +3138,7 @@
                         <a:t>6</a:t>
                       </a:r>
                       <a:r>
-                        <a:rPr lang="en-US" sz="900" spc="0" dirty="0">
+                        <a:rPr lang="en-US" sz="900" spc="0">
                           <a:solidFill>
                             <a:srgbClr val="020302"/>
                           </a:solidFill>
@@ -3090,7 +3148,7 @@
                         <a:t> </a:t>
                       </a:r>
                       <a:r>
-                        <a:rPr sz="900" spc="0" dirty="0">
+                        <a:rPr sz="900" spc="0">
                           <a:solidFill>
                             <a:srgbClr val="020302"/>
                           </a:solidFill>
@@ -3099,7 +3157,7 @@
                         </a:rPr>
                         <a:t>hours</a:t>
                       </a:r>
-                      <a:endParaRPr sz="900" spc="0" dirty="0">
+                      <a:endParaRPr sz="900" spc="0">
                         <a:latin typeface="AdobeClean-Light"/>
                         <a:cs typeface="AdobeClean-Light"/>
                       </a:endParaRPr>
@@ -3146,7 +3204,7 @@
                         </a:spcBef>
                       </a:pPr>
                       <a:r>
-                        <a:rPr sz="900" spc="0" dirty="0">
+                        <a:rPr sz="900" spc="0">
                           <a:solidFill>
                             <a:srgbClr val="020302"/>
                           </a:solidFill>
@@ -3156,7 +3214,7 @@
                         <a:t>Business</a:t>
                       </a:r>
                       <a:r>
-                        <a:rPr lang="en-US" sz="900" spc="0" dirty="0">
+                        <a:rPr lang="en-US" sz="900" spc="0">
                           <a:solidFill>
                             <a:srgbClr val="020302"/>
                           </a:solidFill>
@@ -3166,7 +3224,7 @@
                         <a:t> </a:t>
                       </a:r>
                       <a:r>
-                        <a:rPr sz="900" spc="0" dirty="0">
+                        <a:rPr sz="900" spc="0">
                           <a:solidFill>
                             <a:srgbClr val="020302"/>
                           </a:solidFill>
@@ -3176,7 +3234,7 @@
                         <a:t>hours</a:t>
                       </a:r>
                       <a:r>
-                        <a:rPr lang="en-US" sz="900" spc="0" dirty="0">
+                        <a:rPr lang="en-US" sz="900" spc="0">
                           <a:solidFill>
                             <a:srgbClr val="020302"/>
                           </a:solidFill>
@@ -3186,7 +3244,7 @@
                         <a:t> </a:t>
                       </a:r>
                       <a:r>
-                        <a:rPr sz="900" spc="0" dirty="0">
+                        <a:rPr sz="900" spc="0">
                           <a:solidFill>
                             <a:srgbClr val="020302"/>
                           </a:solidFill>
@@ -3196,7 +3254,7 @@
                         <a:t>/  </a:t>
                       </a:r>
                       <a:r>
-                        <a:rPr lang="en-US" sz="900" spc="0" dirty="0">
+                        <a:rPr lang="en-US" sz="900" spc="0">
                           <a:solidFill>
                             <a:srgbClr val="020302"/>
                           </a:solidFill>
@@ -3206,7 +3264,7 @@
                         <a:t>   </a:t>
                       </a:r>
                       <a:r>
-                        <a:rPr sz="900" spc="0" dirty="0">
+                        <a:rPr sz="900" spc="0">
                           <a:solidFill>
                             <a:srgbClr val="020302"/>
                           </a:solidFill>
@@ -3216,7 +3274,7 @@
                         <a:t>4</a:t>
                       </a:r>
                       <a:r>
-                        <a:rPr lang="en-US" sz="900" spc="0" dirty="0">
+                        <a:rPr lang="en-US" sz="900" spc="0">
                           <a:solidFill>
                             <a:srgbClr val="020302"/>
                           </a:solidFill>
@@ -3226,7 +3284,7 @@
                         <a:t> </a:t>
                       </a:r>
                       <a:r>
-                        <a:rPr sz="900" spc="0" dirty="0">
+                        <a:rPr sz="900" spc="0">
                           <a:solidFill>
                             <a:srgbClr val="020302"/>
                           </a:solidFill>
@@ -3235,7 +3293,7 @@
                         </a:rPr>
                         <a:t>hours</a:t>
                       </a:r>
-                      <a:endParaRPr sz="900" spc="0" dirty="0">
+                      <a:endParaRPr sz="900" spc="0">
                         <a:latin typeface="AdobeClean-Light"/>
                         <a:cs typeface="AdobeClean-Light"/>
                       </a:endParaRPr>
@@ -3294,7 +3352,7 @@
                         </a:spcBef>
                       </a:pPr>
                       <a:r>
-                        <a:rPr sz="900" b="1" spc="0" dirty="0">
+                        <a:rPr sz="900" b="1" spc="0">
                           <a:solidFill>
                             <a:srgbClr val="020302"/>
                           </a:solidFill>
@@ -3303,7 +3361,7 @@
                         </a:rPr>
                         <a:t>PRIORITY 4</a:t>
                       </a:r>
-                      <a:endParaRPr sz="900" spc="0" dirty="0">
+                      <a:endParaRPr sz="900" spc="0">
                         <a:latin typeface="Adobe Clean"/>
                         <a:cs typeface="Adobe Clean"/>
                       </a:endParaRPr>
@@ -3327,7 +3385,7 @@
                         <a:defRPr/>
                       </a:pPr>
                       <a:r>
-                        <a:rPr lang="en-US" sz="900" b="0" i="0" spc="0" dirty="0">
+                        <a:rPr lang="en-US" sz="900" b="0" i="0" spc="0">
                           <a:solidFill>
                             <a:srgbClr val="000000"/>
                           </a:solidFill>
@@ -3336,7 +3394,7 @@
                         </a:rPr>
                         <a:t>General question regarding current product functionality or an enhancement request</a:t>
                       </a:r>
-                      <a:endParaRPr lang="en-US" sz="900" b="0" i="0" spc="0" dirty="0">
+                      <a:endParaRPr lang="en-US" sz="900" b="0" i="0" spc="0">
                         <a:latin typeface="Adobe Clean Light" panose="020B0303020404020204" pitchFamily="34" charset="0"/>
                         <a:cs typeface="AdobeClean-Light"/>
                       </a:endParaRPr>
@@ -3383,7 +3441,7 @@
                         </a:spcBef>
                       </a:pPr>
                       <a:r>
-                        <a:rPr sz="900" spc="0" dirty="0">
+                        <a:rPr sz="900" spc="0">
                           <a:solidFill>
                             <a:srgbClr val="020302"/>
                           </a:solidFill>
@@ -3393,7 +3451,7 @@
                         <a:t>Business</a:t>
                       </a:r>
                       <a:r>
-                        <a:rPr lang="en-US" sz="900" spc="0" dirty="0">
+                        <a:rPr lang="en-US" sz="900" spc="0">
                           <a:solidFill>
                             <a:srgbClr val="020302"/>
                           </a:solidFill>
@@ -3403,7 +3461,7 @@
                         <a:t> </a:t>
                       </a:r>
                       <a:r>
-                        <a:rPr sz="900" spc="0" dirty="0">
+                        <a:rPr sz="900" spc="0">
                           <a:solidFill>
                             <a:srgbClr val="020302"/>
                           </a:solidFill>
@@ -3413,7 +3471,7 @@
                         <a:t>days</a:t>
                       </a:r>
                       <a:r>
-                        <a:rPr lang="en-US" sz="900" spc="0" dirty="0">
+                        <a:rPr lang="en-US" sz="900" spc="0">
                           <a:solidFill>
                             <a:srgbClr val="020302"/>
                           </a:solidFill>
@@ -3423,7 +3481,7 @@
                         <a:t> </a:t>
                       </a:r>
                       <a:r>
-                        <a:rPr sz="900" spc="0" dirty="0">
+                        <a:rPr sz="900" spc="0">
                           <a:solidFill>
                             <a:srgbClr val="020302"/>
                           </a:solidFill>
@@ -3433,7 +3491,7 @@
                         <a:t>/  </a:t>
                       </a:r>
                       <a:r>
-                        <a:rPr lang="en-US" sz="900" spc="0" dirty="0">
+                        <a:rPr lang="en-US" sz="900" spc="0">
                           <a:solidFill>
                             <a:srgbClr val="020302"/>
                           </a:solidFill>
@@ -3443,7 +3501,7 @@
                         <a:t>    </a:t>
                       </a:r>
                       <a:r>
-                        <a:rPr sz="900" spc="0" dirty="0">
+                        <a:rPr sz="900" spc="0">
                           <a:solidFill>
                             <a:srgbClr val="020302"/>
                           </a:solidFill>
@@ -3452,7 +3510,7 @@
                         </a:rPr>
                         <a:t>3 days</a:t>
                       </a:r>
-                      <a:endParaRPr sz="900" spc="0" dirty="0">
+                      <a:endParaRPr sz="900" spc="0">
                         <a:latin typeface="AdobeClean-Light"/>
                         <a:cs typeface="AdobeClean-Light"/>
                       </a:endParaRPr>
@@ -3499,7 +3557,7 @@
                         </a:spcBef>
                       </a:pPr>
                       <a:r>
-                        <a:rPr sz="900" spc="0" dirty="0">
+                        <a:rPr sz="900" spc="0">
                           <a:solidFill>
                             <a:srgbClr val="020302"/>
                           </a:solidFill>
@@ -3509,7 +3567,7 @@
                         <a:t>Business</a:t>
                       </a:r>
                       <a:r>
-                        <a:rPr lang="en-US" sz="900" spc="0" dirty="0">
+                        <a:rPr lang="en-US" sz="900" spc="0">
                           <a:solidFill>
                             <a:srgbClr val="020302"/>
                           </a:solidFill>
@@ -3519,7 +3577,7 @@
                         <a:t> </a:t>
                       </a:r>
                       <a:r>
-                        <a:rPr sz="900" spc="0" dirty="0">
+                        <a:rPr sz="900" spc="0">
                           <a:solidFill>
                             <a:srgbClr val="020302"/>
                           </a:solidFill>
@@ -3529,7 +3587,7 @@
                         <a:t>day</a:t>
                       </a:r>
                       <a:r>
-                        <a:rPr lang="en-US" sz="900" spc="0" dirty="0">
+                        <a:rPr lang="en-US" sz="900" spc="0">
                           <a:solidFill>
                             <a:srgbClr val="020302"/>
                           </a:solidFill>
@@ -3539,7 +3597,7 @@
                         <a:t>s </a:t>
                       </a:r>
                       <a:r>
-                        <a:rPr sz="900" spc="0" dirty="0">
+                        <a:rPr sz="900" spc="0">
                           <a:solidFill>
                             <a:srgbClr val="020302"/>
                           </a:solidFill>
@@ -3548,7 +3606,7 @@
                         </a:rPr>
                         <a:t>/ </a:t>
                       </a:r>
-                      <a:endParaRPr lang="en-US" sz="900" spc="0" dirty="0">
+                      <a:endParaRPr lang="en-US" sz="900" spc="0">
                         <a:solidFill>
                           <a:srgbClr val="020302"/>
                         </a:solidFill>
@@ -3566,7 +3624,7 @@
                         </a:spcBef>
                       </a:pPr>
                       <a:r>
-                        <a:rPr sz="900" spc="0" dirty="0">
+                        <a:rPr sz="900" spc="0">
                           <a:solidFill>
                             <a:srgbClr val="020302"/>
                           </a:solidFill>
@@ -3576,7 +3634,7 @@
                         <a:t> </a:t>
                       </a:r>
                       <a:r>
-                        <a:rPr lang="en-US" sz="900" spc="0" dirty="0">
+                        <a:rPr lang="en-US" sz="900" spc="0">
                           <a:solidFill>
                             <a:srgbClr val="020302"/>
                           </a:solidFill>
@@ -3586,7 +3644,7 @@
                         <a:t> </a:t>
                       </a:r>
                       <a:r>
-                        <a:rPr sz="900" spc="0" dirty="0">
+                        <a:rPr sz="900" spc="0">
                           <a:solidFill>
                             <a:srgbClr val="020302"/>
                           </a:solidFill>
@@ -3595,7 +3653,7 @@
                         </a:rPr>
                         <a:t>1 day</a:t>
                       </a:r>
-                      <a:endParaRPr sz="900" spc="0" dirty="0">
+                      <a:endParaRPr sz="900" spc="0">
                         <a:latin typeface="AdobeClean-Light"/>
                         <a:cs typeface="AdobeClean-Light"/>
                       </a:endParaRPr>
@@ -3709,7 +3767,7 @@
                     <a:bodyPr/>
                     <a:lstStyle/>
                     <a:p>
-                      <a:endParaRPr lang="en-US" dirty="0"/>
+                      <a:endParaRPr lang="en-US"/>
                     </a:p>
                   </a:txBody>
                   <a:tcPr/>
@@ -3747,7 +3805,7 @@
                         <a:defRPr/>
                       </a:pPr>
                       <a:r>
-                        <a:rPr lang="en-US" sz="900" spc="-20" dirty="0">
+                        <a:rPr lang="en-US" sz="900" spc="-20">
                           <a:solidFill>
                             <a:srgbClr val="404040"/>
                           </a:solidFill>
@@ -3757,7 +3815,7 @@
                         <a:t>Online </a:t>
                       </a:r>
                       <a:r>
-                        <a:rPr lang="en-US" sz="900" spc="-135" dirty="0">
+                        <a:rPr lang="en-US" sz="900" spc="-135">
                           <a:solidFill>
                             <a:srgbClr val="404040"/>
                           </a:solidFill>
@@ -3767,7 +3825,7 @@
                         <a:t> </a:t>
                       </a:r>
                       <a:r>
-                        <a:rPr lang="en-US" sz="900" spc="-20" dirty="0">
+                        <a:rPr lang="en-US" sz="900" spc="-20">
                           <a:solidFill>
                             <a:srgbClr val="404040"/>
                           </a:solidFill>
@@ -3776,7 +3834,7 @@
                         </a:rPr>
                         <a:t>Support</a:t>
                       </a:r>
-                      <a:endParaRPr lang="en-US" sz="900" dirty="0">
+                      <a:endParaRPr lang="en-US" sz="900">
                         <a:latin typeface="Adobe Clean"/>
                         <a:cs typeface="Adobe Clean"/>
                       </a:endParaRPr>
@@ -3820,7 +3878,7 @@
                         </a:spcBef>
                       </a:pPr>
                       <a:r>
-                        <a:rPr sz="900" spc="-20" dirty="0">
+                        <a:rPr sz="900" spc="-20">
                           <a:solidFill>
                             <a:srgbClr val="FFFFFF"/>
                           </a:solidFill>
@@ -3830,7 +3888,7 @@
                         <a:t>Business</a:t>
                       </a:r>
                       <a:r>
-                        <a:rPr lang="en-US" sz="900" spc="-20" dirty="0">
+                        <a:rPr lang="en-US" sz="900" spc="-20">
                           <a:solidFill>
                             <a:srgbClr val="FFFFFF"/>
                           </a:solidFill>
@@ -3840,7 +3898,7 @@
                         <a:t> </a:t>
                       </a:r>
                       <a:r>
-                        <a:rPr sz="900" spc="-20" dirty="0">
+                        <a:rPr sz="900" spc="-20">
                           <a:solidFill>
                             <a:srgbClr val="FFFFFF"/>
                           </a:solidFill>
@@ -3849,7 +3907,7 @@
                         </a:rPr>
                         <a:t>Support</a:t>
                       </a:r>
-                      <a:endParaRPr sz="900" dirty="0">
+                      <a:endParaRPr sz="900">
                         <a:latin typeface="Adobe Clean"/>
                         <a:cs typeface="Adobe Clean"/>
                       </a:endParaRPr>
@@ -3897,7 +3955,7 @@
                     <a:bodyPr/>
                     <a:lstStyle/>
                     <a:p>
-                      <a:endParaRPr lang="en-US" dirty="0"/>
+                      <a:endParaRPr lang="en-US"/>
                     </a:p>
                   </a:txBody>
                   <a:tcPr/>
@@ -3934,7 +3992,7 @@
                         <a:tabLst/>
                         <a:defRPr/>
                       </a:pPr>
-                      <a:endParaRPr lang="en-US" sz="800" i="1" dirty="0">
+                      <a:endParaRPr lang="en-US" sz="800" i="1">
                         <a:solidFill>
                           <a:sysClr val="windowText" lastClr="000000"/>
                         </a:solidFill>
@@ -3998,7 +4056,7 @@
                         <a:defRPr/>
                       </a:pPr>
                       <a:r>
-                        <a:rPr lang="en-US" sz="800" i="1" dirty="0">
+                        <a:rPr lang="en-US" sz="800" i="1">
                           <a:solidFill>
                             <a:schemeClr val="bg1"/>
                           </a:solidFill>
@@ -4068,7 +4126,7 @@
                         </a:spcBef>
                       </a:pPr>
                       <a:r>
-                        <a:rPr lang="en-US" sz="1000" b="1" i="0" spc="0" dirty="0">
+                        <a:rPr lang="en-US" sz="1000" b="1" i="0" spc="0">
                           <a:solidFill>
                             <a:schemeClr val="bg1"/>
                           </a:solidFill>
@@ -4077,7 +4135,7 @@
                         </a:rPr>
                         <a:t>Assigned Experts</a:t>
                       </a:r>
-                      <a:endParaRPr sz="1000" b="1" i="0" spc="0" dirty="0">
+                      <a:endParaRPr sz="1000" b="1" i="0" spc="0">
                         <a:solidFill>
                           <a:schemeClr val="bg1"/>
                         </a:solidFill>
@@ -4130,7 +4188,7 @@
                         </a:spcBef>
                       </a:pPr>
                       <a:r>
-                        <a:rPr sz="900" spc="0" dirty="0">
+                        <a:rPr sz="900" spc="0">
                           <a:solidFill>
                             <a:srgbClr val="020302"/>
                           </a:solidFill>
@@ -4139,7 +4197,7 @@
                         </a:rPr>
                         <a:t>Account Support Lead</a:t>
                       </a:r>
-                      <a:endParaRPr sz="900" spc="0" dirty="0">
+                      <a:endParaRPr sz="900" spc="0">
                         <a:latin typeface="AdobeClean-Light"/>
                         <a:cs typeface="AdobeClean-Light"/>
                       </a:endParaRPr>
@@ -4185,7 +4243,7 @@
                           <a:spcPts val="470"/>
                         </a:spcBef>
                       </a:pPr>
-                      <a:endParaRPr sz="900" dirty="0">
+                      <a:endParaRPr sz="900">
                         <a:latin typeface="Wingdings"/>
                         <a:cs typeface="Wingdings"/>
                       </a:endParaRPr>
@@ -4227,7 +4285,7 @@
                         </a:spcBef>
                       </a:pPr>
                       <a:r>
-                        <a:rPr sz="900" dirty="0">
+                        <a:rPr sz="900">
                           <a:solidFill>
                             <a:srgbClr val="020302"/>
                           </a:solidFill>
@@ -4236,7 +4294,7 @@
                         </a:rPr>
                         <a:t></a:t>
                       </a:r>
-                      <a:endParaRPr sz="900" dirty="0">
+                      <a:endParaRPr sz="900">
                         <a:latin typeface="Wingdings"/>
                         <a:cs typeface="Wingdings"/>
                       </a:endParaRPr>
@@ -4279,7 +4337,7 @@
                           <a:spcPts val="459"/>
                         </a:spcBef>
                       </a:pPr>
-                      <a:endParaRPr sz="900" dirty="0">
+                      <a:endParaRPr sz="900">
                         <a:latin typeface="AdobeClean-Light"/>
                         <a:cs typeface="AdobeClean-Light"/>
                       </a:endParaRPr>
@@ -4317,7 +4375,7 @@
                         </a:spcBef>
                       </a:pPr>
                       <a:r>
-                        <a:rPr sz="900" spc="0" dirty="0">
+                        <a:rPr sz="900" spc="0">
                           <a:solidFill>
                             <a:srgbClr val="020302"/>
                           </a:solidFill>
@@ -4326,7 +4384,7 @@
                         </a:rPr>
                         <a:t>Named Support Engineer</a:t>
                       </a:r>
-                      <a:endParaRPr sz="900" spc="0" dirty="0">
+                      <a:endParaRPr sz="900" spc="0">
                         <a:latin typeface="AdobeClean-Light"/>
                         <a:cs typeface="AdobeClean-Light"/>
                       </a:endParaRPr>
@@ -4357,7 +4415,7 @@
                           <a:spcPct val="100000"/>
                         </a:lnSpc>
                       </a:pPr>
-                      <a:endParaRPr sz="900" dirty="0">
+                      <a:endParaRPr sz="900">
                         <a:latin typeface="Times New Roman"/>
                         <a:cs typeface="Times New Roman"/>
                       </a:endParaRPr>
@@ -4386,7 +4444,7 @@
                           <a:spcPct val="100000"/>
                         </a:lnSpc>
                       </a:pPr>
-                      <a:endParaRPr sz="900" dirty="0">
+                      <a:endParaRPr sz="900">
                         <a:latin typeface="Times New Roman"/>
                         <a:cs typeface="Times New Roman"/>
                       </a:endParaRPr>
@@ -4420,7 +4478,7 @@
                           <a:spcPts val="500"/>
                         </a:spcBef>
                       </a:pPr>
-                      <a:endParaRPr sz="900" dirty="0">
+                      <a:endParaRPr sz="900">
                         <a:latin typeface="AdobeClean-Light"/>
                         <a:cs typeface="AdobeClean-Light"/>
                       </a:endParaRPr>
@@ -4470,7 +4528,7 @@
                         </a:spcBef>
                       </a:pPr>
                       <a:r>
-                        <a:rPr sz="900" spc="0" dirty="0">
+                        <a:rPr sz="900" spc="0">
                           <a:solidFill>
                             <a:srgbClr val="020302"/>
                           </a:solidFill>
@@ -4479,7 +4537,7 @@
                         </a:rPr>
                         <a:t>Technical Account Manager</a:t>
                       </a:r>
-                      <a:endParaRPr sz="900" spc="0" dirty="0">
+                      <a:endParaRPr sz="900" spc="0">
                         <a:latin typeface="AdobeClean-Light"/>
                         <a:cs typeface="AdobeClean-Light"/>
                       </a:endParaRPr>
@@ -4516,7 +4574,7 @@
                           <a:spcPct val="100000"/>
                         </a:lnSpc>
                       </a:pPr>
-                      <a:endParaRPr sz="900" dirty="0">
+                      <a:endParaRPr sz="900">
                         <a:latin typeface="Times New Roman"/>
                         <a:cs typeface="Times New Roman"/>
                       </a:endParaRPr>
@@ -4554,7 +4612,7 @@
                           <a:spcPct val="100000"/>
                         </a:lnSpc>
                       </a:pPr>
-                      <a:endParaRPr sz="900" dirty="0">
+                      <a:endParaRPr sz="900">
                         <a:latin typeface="Times New Roman"/>
                         <a:cs typeface="Times New Roman"/>
                       </a:endParaRPr>
@@ -4598,7 +4656,7 @@
                         </a:spcBef>
                       </a:pPr>
                       <a:r>
-                        <a:rPr lang="en-US" sz="1000" b="1" i="0" spc="0" dirty="0">
+                        <a:rPr lang="en-US" sz="1000" b="1" i="0" spc="0">
                           <a:solidFill>
                             <a:schemeClr val="bg1"/>
                           </a:solidFill>
@@ -4607,7 +4665,7 @@
                         </a:rPr>
                         <a:t>Support Services</a:t>
                       </a:r>
-                      <a:endParaRPr sz="1000" b="1" i="0" spc="0" dirty="0">
+                      <a:endParaRPr sz="1000" b="1" i="0" spc="0">
                         <a:solidFill>
                           <a:schemeClr val="bg1"/>
                         </a:solidFill>
@@ -4669,7 +4727,7 @@
                         </a:spcBef>
                       </a:pPr>
                       <a:r>
-                        <a:rPr lang="en-US" sz="900" spc="0" dirty="0">
+                        <a:rPr lang="en-US" sz="900" spc="0">
                           <a:solidFill>
                             <a:srgbClr val="020302"/>
                           </a:solidFill>
@@ -4679,7 +4737,7 @@
                         <a:t>Online</a:t>
                       </a:r>
                       <a:r>
-                        <a:rPr sz="900" spc="0" dirty="0">
+                        <a:rPr sz="900" spc="0">
                           <a:solidFill>
                             <a:srgbClr val="020302"/>
                           </a:solidFill>
@@ -4688,7 +4746,7 @@
                         </a:rPr>
                         <a:t> Support</a:t>
                       </a:r>
-                      <a:endParaRPr sz="900" spc="0" dirty="0">
+                      <a:endParaRPr sz="900" spc="0">
                         <a:latin typeface="AdobeClean-Light"/>
                         <a:cs typeface="AdobeClean-Light"/>
                       </a:endParaRPr>
@@ -4729,7 +4787,7 @@
                         </a:spcBef>
                       </a:pPr>
                       <a:r>
-                        <a:rPr sz="900" spc="-25" dirty="0">
+                        <a:rPr sz="900" spc="-25">
                           <a:solidFill>
                             <a:srgbClr val="020302"/>
                           </a:solidFill>
@@ -4739,7 +4797,7 @@
                         <a:t>Business</a:t>
                       </a:r>
                       <a:r>
-                        <a:rPr sz="900" spc="-15" dirty="0">
+                        <a:rPr sz="900" spc="-15">
                           <a:solidFill>
                             <a:srgbClr val="020302"/>
                           </a:solidFill>
@@ -4749,7 +4807,7 @@
                         <a:t> </a:t>
                       </a:r>
                       <a:r>
-                        <a:rPr sz="900" spc="-30" dirty="0">
+                        <a:rPr sz="900" spc="-30">
                           <a:solidFill>
                             <a:srgbClr val="020302"/>
                           </a:solidFill>
@@ -4758,7 +4816,7 @@
                         </a:rPr>
                         <a:t>hours</a:t>
                       </a:r>
-                      <a:endParaRPr sz="900" dirty="0">
+                      <a:endParaRPr sz="900">
                         <a:latin typeface="AdobeClean-Light"/>
                         <a:cs typeface="AdobeClean-Light"/>
                       </a:endParaRPr>
@@ -4800,7 +4858,7 @@
                         </a:spcBef>
                       </a:pPr>
                       <a:r>
-                        <a:rPr sz="900" spc="-25" dirty="0">
+                        <a:rPr sz="900" spc="-25">
                           <a:solidFill>
                             <a:srgbClr val="020302"/>
                           </a:solidFill>
@@ -4810,7 +4868,7 @@
                         <a:t>Business</a:t>
                       </a:r>
                       <a:r>
-                        <a:rPr sz="900" spc="-15" dirty="0">
+                        <a:rPr sz="900" spc="-15">
                           <a:solidFill>
                             <a:srgbClr val="020302"/>
                           </a:solidFill>
@@ -4820,7 +4878,7 @@
                         <a:t> </a:t>
                       </a:r>
                       <a:r>
-                        <a:rPr sz="900" spc="-30" dirty="0">
+                        <a:rPr sz="900" spc="-30">
                           <a:solidFill>
                             <a:srgbClr val="020302"/>
                           </a:solidFill>
@@ -4829,7 +4887,7 @@
                         </a:rPr>
                         <a:t>hours</a:t>
                       </a:r>
-                      <a:endParaRPr sz="900" dirty="0">
+                      <a:endParaRPr sz="900">
                         <a:latin typeface="AdobeClean-Light"/>
                         <a:cs typeface="AdobeClean-Light"/>
                       </a:endParaRPr>
@@ -4872,7 +4930,7 @@
                           <a:spcPts val="455"/>
                         </a:spcBef>
                       </a:pPr>
-                      <a:endParaRPr sz="900" dirty="0">
+                      <a:endParaRPr sz="900">
                         <a:latin typeface="AdobeClean-Light"/>
                         <a:cs typeface="AdobeClean-Light"/>
                       </a:endParaRPr>
@@ -4913,7 +4971,7 @@
                         </a:spcBef>
                       </a:pPr>
                       <a:r>
-                        <a:rPr sz="900" spc="0" dirty="0">
+                        <a:rPr sz="900" spc="0">
                           <a:solidFill>
                             <a:srgbClr val="020302"/>
                           </a:solidFill>
@@ -4923,7 +4981,7 @@
                         <a:t>24x7</a:t>
                       </a:r>
                       <a:r>
-                        <a:rPr lang="en-US" sz="900" spc="0" dirty="0">
+                        <a:rPr lang="en-US" sz="900" spc="0">
                           <a:solidFill>
                             <a:srgbClr val="020302"/>
                           </a:solidFill>
@@ -4933,7 +4991,7 @@
                         <a:t>x365</a:t>
                       </a:r>
                       <a:r>
-                        <a:rPr sz="900" spc="0" dirty="0">
+                        <a:rPr sz="900" spc="0">
                           <a:solidFill>
                             <a:srgbClr val="020302"/>
                           </a:solidFill>
@@ -4942,7 +5000,7 @@
                         </a:rPr>
                         <a:t> P1 Issue Support</a:t>
                       </a:r>
-                      <a:endParaRPr sz="900" spc="0" dirty="0">
+                      <a:endParaRPr sz="900" spc="0">
                         <a:latin typeface="AdobeClean-Light"/>
                         <a:cs typeface="AdobeClean-Light"/>
                       </a:endParaRPr>
@@ -4977,7 +5035,7 @@
                         </a:spcBef>
                       </a:pPr>
                       <a:r>
-                        <a:rPr sz="900" dirty="0">
+                        <a:rPr sz="900">
                           <a:solidFill>
                             <a:srgbClr val="020302"/>
                           </a:solidFill>
@@ -4986,7 +5044,7 @@
                         </a:rPr>
                         <a:t></a:t>
                       </a:r>
-                      <a:endParaRPr sz="900" dirty="0">
+                      <a:endParaRPr sz="900">
                         <a:latin typeface="Wingdings"/>
                         <a:cs typeface="Wingdings"/>
                       </a:endParaRPr>
@@ -5019,7 +5077,7 @@
                         </a:spcBef>
                       </a:pPr>
                       <a:r>
-                        <a:rPr sz="900" dirty="0">
+                        <a:rPr sz="900">
                           <a:solidFill>
                             <a:srgbClr val="020302"/>
                           </a:solidFill>
@@ -5028,7 +5086,7 @@
                         </a:rPr>
                         <a:t></a:t>
                       </a:r>
-                      <a:endParaRPr sz="900" dirty="0">
+                      <a:endParaRPr sz="900">
                         <a:latin typeface="Wingdings"/>
                         <a:cs typeface="Wingdings"/>
                       </a:endParaRPr>
@@ -5062,7 +5120,7 @@
                           <a:spcPts val="455"/>
                         </a:spcBef>
                       </a:pPr>
-                      <a:endParaRPr sz="900" dirty="0">
+                      <a:endParaRPr sz="900">
                         <a:latin typeface="AdobeClean-Light"/>
                         <a:cs typeface="AdobeClean-Light"/>
                       </a:endParaRPr>
@@ -5112,7 +5170,7 @@
                         </a:spcBef>
                       </a:pPr>
                       <a:r>
-                        <a:rPr lang="en-US" sz="900" spc="0" dirty="0">
+                        <a:rPr lang="en-US" sz="900" spc="0">
                           <a:solidFill>
                             <a:srgbClr val="020302"/>
                           </a:solidFill>
@@ -5121,7 +5179,7 @@
                         </a:rPr>
                         <a:t>Named Support Contacts (per product)</a:t>
                       </a:r>
-                      <a:endParaRPr sz="900" spc="0" dirty="0">
+                      <a:endParaRPr sz="900" spc="0">
                         <a:latin typeface="AdobeClean-Light"/>
                         <a:cs typeface="AdobeClean-Light"/>
                       </a:endParaRPr>
@@ -5162,7 +5220,7 @@
                         </a:spcBef>
                       </a:pPr>
                       <a:r>
-                        <a:rPr sz="900" dirty="0">
+                        <a:rPr sz="900">
                           <a:solidFill>
                             <a:srgbClr val="020302"/>
                           </a:solidFill>
@@ -5171,7 +5229,7 @@
                         </a:rPr>
                         <a:t>4</a:t>
                       </a:r>
-                      <a:endParaRPr sz="900" dirty="0">
+                      <a:endParaRPr sz="900">
                         <a:latin typeface="AdobeClean-Light"/>
                         <a:cs typeface="AdobeClean-Light"/>
                       </a:endParaRPr>
@@ -5204,7 +5262,7 @@
                         </a:spcBef>
                       </a:pPr>
                       <a:r>
-                        <a:rPr sz="900" dirty="0">
+                        <a:rPr sz="900">
                           <a:solidFill>
                             <a:srgbClr val="020302"/>
                           </a:solidFill>
@@ -5213,7 +5271,7 @@
                         </a:rPr>
                         <a:t>6</a:t>
                       </a:r>
-                      <a:endParaRPr sz="900" dirty="0">
+                      <a:endParaRPr sz="900">
                         <a:latin typeface="AdobeClean-Light"/>
                         <a:cs typeface="AdobeClean-Light"/>
                       </a:endParaRPr>
@@ -5247,7 +5305,7 @@
                           <a:spcPts val="455"/>
                         </a:spcBef>
                       </a:pPr>
-                      <a:endParaRPr sz="900" dirty="0">
+                      <a:endParaRPr sz="900">
                         <a:latin typeface="AdobeClean-Light"/>
                         <a:cs typeface="AdobeClean-Light"/>
                       </a:endParaRPr>
@@ -5288,7 +5346,7 @@
                         </a:spcBef>
                       </a:pPr>
                       <a:r>
-                        <a:rPr lang="en-US" sz="900" spc="0" dirty="0">
+                        <a:rPr lang="en-US" sz="900" spc="0">
                           <a:solidFill>
                             <a:srgbClr val="020302"/>
                           </a:solidFill>
@@ -5297,7 +5355,7 @@
                         </a:rPr>
                         <a:t>Live Telephone Support</a:t>
                       </a:r>
-                      <a:endParaRPr sz="900" spc="0" dirty="0">
+                      <a:endParaRPr sz="900" spc="0">
                         <a:latin typeface="AdobeClean-Light"/>
                         <a:cs typeface="AdobeClean-Light"/>
                       </a:endParaRPr>
@@ -5331,7 +5389,7 @@
                           <a:spcPts val="464"/>
                         </a:spcBef>
                       </a:pPr>
-                      <a:endParaRPr sz="900" dirty="0">
+                      <a:endParaRPr sz="900">
                         <a:latin typeface="Wingdings"/>
                         <a:cs typeface="Wingdings"/>
                       </a:endParaRPr>
@@ -5364,7 +5422,7 @@
                         </a:spcBef>
                       </a:pPr>
                       <a:r>
-                        <a:rPr sz="900" dirty="0">
+                        <a:rPr sz="900">
                           <a:solidFill>
                             <a:srgbClr val="020302"/>
                           </a:solidFill>
@@ -5373,7 +5431,7 @@
                         </a:rPr>
                         <a:t></a:t>
                       </a:r>
-                      <a:endParaRPr sz="900" dirty="0">
+                      <a:endParaRPr sz="900">
                         <a:latin typeface="Wingdings"/>
                         <a:cs typeface="Wingdings"/>
                       </a:endParaRPr>
@@ -5407,7 +5465,7 @@
                           <a:spcPts val="459"/>
                         </a:spcBef>
                       </a:pPr>
-                      <a:endParaRPr sz="900" dirty="0">
+                      <a:endParaRPr sz="900">
                         <a:latin typeface="AdobeClean-Light"/>
                         <a:cs typeface="AdobeClean-Light"/>
                       </a:endParaRPr>
@@ -5448,7 +5506,7 @@
                         </a:spcBef>
                       </a:pPr>
                       <a:r>
-                        <a:rPr sz="900" spc="0" dirty="0">
+                        <a:rPr sz="900" spc="0">
                           <a:solidFill>
                             <a:srgbClr val="020302"/>
                           </a:solidFill>
@@ -5457,7 +5515,7 @@
                         </a:rPr>
                         <a:t>Escalation Management</a:t>
                       </a:r>
-                      <a:endParaRPr sz="900" spc="0" dirty="0">
+                      <a:endParaRPr sz="900" spc="0">
                         <a:latin typeface="AdobeClean-Light"/>
                         <a:cs typeface="AdobeClean-Light"/>
                       </a:endParaRPr>
@@ -5491,7 +5549,7 @@
                           <a:spcPts val="470"/>
                         </a:spcBef>
                       </a:pPr>
-                      <a:endParaRPr sz="900" dirty="0">
+                      <a:endParaRPr sz="900">
                         <a:latin typeface="Wingdings"/>
                         <a:cs typeface="Wingdings"/>
                       </a:endParaRPr>
@@ -5524,7 +5582,7 @@
                         </a:spcBef>
                       </a:pPr>
                       <a:r>
-                        <a:rPr sz="900" dirty="0">
+                        <a:rPr sz="900">
                           <a:solidFill>
                             <a:srgbClr val="020302"/>
                           </a:solidFill>
@@ -5533,7 +5591,7 @@
                         </a:rPr>
                         <a:t></a:t>
                       </a:r>
-                      <a:endParaRPr sz="900" dirty="0">
+                      <a:endParaRPr sz="900">
                         <a:latin typeface="Wingdings"/>
                         <a:cs typeface="Wingdings"/>
                       </a:endParaRPr>
@@ -5567,7 +5625,7 @@
                           <a:spcPts val="450"/>
                         </a:spcBef>
                       </a:pPr>
-                      <a:endParaRPr sz="900" dirty="0">
+                      <a:endParaRPr sz="900">
                         <a:latin typeface="AdobeClean-Light"/>
                         <a:cs typeface="AdobeClean-Light"/>
                       </a:endParaRPr>
@@ -5608,7 +5666,7 @@
                         </a:spcBef>
                       </a:pPr>
                       <a:r>
-                        <a:rPr sz="900" spc="0" dirty="0">
+                        <a:rPr sz="900" spc="0">
                           <a:solidFill>
                             <a:srgbClr val="020302"/>
                           </a:solidFill>
@@ -5618,7 +5676,7 @@
                         <a:t>Service Reviews </a:t>
                       </a:r>
                       <a:r>
-                        <a:rPr lang="en-US" sz="900" spc="0" dirty="0">
+                        <a:rPr lang="en-US" sz="900" spc="0">
                           <a:solidFill>
                             <a:srgbClr val="020302"/>
                           </a:solidFill>
@@ -5627,7 +5685,7 @@
                         </a:rPr>
                         <a:t>per Year</a:t>
                       </a:r>
-                      <a:endParaRPr sz="900" spc="0" dirty="0">
+                      <a:endParaRPr sz="900" spc="0">
                         <a:latin typeface="AdobeClean-Light"/>
                         <a:cs typeface="AdobeClean-Light"/>
                       </a:endParaRPr>
@@ -5658,7 +5716,7 @@
                           <a:spcPct val="100000"/>
                         </a:lnSpc>
                       </a:pPr>
-                      <a:endParaRPr sz="900" dirty="0">
+                      <a:endParaRPr sz="900">
                         <a:latin typeface="Times New Roman"/>
                         <a:cs typeface="Times New Roman"/>
                       </a:endParaRPr>
@@ -5687,7 +5745,7 @@
                           <a:spcPct val="100000"/>
                         </a:lnSpc>
                       </a:pPr>
-                      <a:endParaRPr sz="900" dirty="0">
+                      <a:endParaRPr sz="900">
                         <a:latin typeface="Times New Roman"/>
                         <a:cs typeface="Times New Roman"/>
                       </a:endParaRPr>
@@ -5732,13 +5790,13 @@
                         </a:spcBef>
                       </a:pPr>
                       <a:r>
-                        <a:rPr lang="en-US" sz="900" spc="0" dirty="0">
+                        <a:rPr lang="en-US" sz="900" spc="0">
                           <a:latin typeface="AdobeClean-Light"/>
                           <a:cs typeface="AdobeClean-Light"/>
                         </a:rPr>
                         <a:t>Expert Sessions per Year</a:t>
                       </a:r>
-                      <a:endParaRPr sz="900" spc="0" dirty="0">
+                      <a:endParaRPr sz="900" spc="0">
                         <a:latin typeface="AdobeClean-Light"/>
                         <a:cs typeface="AdobeClean-Light"/>
                       </a:endParaRPr>
@@ -5775,7 +5833,7 @@
                           <a:spcPct val="100000"/>
                         </a:lnSpc>
                       </a:pPr>
-                      <a:endParaRPr sz="900" dirty="0">
+                      <a:endParaRPr sz="900">
                         <a:latin typeface="Times New Roman"/>
                         <a:cs typeface="Times New Roman"/>
                       </a:endParaRPr>
@@ -5804,7 +5862,7 @@
                           <a:spcPct val="100000"/>
                         </a:lnSpc>
                       </a:pPr>
-                      <a:endParaRPr sz="900" dirty="0">
+                      <a:endParaRPr sz="900">
                         <a:latin typeface="Times New Roman"/>
                         <a:cs typeface="Times New Roman"/>
                       </a:endParaRPr>
@@ -5849,13 +5907,13 @@
                         </a:spcBef>
                       </a:pPr>
                       <a:r>
-                        <a:rPr lang="en-US" sz="900" spc="0" dirty="0">
+                        <a:rPr lang="en-US" sz="900" spc="0">
                           <a:latin typeface="AdobeClean-Light"/>
                           <a:cs typeface="AdobeClean-Light"/>
                         </a:rPr>
                         <a:t>Case Reviews</a:t>
                       </a:r>
-                      <a:endParaRPr sz="900" spc="0" dirty="0">
+                      <a:endParaRPr sz="900" spc="0">
                         <a:latin typeface="AdobeClean-Light"/>
                         <a:cs typeface="AdobeClean-Light"/>
                       </a:endParaRPr>
@@ -5892,7 +5950,7 @@
                           <a:spcPct val="100000"/>
                         </a:lnSpc>
                       </a:pPr>
-                      <a:endParaRPr sz="900" dirty="0">
+                      <a:endParaRPr sz="900">
                         <a:latin typeface="Times New Roman"/>
                         <a:cs typeface="Times New Roman"/>
                       </a:endParaRPr>
@@ -5921,7 +5979,7 @@
                           <a:spcPct val="100000"/>
                         </a:lnSpc>
                       </a:pPr>
-                      <a:endParaRPr sz="900" dirty="0">
+                      <a:endParaRPr sz="900">
                         <a:latin typeface="Times New Roman"/>
                         <a:cs typeface="Times New Roman"/>
                       </a:endParaRPr>
@@ -5955,7 +6013,7 @@
                           <a:spcPts val="459"/>
                         </a:spcBef>
                       </a:pPr>
-                      <a:endParaRPr sz="900" dirty="0">
+                      <a:endParaRPr sz="900">
                         <a:latin typeface="AdobeClean-Light"/>
                         <a:cs typeface="AdobeClean-Light"/>
                       </a:endParaRPr>
@@ -6005,7 +6063,7 @@
                         </a:spcBef>
                       </a:pPr>
                       <a:r>
-                        <a:rPr sz="900" spc="0" dirty="0">
+                        <a:rPr sz="900" spc="0">
                           <a:solidFill>
                             <a:srgbClr val="020302"/>
                           </a:solidFill>
@@ -6015,7 +6073,7 @@
                         <a:t>Event </a:t>
                       </a:r>
                       <a:r>
-                        <a:rPr lang="en-US" sz="900" spc="0" dirty="0">
+                        <a:rPr lang="en-US" sz="900" spc="0">
                           <a:solidFill>
                             <a:srgbClr val="020302"/>
                           </a:solidFill>
@@ -6024,7 +6082,7 @@
                         </a:rPr>
                         <a:t>Management</a:t>
                       </a:r>
-                      <a:endParaRPr sz="900" spc="0" dirty="0">
+                      <a:endParaRPr sz="900" spc="0">
                         <a:latin typeface="AdobeClean-Light"/>
                         <a:cs typeface="AdobeClean-Light"/>
                       </a:endParaRPr>
@@ -6061,7 +6119,7 @@
                           <a:spcPct val="100000"/>
                         </a:lnSpc>
                       </a:pPr>
-                      <a:endParaRPr sz="900" dirty="0">
+                      <a:endParaRPr sz="900">
                         <a:latin typeface="Times New Roman"/>
                         <a:cs typeface="Times New Roman"/>
                       </a:endParaRPr>
@@ -6090,7 +6148,7 @@
                           <a:spcPct val="100000"/>
                         </a:lnSpc>
                       </a:pPr>
-                      <a:endParaRPr sz="900" dirty="0">
+                      <a:endParaRPr sz="900">
                         <a:latin typeface="Times New Roman"/>
                         <a:cs typeface="Times New Roman"/>
                       </a:endParaRPr>
@@ -6124,7 +6182,7 @@
                           <a:spcPts val="465"/>
                         </a:spcBef>
                       </a:pPr>
-                      <a:endParaRPr sz="900" dirty="0">
+                      <a:endParaRPr sz="900">
                         <a:latin typeface="AdobeClean-Light"/>
                         <a:cs typeface="AdobeClean-Light"/>
                       </a:endParaRPr>
@@ -6165,7 +6223,7 @@
                         </a:spcBef>
                       </a:pPr>
                       <a:r>
-                        <a:rPr sz="900" spc="0" dirty="0">
+                        <a:rPr sz="900" spc="0">
                           <a:solidFill>
                             <a:srgbClr val="020302"/>
                           </a:solidFill>
@@ -6175,7 +6233,7 @@
                         <a:t>Environment</a:t>
                       </a:r>
                       <a:r>
-                        <a:rPr lang="en-US" sz="900" spc="0" dirty="0">
+                        <a:rPr lang="en-US" sz="900" spc="0">
                           <a:solidFill>
                             <a:srgbClr val="020302"/>
                           </a:solidFill>
@@ -6185,7 +6243,7 @@
                         <a:t> </a:t>
                       </a:r>
                       <a:r>
-                        <a:rPr sz="900" spc="0" dirty="0">
+                        <a:rPr sz="900" spc="0">
                           <a:solidFill>
                             <a:srgbClr val="020302"/>
                           </a:solidFill>
@@ -6194,7 +6252,7 @@
                         </a:rPr>
                         <a:t>Review, Maintenance &amp; Monitoring</a:t>
                       </a:r>
-                      <a:endParaRPr sz="900" spc="0" dirty="0">
+                      <a:endParaRPr sz="900" spc="0">
                         <a:latin typeface="AdobeClean-Light"/>
                         <a:cs typeface="AdobeClean-Light"/>
                       </a:endParaRPr>
@@ -6225,7 +6283,7 @@
                           <a:spcPct val="100000"/>
                         </a:lnSpc>
                       </a:pPr>
-                      <a:endParaRPr sz="900" dirty="0">
+                      <a:endParaRPr sz="900">
                         <a:latin typeface="Times New Roman"/>
                         <a:cs typeface="Times New Roman"/>
                       </a:endParaRPr>
@@ -6254,7 +6312,7 @@
                           <a:spcPct val="100000"/>
                         </a:lnSpc>
                       </a:pPr>
-                      <a:endParaRPr sz="900" dirty="0">
+                      <a:endParaRPr sz="900">
                         <a:latin typeface="Times New Roman"/>
                         <a:cs typeface="Times New Roman"/>
                       </a:endParaRPr>
@@ -6288,7 +6346,7 @@
                           <a:spcPts val="500"/>
                         </a:spcBef>
                       </a:pPr>
-                      <a:endParaRPr sz="900" dirty="0">
+                      <a:endParaRPr sz="900">
                         <a:latin typeface="AdobeClean-Light"/>
                         <a:cs typeface="AdobeClean-Light"/>
                       </a:endParaRPr>
@@ -6329,7 +6387,7 @@
                         </a:spcBef>
                       </a:pPr>
                       <a:r>
-                        <a:rPr sz="900" spc="0" dirty="0">
+                        <a:rPr sz="900" spc="0">
                           <a:solidFill>
                             <a:srgbClr val="020302"/>
                           </a:solidFill>
@@ -6338,7 +6396,7 @@
                         </a:rPr>
                         <a:t>Release, Migration, Upgrade &amp; Product Roadmap Review</a:t>
                       </a:r>
-                      <a:endParaRPr sz="900" spc="0" dirty="0">
+                      <a:endParaRPr sz="900" spc="0">
                         <a:latin typeface="AdobeClean-Light"/>
                         <a:cs typeface="AdobeClean-Light"/>
                       </a:endParaRPr>
@@ -6369,7 +6427,7 @@
                           <a:spcPct val="100000"/>
                         </a:lnSpc>
                       </a:pPr>
-                      <a:endParaRPr sz="900" dirty="0">
+                      <a:endParaRPr sz="900">
                         <a:latin typeface="Times New Roman"/>
                         <a:cs typeface="Times New Roman"/>
                       </a:endParaRPr>
@@ -6398,7 +6456,7 @@
                           <a:spcPct val="100000"/>
                         </a:lnSpc>
                       </a:pPr>
-                      <a:endParaRPr sz="900" dirty="0">
+                      <a:endParaRPr sz="900">
                         <a:latin typeface="Times New Roman"/>
                         <a:cs typeface="Times New Roman"/>
                       </a:endParaRPr>
@@ -6432,7 +6490,7 @@
                           <a:spcPts val="530"/>
                         </a:spcBef>
                       </a:pPr>
-                      <a:endParaRPr sz="900" dirty="0">
+                      <a:endParaRPr sz="900">
                         <a:latin typeface="AdobeClean-Light"/>
                         <a:cs typeface="AdobeClean-Light"/>
                       </a:endParaRPr>
@@ -6482,7 +6540,7 @@
                         </a:spcBef>
                       </a:pPr>
                       <a:r>
-                        <a:rPr sz="900" spc="0" dirty="0">
+                        <a:rPr sz="900" spc="0">
                           <a:latin typeface="AdobeClean-Light"/>
                           <a:cs typeface="AdobeClean-Light"/>
                         </a:rPr>
@@ -6521,7 +6579,7 @@
                           <a:spcPct val="100000"/>
                         </a:lnSpc>
                       </a:pPr>
-                      <a:endParaRPr sz="900" dirty="0">
+                      <a:endParaRPr sz="900">
                         <a:latin typeface="Times New Roman"/>
                         <a:cs typeface="Times New Roman"/>
                       </a:endParaRPr>
@@ -6559,7 +6617,7 @@
                           <a:spcPct val="100000"/>
                         </a:lnSpc>
                       </a:pPr>
-                      <a:endParaRPr sz="900" dirty="0">
+                      <a:endParaRPr sz="900">
                         <a:latin typeface="Times New Roman"/>
                         <a:cs typeface="Times New Roman"/>
                       </a:endParaRPr>
@@ -6603,7 +6661,7 @@
                         </a:spcBef>
                       </a:pPr>
                       <a:r>
-                        <a:rPr lang="en-US" sz="1000" b="1" i="0" spc="0" dirty="0">
+                        <a:rPr lang="en-US" sz="1000" b="1" i="0" spc="0">
                           <a:solidFill>
                             <a:schemeClr val="bg1"/>
                           </a:solidFill>
@@ -6612,7 +6670,7 @@
                         </a:rPr>
                         <a:t>Field Services</a:t>
                       </a:r>
-                      <a:endParaRPr sz="1000" b="1" i="0" spc="0" dirty="0">
+                      <a:endParaRPr sz="1000" b="1" i="0" spc="0">
                         <a:solidFill>
                           <a:schemeClr val="bg1"/>
                         </a:solidFill>
@@ -6671,7 +6729,7 @@
                         </a:spcBef>
                       </a:pPr>
                       <a:r>
-                        <a:rPr sz="900" spc="0" dirty="0">
+                        <a:rPr sz="900" spc="0">
                           <a:solidFill>
                             <a:srgbClr val="020302"/>
                           </a:solidFill>
@@ -6680,7 +6738,7 @@
                         </a:rPr>
                         <a:t>Launch Advisory Services – First Year of new solution</a:t>
                       </a:r>
-                      <a:endParaRPr sz="900" spc="0" dirty="0">
+                      <a:endParaRPr sz="900" spc="0">
                         <a:latin typeface="AdobeClean-Light"/>
                         <a:cs typeface="AdobeClean-Light"/>
                       </a:endParaRPr>
@@ -6695,7 +6753,7 @@
                         </a:spcBef>
                       </a:pPr>
                       <a:r>
-                        <a:rPr sz="900" spc="0" dirty="0">
+                        <a:rPr sz="900" spc="0">
                           <a:latin typeface="AdobeClean-Light"/>
                           <a:cs typeface="AdobeClean-Light"/>
                         </a:rPr>
@@ -6740,7 +6798,7 @@
                           <a:spcPct val="100000"/>
                         </a:lnSpc>
                       </a:pPr>
-                      <a:endParaRPr sz="900" dirty="0">
+                      <a:endParaRPr sz="900">
                         <a:latin typeface="Times New Roman"/>
                         <a:cs typeface="Times New Roman"/>
                       </a:endParaRPr>
@@ -6778,7 +6836,7 @@
                           <a:spcPct val="100000"/>
                         </a:lnSpc>
                       </a:pPr>
-                      <a:endParaRPr sz="900" dirty="0">
+                      <a:endParaRPr sz="900">
                         <a:latin typeface="Times New Roman"/>
                         <a:cs typeface="Times New Roman"/>
                       </a:endParaRPr>
@@ -6863,7 +6921,7 @@
                           <a:spcPct val="100000"/>
                         </a:lnSpc>
                       </a:pPr>
-                      <a:endParaRPr sz="900" dirty="0">
+                      <a:endParaRPr sz="900">
                         <a:latin typeface="Times New Roman"/>
                         <a:cs typeface="Times New Roman"/>
                       </a:endParaRPr>
@@ -6889,7 +6947,7 @@
                           <a:spcPct val="100000"/>
                         </a:lnSpc>
                       </a:pPr>
-                      <a:endParaRPr sz="900" dirty="0">
+                      <a:endParaRPr sz="900">
                         <a:latin typeface="Times New Roman"/>
                         <a:cs typeface="Times New Roman"/>
                       </a:endParaRPr>
@@ -6948,7 +7006,7 @@
           <a:lstStyle/>
           <a:p>
             <a:r>
-              <a:rPr lang="en-US" sz="700" i="1" dirty="0">
+              <a:rPr lang="en-US" sz="700" i="1">
                 <a:solidFill>
                   <a:schemeClr val="bg1"/>
                 </a:solidFill>
@@ -7151,7 +7209,7 @@
               </a:spcBef>
             </a:pPr>
             <a:r>
-              <a:rPr lang="en-US" sz="1000" dirty="0">
+              <a:rPr lang="en-US" sz="1000">
                 <a:solidFill>
                   <a:srgbClr val="000000"/>
                 </a:solidFill>
@@ -7159,7 +7217,7 @@
               </a:rPr>
               <a:t>A designated Account Support Lead to proactively monitor cases, drive cross-team collaboration, deliver onboarding webinars, run service reports, provide non-technical support assistance, and function as your escalation point and internal advocate within Adobe Support.</a:t>
             </a:r>
-            <a:endParaRPr lang="en-US" sz="1000" dirty="0">
+            <a:endParaRPr lang="en-US" sz="1000">
               <a:latin typeface="Adobe Clean Light" panose="020B0303020404020204" pitchFamily="34" charset="0"/>
               <a:cs typeface="AdobeClean-Light"/>
             </a:endParaRPr>
@@ -7199,7 +7257,7 @@
               </a:tabLst>
             </a:pPr>
             <a:r>
-              <a:rPr sz="1000" dirty="0">
+              <a:rPr sz="1000">
                 <a:solidFill>
                   <a:srgbClr val="020302"/>
                 </a:solidFill>
@@ -7209,7 +7267,7 @@
               <a:t>Start a chat session to get answers</a:t>
             </a:r>
             <a:r>
-              <a:rPr lang="en-US" sz="1000" dirty="0">
+              <a:rPr lang="en-US" sz="1000">
                 <a:solidFill>
                   <a:srgbClr val="020302"/>
                 </a:solidFill>
@@ -7219,7 +7277,7 @@
               <a:t> &amp; </a:t>
             </a:r>
             <a:r>
-              <a:rPr sz="1000" dirty="0">
+              <a:rPr sz="1000">
                 <a:solidFill>
                   <a:srgbClr val="020302"/>
                 </a:solidFill>
@@ -7228,7 +7286,7 @@
               </a:rPr>
               <a:t>help with case submission</a:t>
             </a:r>
-            <a:endParaRPr lang="en-US" sz="1000" dirty="0">
+            <a:endParaRPr lang="en-US" sz="1000">
               <a:solidFill>
                 <a:srgbClr val="020302"/>
               </a:solidFill>
@@ -7249,7 +7307,7 @@
               </a:tabLst>
             </a:pPr>
             <a:r>
-              <a:rPr sz="1000" i="1" dirty="0">
+              <a:rPr sz="1000" i="1">
                 <a:solidFill>
                   <a:srgbClr val="7A7A7A"/>
                 </a:solidFill>
@@ -7259,7 +7317,7 @@
               <a:t>*Not all products have live chat support</a:t>
             </a:r>
             <a:r>
-              <a:rPr sz="900" i="1" dirty="0">
+              <a:rPr sz="900" i="1">
                 <a:solidFill>
                   <a:srgbClr val="7A7A7A"/>
                 </a:solidFill>
@@ -7268,7 +7326,7 @@
               </a:rPr>
               <a:t>.  </a:t>
             </a:r>
-            <a:endParaRPr sz="900" dirty="0">
+            <a:endParaRPr sz="900">
               <a:latin typeface="AdobeClean-Light"/>
               <a:cs typeface="AdobeClean-Light"/>
             </a:endParaRPr>
@@ -7347,7 +7405,7 @@
               <a:defRPr/>
             </a:pPr>
             <a:r>
-              <a:rPr lang="en-US" sz="1200" dirty="0">
+              <a:rPr lang="en-US" sz="1200">
                 <a:solidFill>
                   <a:srgbClr val="000000"/>
                 </a:solidFill>
@@ -7395,7 +7453,7 @@
               </a:spcAft>
             </a:pPr>
             <a:r>
-              <a:rPr lang="en-US" sz="1200" b="1" dirty="0">
+              <a:rPr lang="en-US" sz="1200" b="1">
                 <a:latin typeface="+mj-lt"/>
                 <a:ea typeface="Open Sans" pitchFamily="34" charset="0"/>
                 <a:cs typeface="Open Sans" pitchFamily="34" charset="0"/>
@@ -7433,7 +7491,7 @@
           <a:lstStyle/>
           <a:p>
             <a:r>
-              <a:rPr lang="en-US" sz="1000" dirty="0">
+              <a:rPr lang="en-US" sz="1000">
                 <a:solidFill>
                   <a:srgbClr val="000000"/>
                 </a:solidFill>
@@ -7482,7 +7540,7 @@
               </a:spcAft>
             </a:pPr>
             <a:r>
-              <a:rPr lang="en-US" sz="1200" b="1" dirty="0">
+              <a:rPr lang="en-US" sz="1200" b="1">
                 <a:latin typeface="+mj-lt"/>
                 <a:ea typeface="Open Sans" pitchFamily="34" charset="0"/>
                 <a:cs typeface="Open Sans" pitchFamily="34" charset="0"/>
@@ -7520,7 +7578,7 @@
           <a:lstStyle/>
           <a:p>
             <a:r>
-              <a:rPr lang="en-US" sz="1000" dirty="0">
+              <a:rPr lang="en-US" sz="1000">
                 <a:solidFill>
                   <a:srgbClr val="000000"/>
                 </a:solidFill>
@@ -7574,7 +7632,7 @@
               <a:defRPr/>
             </a:pPr>
             <a:r>
-              <a:rPr lang="en-US" sz="1200" dirty="0">
+              <a:rPr lang="en-US" sz="1200">
                 <a:solidFill>
                   <a:srgbClr val="000000"/>
                 </a:solidFill>
@@ -7622,7 +7680,7 @@
               </a:spcAft>
             </a:pPr>
             <a:r>
-              <a:rPr lang="en-US" sz="1200" b="1" dirty="0">
+              <a:rPr lang="en-US" sz="1200" b="1">
                 <a:latin typeface="+mj-lt"/>
                 <a:ea typeface="Open Sans" pitchFamily="34" charset="0"/>
                 <a:cs typeface="Open Sans" pitchFamily="34" charset="0"/>
@@ -7675,7 +7733,7 @@
               <a:defRPr/>
             </a:pPr>
             <a:r>
-              <a:rPr lang="en-US" sz="1200" dirty="0">
+              <a:rPr lang="en-US" sz="1200">
                 <a:solidFill>
                   <a:srgbClr val="000000"/>
                 </a:solidFill>
@@ -7723,7 +7781,7 @@
               </a:spcAft>
             </a:pPr>
             <a:r>
-              <a:rPr lang="en-US" sz="1200" b="1" dirty="0">
+              <a:rPr lang="en-US" sz="1200" b="1">
                 <a:latin typeface="+mj-lt"/>
                 <a:ea typeface="Open Sans" pitchFamily="34" charset="0"/>
                 <a:cs typeface="Open Sans" pitchFamily="34" charset="0"/>
@@ -7761,7 +7819,7 @@
           <a:lstStyle/>
           <a:p>
             <a:r>
-              <a:rPr lang="en-US" sz="1000" dirty="0">
+              <a:rPr lang="en-US" sz="1000">
                 <a:solidFill>
                   <a:srgbClr val="020302"/>
                 </a:solidFill>
@@ -7770,12 +7828,12 @@
               <a:t>Authorized users or Named Support Contacts </a:t>
             </a:r>
             <a:r>
-              <a:rPr lang="en-US" sz="1000" dirty="0">
+              <a:rPr lang="en-US" sz="1000">
                 <a:latin typeface="Adobe Clean Light" panose="020B0303020404020204" pitchFamily="34" charset="0"/>
               </a:rPr>
               <a:t>can submit issues through all available  channels (including phone for P1) and interact with our technical support team on behalf of your company. </a:t>
             </a:r>
-            <a:endParaRPr lang="en-US" sz="1000" dirty="0">
+            <a:endParaRPr lang="en-US" sz="1000">
               <a:solidFill>
                 <a:srgbClr val="000000"/>
               </a:solidFill>
@@ -7824,23 +7882,23 @@
               </a:spcBef>
             </a:pPr>
             <a:r>
-              <a:rPr spc="-5" dirty="0"/>
+              <a:rPr spc="-5"/>
               <a:t>©202</a:t>
             </a:r>
             <a:r>
-              <a:rPr lang="en-US" spc="-5" dirty="0"/>
+              <a:rPr lang="en-US" spc="-5"/>
               <a:t>1</a:t>
             </a:r>
             <a:r>
-              <a:rPr spc="-5" dirty="0"/>
+              <a:rPr spc="-5"/>
               <a:t> Adobe. All Rights Reserved. Adobe</a:t>
             </a:r>
             <a:r>
-              <a:rPr spc="60" dirty="0"/>
+              <a:rPr spc="60"/>
               <a:t> </a:t>
             </a:r>
             <a:r>
-              <a:rPr spc="-5" dirty="0"/>
+              <a:rPr spc="-5"/>
               <a:t>Confidential.</a:t>
             </a:r>
           </a:p>
@@ -7884,7 +7942,7 @@
               </a:spcAft>
             </a:pPr>
             <a:r>
-              <a:rPr lang="en-US" sz="1200" b="1" spc="-10" dirty="0">
+              <a:rPr lang="en-US" sz="1200" b="1" spc="-10">
                 <a:solidFill>
                   <a:srgbClr val="020302"/>
                 </a:solidFill>
@@ -7979,7 +8037,7 @@
               </a:spcBef>
             </a:pPr>
             <a:r>
-              <a:rPr lang="en-US" sz="1400" b="1" spc="-10" dirty="0">
+              <a:rPr lang="en-US" sz="1400" b="1" spc="-10">
                 <a:solidFill>
                   <a:srgbClr val="020302"/>
                 </a:solidFill>
@@ -7988,7 +8046,7 @@
               </a:rPr>
               <a:t>Online Support Features</a:t>
             </a:r>
-            <a:endParaRPr lang="en-US" sz="1400" dirty="0">
+            <a:endParaRPr lang="en-US" sz="1400">
               <a:latin typeface="Adobe Clean"/>
               <a:cs typeface="Adobe Clean"/>
             </a:endParaRPr>
@@ -8079,7 +8137,7 @@
               </a:spcBef>
             </a:pPr>
             <a:r>
-              <a:rPr lang="en-US" sz="1400" b="1" spc="-10" dirty="0">
+              <a:rPr lang="en-US" sz="1400" b="1" spc="-10">
                 <a:solidFill>
                   <a:srgbClr val="020302"/>
                 </a:solidFill>
@@ -8088,7 +8146,7 @@
               </a:rPr>
               <a:t>Business  Support Features</a:t>
             </a:r>
-            <a:endParaRPr lang="en-US" sz="1400" dirty="0">
+            <a:endParaRPr lang="en-US" sz="1400">
               <a:latin typeface="Adobe Clean"/>
               <a:cs typeface="Adobe Clean"/>
             </a:endParaRPr>
@@ -8131,12 +8189,12 @@
               </a:spcBef>
             </a:pPr>
             <a:r>
-              <a:rPr lang="en-US" sz="1000" dirty="0">
+              <a:rPr lang="en-US" sz="1000">
                 <a:latin typeface="Adobe Clean Light" panose="020B0303020404020204" pitchFamily="34" charset="0"/>
               </a:rPr>
               <a:t>Customers can submit support cases via Phone for all P2, P3, P4 issues during regional support hours. There are no upper limits on the number of times you can call into support. Customers can also request a call back from support or request a meeting to demonstrate or work through an issue using a shared remote desktop session.</a:t>
             </a:r>
-            <a:endParaRPr lang="en-US" sz="1000" dirty="0">
+            <a:endParaRPr lang="en-US" sz="1000">
               <a:latin typeface="Adobe Clean Light" panose="020B0303020404020204" pitchFamily="34" charset="0"/>
               <a:cs typeface="AdobeClean-Light"/>
             </a:endParaRPr>
@@ -8181,7 +8239,7 @@
               </a:spcAft>
             </a:pPr>
             <a:r>
-              <a:rPr lang="en-US" sz="1200" b="1" spc="-10" dirty="0">
+              <a:rPr lang="en-US" sz="1200" b="1" spc="-10">
                 <a:solidFill>
                   <a:srgbClr val="020302"/>
                 </a:solidFill>
@@ -8228,7 +8286,7 @@
               </a:spcBef>
             </a:pPr>
             <a:r>
-              <a:rPr lang="en-US" sz="1000" dirty="0">
+              <a:rPr lang="en-US" sz="1000">
                 <a:solidFill>
                   <a:srgbClr val="4B4B4B"/>
                 </a:solidFill>
@@ -8236,7 +8294,7 @@
               </a:rPr>
               <a:t>A designated point of contact within Adobe who can provide escalation assistance, regular updates and ensure priority is given to your most critical open support requests.</a:t>
             </a:r>
-            <a:endParaRPr lang="en-US" sz="1000" dirty="0">
+            <a:endParaRPr lang="en-US" sz="1000">
               <a:latin typeface="Adobe Clean Light" panose="020B0303020404020204" pitchFamily="34" charset="0"/>
               <a:cs typeface="AdobeClean-Light"/>
             </a:endParaRPr>
@@ -8281,7 +8339,7 @@
               </a:spcAft>
             </a:pPr>
             <a:r>
-              <a:rPr lang="en-US" sz="1200" b="1" spc="-10" dirty="0">
+              <a:rPr lang="en-US" sz="1200" b="1" spc="-10">
                 <a:solidFill>
                   <a:srgbClr val="020302"/>
                 </a:solidFill>
@@ -8335,7 +8393,7 @@
               <a:defRPr/>
             </a:pPr>
             <a:r>
-              <a:rPr lang="en-US" sz="1200" dirty="0">
+              <a:rPr lang="en-US" sz="1200">
                 <a:solidFill>
                   <a:srgbClr val="000000"/>
                 </a:solidFill>
@@ -8383,7 +8441,7 @@
               </a:spcAft>
             </a:pPr>
             <a:r>
-              <a:rPr lang="en-US" sz="1200" b="1" dirty="0">
+              <a:rPr lang="en-US" sz="1200" b="1">
                 <a:latin typeface="+mj-lt"/>
                 <a:ea typeface="Open Sans" pitchFamily="34" charset="0"/>
                 <a:cs typeface="Open Sans" pitchFamily="34" charset="0"/>
@@ -8421,7 +8479,7 @@
           <a:lstStyle/>
           <a:p>
             <a:r>
-              <a:rPr lang="en-US" sz="1000" dirty="0">
+              <a:rPr lang="en-US" sz="1000">
                 <a:solidFill>
                   <a:srgbClr val="000000"/>
                 </a:solidFill>
@@ -8470,7 +8528,7 @@
               </a:spcAft>
             </a:pPr>
             <a:r>
-              <a:rPr lang="en-US" sz="1200" b="1" dirty="0">
+              <a:rPr lang="en-US" sz="1200" b="1">
                 <a:latin typeface="+mj-lt"/>
                 <a:ea typeface="Open Sans" pitchFamily="34" charset="0"/>
                 <a:cs typeface="Open Sans" pitchFamily="34" charset="0"/>
@@ -8508,7 +8566,7 @@
           <a:lstStyle/>
           <a:p>
             <a:r>
-              <a:rPr lang="en-US" sz="1000" dirty="0">
+              <a:rPr lang="en-US" sz="1000">
                 <a:solidFill>
                   <a:srgbClr val="000000"/>
                 </a:solidFill>
@@ -8517,7 +8575,7 @@
               <a:t>On-demand access to the online </a:t>
             </a:r>
             <a:br>
-              <a:rPr lang="en-US" sz="1000" dirty="0">
+              <a:rPr lang="en-US" sz="1000">
                 <a:solidFill>
                   <a:srgbClr val="000000"/>
                 </a:solidFill>
@@ -8525,7 +8583,7 @@
               </a:rPr>
             </a:br>
             <a:r>
-              <a:rPr lang="en-US" sz="1000" dirty="0">
+              <a:rPr lang="en-US" sz="1000">
                 <a:solidFill>
                   <a:srgbClr val="000000"/>
                 </a:solidFill>
@@ -8643,7 +8701,7 @@
           <a:lstStyle/>
           <a:p>
             <a:r>
-              <a:rPr lang="en-US" sz="1200" b="1" dirty="0">
+              <a:rPr lang="en-US" sz="1200" b="1">
                 <a:latin typeface="+mj-lt"/>
               </a:rPr>
               <a:t>Business Services</a:t>
@@ -8687,12 +8745,12 @@
               </a:spcBef>
             </a:pPr>
             <a:r>
-              <a:rPr lang="en-US" sz="1000" dirty="0">
+              <a:rPr lang="en-US" sz="1000">
                 <a:latin typeface="Adobe Clean Light" panose="020B0303020404020204" pitchFamily="34" charset="0"/>
               </a:rPr>
               <a:t>An Account Support Lead will host webinars covering an overview of business support services.  </a:t>
             </a:r>
-            <a:endParaRPr lang="en-US" sz="1000" dirty="0">
+            <a:endParaRPr lang="en-US" sz="1000">
               <a:latin typeface="Adobe Clean Light" panose="020B0303020404020204" pitchFamily="34" charset="0"/>
               <a:cs typeface="AdobeClean-Light"/>
             </a:endParaRPr>
@@ -9164,7 +9222,7 @@
               <a:defRPr/>
             </a:pPr>
             <a:r>
-              <a:rPr lang="en-US" sz="1200" dirty="0">
+              <a:rPr lang="en-US" sz="1200">
                 <a:solidFill>
                   <a:srgbClr val="000000"/>
                 </a:solidFill>
@@ -9217,7 +9275,7 @@
               <a:defRPr/>
             </a:pPr>
             <a:r>
-              <a:rPr lang="en-US" sz="1200" dirty="0">
+              <a:rPr lang="en-US" sz="1200">
                 <a:solidFill>
                   <a:srgbClr val="000000"/>
                 </a:solidFill>
@@ -9279,7 +9337,7 @@
               </a:lnSpc>
             </a:pPr>
             <a:r>
-              <a:rPr sz="500" spc="-5" dirty="0">
+              <a:rPr sz="500" spc="-5">
                 <a:solidFill>
                   <a:srgbClr val="6C6C6C"/>
                 </a:solidFill>
@@ -9289,7 +9347,7 @@
               <a:t>©2020 Adobe. All Rights Reserved. </a:t>
             </a:r>
             <a:r>
-              <a:rPr sz="500" dirty="0">
+              <a:rPr sz="500">
                 <a:solidFill>
                   <a:srgbClr val="6C6C6C"/>
                 </a:solidFill>
@@ -9299,7 +9357,7 @@
               <a:t>Adobe</a:t>
             </a:r>
             <a:r>
-              <a:rPr sz="500" spc="5" dirty="0">
+              <a:rPr sz="500" spc="5">
                 <a:solidFill>
                   <a:srgbClr val="6C6C6C"/>
                 </a:solidFill>
@@ -9309,7 +9367,7 @@
               <a:t> </a:t>
             </a:r>
             <a:r>
-              <a:rPr sz="500" spc="-5" dirty="0">
+              <a:rPr sz="500" spc="-5">
                 <a:solidFill>
                   <a:srgbClr val="6C6C6C"/>
                 </a:solidFill>
@@ -9347,7 +9405,7 @@
               </a:spcBef>
             </a:pPr>
             <a:r>
-              <a:rPr sz="800" spc="-5" dirty="0">
+              <a:rPr sz="800" spc="-5">
                 <a:solidFill>
                   <a:srgbClr val="6D6D6D"/>
                 </a:solidFill>
@@ -9357,7 +9415,7 @@
               <a:t>©2020 Adobe. All Rights Reserved. Adobe</a:t>
             </a:r>
             <a:r>
-              <a:rPr sz="800" spc="75" dirty="0">
+              <a:rPr sz="800" spc="75">
                 <a:solidFill>
                   <a:srgbClr val="6D6D6D"/>
                 </a:solidFill>
@@ -9367,7 +9425,7 @@
               <a:t> </a:t>
             </a:r>
             <a:r>
-              <a:rPr sz="800" spc="-5" dirty="0">
+              <a:rPr sz="800" spc="-5">
                 <a:solidFill>
                   <a:srgbClr val="6D6D6D"/>
                 </a:solidFill>
@@ -9463,7 +9521,7 @@
               </a:spcBef>
             </a:pPr>
             <a:r>
-              <a:rPr lang="en-US" sz="1400" b="1" spc="-15" dirty="0">
+              <a:rPr lang="en-US" sz="1400" b="1" spc="-15">
                 <a:solidFill>
                   <a:srgbClr val="020302"/>
                 </a:solidFill>
@@ -9472,7 +9530,7 @@
               </a:rPr>
               <a:t>Resources</a:t>
             </a:r>
-            <a:endParaRPr sz="1400" dirty="0">
+            <a:endParaRPr sz="1400">
               <a:latin typeface="Adobe Clean"/>
               <a:cs typeface="Adobe Clean"/>
             </a:endParaRPr>
@@ -9509,7 +9567,7 @@
               </a:spcBef>
             </a:pPr>
             <a:r>
-              <a:rPr sz="800" spc="-15" dirty="0">
+              <a:rPr sz="800" spc="-15">
                 <a:solidFill>
                   <a:srgbClr val="777879"/>
                 </a:solidFill>
@@ -9530,7 +9588,7 @@
               </a:lnSpc>
             </a:pPr>
             <a:r>
-              <a:rPr sz="800" spc="-15" dirty="0">
+              <a:rPr sz="800" spc="-15">
                 <a:solidFill>
                   <a:srgbClr val="777879"/>
                 </a:solidFill>
@@ -9540,7 +9598,7 @@
               <a:t>345 Park</a:t>
             </a:r>
             <a:r>
-              <a:rPr sz="800" spc="-100" dirty="0">
+              <a:rPr sz="800" spc="-100">
                 <a:solidFill>
                   <a:srgbClr val="777879"/>
                 </a:solidFill>
@@ -9550,7 +9608,7 @@
               <a:t> </a:t>
             </a:r>
             <a:r>
-              <a:rPr sz="800" spc="-15" dirty="0">
+              <a:rPr sz="800" spc="-15">
                 <a:solidFill>
                   <a:srgbClr val="777879"/>
                 </a:solidFill>
@@ -9571,7 +9629,7 @@
               </a:lnSpc>
             </a:pPr>
             <a:r>
-              <a:rPr sz="800" spc="-10" dirty="0">
+              <a:rPr sz="800" spc="-10">
                 <a:solidFill>
                   <a:srgbClr val="777879"/>
                 </a:solidFill>
@@ -9581,7 +9639,7 @@
               <a:t>San </a:t>
             </a:r>
             <a:r>
-              <a:rPr sz="800" spc="-15" dirty="0">
+              <a:rPr sz="800" spc="-15">
                 <a:solidFill>
                   <a:srgbClr val="777879"/>
                 </a:solidFill>
@@ -9591,7 +9649,7 @@
               <a:t>Jose,</a:t>
             </a:r>
             <a:r>
-              <a:rPr sz="800" spc="-140" dirty="0">
+              <a:rPr sz="800" spc="-140">
                 <a:solidFill>
                   <a:srgbClr val="777879"/>
                 </a:solidFill>
@@ -9601,7 +9659,7 @@
               <a:t> </a:t>
             </a:r>
             <a:r>
-              <a:rPr sz="800" spc="-20" dirty="0">
+              <a:rPr sz="800" spc="-20">
                 <a:solidFill>
                   <a:srgbClr val="777879"/>
                 </a:solidFill>
@@ -9625,7 +9683,7 @@
               </a:spcBef>
             </a:pPr>
             <a:r>
-              <a:rPr sz="800" spc="-10" dirty="0">
+              <a:rPr sz="800" spc="-10">
                 <a:solidFill>
                   <a:srgbClr val="777879"/>
                 </a:solidFill>
@@ -9649,7 +9707,7 @@
               </a:spcBef>
             </a:pPr>
             <a:r>
-              <a:rPr sz="800" u="sng" spc="-25" dirty="0">
+              <a:rPr sz="800" u="sng" spc="-25">
                 <a:solidFill>
                   <a:srgbClr val="5F5F5F"/>
                 </a:solidFill>
@@ -9842,7 +9900,7 @@
               </a:spcBef>
             </a:pPr>
             <a:r>
-              <a:rPr sz="1100" i="1" spc="-10" dirty="0">
+              <a:rPr sz="1100" i="1" spc="-10">
                 <a:solidFill>
                   <a:srgbClr val="777879"/>
                 </a:solidFill>
@@ -9852,7 +9910,7 @@
               <a:t>To</a:t>
             </a:r>
             <a:r>
-              <a:rPr sz="1100" i="1" spc="-50" dirty="0">
+              <a:rPr sz="1100" i="1" spc="-50">
                 <a:solidFill>
                   <a:srgbClr val="777879"/>
                 </a:solidFill>
@@ -9862,7 +9920,7 @@
               <a:t> </a:t>
             </a:r>
             <a:r>
-              <a:rPr sz="1100" i="1" spc="-15" dirty="0">
+              <a:rPr sz="1100" i="1" spc="-15">
                 <a:solidFill>
                   <a:srgbClr val="777879"/>
                 </a:solidFill>
@@ -9872,7 +9930,7 @@
               <a:t>learn</a:t>
             </a:r>
             <a:r>
-              <a:rPr sz="1100" i="1" spc="-40" dirty="0">
+              <a:rPr sz="1100" i="1" spc="-40">
                 <a:solidFill>
                   <a:srgbClr val="777879"/>
                 </a:solidFill>
@@ -9882,7 +9940,7 @@
               <a:t> </a:t>
             </a:r>
             <a:r>
-              <a:rPr sz="1100" i="1" spc="-15" dirty="0">
+              <a:rPr sz="1100" i="1" spc="-15">
                 <a:solidFill>
                   <a:srgbClr val="777879"/>
                 </a:solidFill>
@@ -9892,7 +9950,7 @@
               <a:t>more</a:t>
             </a:r>
             <a:r>
-              <a:rPr sz="1100" i="1" spc="-45" dirty="0">
+              <a:rPr sz="1100" i="1" spc="-45">
                 <a:solidFill>
                   <a:srgbClr val="777879"/>
                 </a:solidFill>
@@ -9902,7 +9960,7 @@
               <a:t> </a:t>
             </a:r>
             <a:r>
-              <a:rPr sz="1100" i="1" spc="-15" dirty="0">
+              <a:rPr sz="1100" i="1" spc="-15">
                 <a:solidFill>
                   <a:srgbClr val="777879"/>
                 </a:solidFill>
@@ -9912,7 +9970,7 @@
               <a:t>about</a:t>
             </a:r>
             <a:r>
-              <a:rPr sz="1100" i="1" spc="-45" dirty="0">
+              <a:rPr sz="1100" i="1" spc="-45">
                 <a:solidFill>
                   <a:srgbClr val="777879"/>
                 </a:solidFill>
@@ -9922,7 +9980,7 @@
               <a:t> </a:t>
             </a:r>
             <a:r>
-              <a:rPr sz="1100" i="1" spc="-15" dirty="0">
+              <a:rPr sz="1100" i="1" spc="-15">
                 <a:solidFill>
                   <a:srgbClr val="777879"/>
                 </a:solidFill>
@@ -9932,7 +9990,7 @@
               <a:t>Adobe</a:t>
             </a:r>
             <a:r>
-              <a:rPr sz="1100" i="1" spc="-50" dirty="0">
+              <a:rPr sz="1100" i="1" spc="-50">
                 <a:solidFill>
                   <a:srgbClr val="777879"/>
                 </a:solidFill>
@@ -9942,7 +10000,7 @@
               <a:t> </a:t>
             </a:r>
             <a:r>
-              <a:rPr sz="1100" i="1" spc="-15" dirty="0">
+              <a:rPr sz="1100" i="1" spc="-15">
                 <a:solidFill>
                   <a:srgbClr val="777879"/>
                 </a:solidFill>
@@ -9952,7 +10010,7 @@
               <a:t>Support</a:t>
             </a:r>
             <a:r>
-              <a:rPr lang="en-US" sz="1100" i="1" spc="-15" dirty="0">
+              <a:rPr lang="en-US" sz="1100" i="1" spc="-15">
                 <a:solidFill>
                   <a:srgbClr val="777879"/>
                 </a:solidFill>
@@ -9962,7 +10020,7 @@
               <a:t> Offerings</a:t>
             </a:r>
             <a:r>
-              <a:rPr sz="1100" i="1" spc="-75" dirty="0">
+              <a:rPr sz="1100" i="1" spc="-75">
                 <a:solidFill>
                   <a:srgbClr val="777879"/>
                 </a:solidFill>
@@ -9972,7 +10030,7 @@
               <a:t> </a:t>
             </a:r>
             <a:r>
-              <a:rPr sz="1100" i="1" spc="-15" dirty="0">
+              <a:rPr sz="1100" i="1" spc="-15">
                 <a:solidFill>
                   <a:srgbClr val="777879"/>
                 </a:solidFill>
@@ -9982,7 +10040,7 @@
               <a:t>and</a:t>
             </a:r>
             <a:r>
-              <a:rPr sz="1100" i="1" spc="-50" dirty="0">
+              <a:rPr sz="1100" i="1" spc="-50">
                 <a:solidFill>
                   <a:srgbClr val="777879"/>
                 </a:solidFill>
@@ -9992,7 +10050,7 @@
               <a:t> </a:t>
             </a:r>
             <a:r>
-              <a:rPr sz="1100" i="1" spc="-15" dirty="0">
+              <a:rPr sz="1100" i="1" spc="-15">
                 <a:solidFill>
                   <a:srgbClr val="777879"/>
                 </a:solidFill>
@@ -10002,7 +10060,7 @@
               <a:t>the</a:t>
             </a:r>
             <a:r>
-              <a:rPr sz="1100" i="1" spc="-55" dirty="0">
+              <a:rPr sz="1100" i="1" spc="-55">
                 <a:solidFill>
                   <a:srgbClr val="777879"/>
                 </a:solidFill>
@@ -10012,7 +10070,7 @@
               <a:t> </a:t>
             </a:r>
             <a:r>
-              <a:rPr sz="1100" i="1" spc="-15" dirty="0">
+              <a:rPr sz="1100" i="1" spc="-15">
                 <a:solidFill>
                   <a:srgbClr val="777879"/>
                 </a:solidFill>
@@ -10022,7 +10080,7 @@
               <a:t>right</a:t>
             </a:r>
             <a:r>
-              <a:rPr sz="1100" i="1" spc="-95" dirty="0">
+              <a:rPr sz="1100" i="1" spc="-95">
                 <a:solidFill>
                   <a:srgbClr val="777879"/>
                 </a:solidFill>
@@ -10032,7 +10090,7 @@
               <a:t> </a:t>
             </a:r>
             <a:r>
-              <a:rPr sz="1100" i="1" spc="-15" dirty="0">
+              <a:rPr sz="1100" i="1" spc="-15">
                 <a:solidFill>
                   <a:srgbClr val="777879"/>
                 </a:solidFill>
@@ -10042,7 +10100,7 @@
               <a:t>level</a:t>
             </a:r>
             <a:r>
-              <a:rPr sz="1100" i="1" spc="-55" dirty="0">
+              <a:rPr sz="1100" i="1" spc="-55">
                 <a:solidFill>
                   <a:srgbClr val="777879"/>
                 </a:solidFill>
@@ -10052,7 +10110,7 @@
               <a:t> </a:t>
             </a:r>
             <a:r>
-              <a:rPr sz="1100" i="1" spc="-15" dirty="0">
+              <a:rPr sz="1100" i="1" spc="-15">
                 <a:solidFill>
                   <a:srgbClr val="777879"/>
                 </a:solidFill>
@@ -10062,7 +10120,7 @@
               <a:t>for</a:t>
             </a:r>
             <a:r>
-              <a:rPr sz="1100" i="1" spc="-85" dirty="0">
+              <a:rPr sz="1100" i="1" spc="-85">
                 <a:solidFill>
                   <a:srgbClr val="777879"/>
                 </a:solidFill>
@@ -10072,7 +10130,7 @@
               <a:t> </a:t>
             </a:r>
             <a:r>
-              <a:rPr sz="1100" i="1" spc="-15" dirty="0">
+              <a:rPr sz="1100" i="1" spc="-15">
                 <a:solidFill>
                   <a:srgbClr val="777879"/>
                 </a:solidFill>
@@ -10082,7 +10140,7 @@
               <a:t>you,</a:t>
             </a:r>
             <a:r>
-              <a:rPr sz="1100" i="1" spc="-65" dirty="0">
+              <a:rPr sz="1100" i="1" spc="-65">
                 <a:solidFill>
                   <a:srgbClr val="777879"/>
                 </a:solidFill>
@@ -10092,7 +10150,7 @@
               <a:t> </a:t>
             </a:r>
             <a:r>
-              <a:rPr sz="1100" i="1" spc="-15" dirty="0">
+              <a:rPr sz="1100" i="1" spc="-15">
                 <a:solidFill>
                   <a:srgbClr val="777879"/>
                 </a:solidFill>
@@ -10102,7 +10160,7 @@
               <a:t>contact</a:t>
             </a:r>
             <a:r>
-              <a:rPr sz="1100" i="1" spc="-85" dirty="0">
+              <a:rPr sz="1100" i="1" spc="-85">
                 <a:solidFill>
                   <a:srgbClr val="777879"/>
                 </a:solidFill>
@@ -10112,7 +10170,7 @@
               <a:t> </a:t>
             </a:r>
             <a:r>
-              <a:rPr sz="1100" i="1" spc="-15" dirty="0">
+              <a:rPr sz="1100" i="1" spc="-15">
                 <a:solidFill>
                   <a:srgbClr val="777879"/>
                 </a:solidFill>
@@ -10122,7 +10180,7 @@
               <a:t>your</a:t>
             </a:r>
             <a:r>
-              <a:rPr sz="1100" i="1" spc="-70" dirty="0">
+              <a:rPr sz="1100" i="1" spc="-70">
                 <a:solidFill>
                   <a:srgbClr val="777879"/>
                 </a:solidFill>
@@ -10132,7 +10190,7 @@
               <a:t> </a:t>
             </a:r>
             <a:r>
-              <a:rPr sz="1100" i="1" spc="-15" dirty="0">
+              <a:rPr sz="1100" i="1" spc="-15">
                 <a:solidFill>
                   <a:srgbClr val="777879"/>
                 </a:solidFill>
@@ -10142,7 +10200,7 @@
               <a:t>Named</a:t>
             </a:r>
             <a:r>
-              <a:rPr sz="1100" i="1" spc="-55" dirty="0">
+              <a:rPr sz="1100" i="1" spc="-55">
                 <a:solidFill>
                   <a:srgbClr val="777879"/>
                 </a:solidFill>
@@ -10152,7 +10210,7 @@
               <a:t> </a:t>
             </a:r>
             <a:r>
-              <a:rPr sz="1100" i="1" spc="-25" dirty="0">
+              <a:rPr sz="1100" i="1" spc="-25">
                 <a:solidFill>
                   <a:srgbClr val="777879"/>
                 </a:solidFill>
@@ -10162,7 +10220,7 @@
               <a:t>Account</a:t>
             </a:r>
             <a:r>
-              <a:rPr sz="1100" i="1" spc="-120" dirty="0">
+              <a:rPr sz="1100" i="1" spc="-120">
                 <a:solidFill>
                   <a:srgbClr val="777879"/>
                 </a:solidFill>
@@ -10172,7 +10230,7 @@
               <a:t> </a:t>
             </a:r>
             <a:r>
-              <a:rPr sz="1100" i="1" spc="-20" dirty="0">
+              <a:rPr sz="1100" i="1" spc="-20">
                 <a:solidFill>
                   <a:srgbClr val="777879"/>
                 </a:solidFill>
@@ -10182,7 +10240,7 @@
               <a:t>Manager  </a:t>
             </a:r>
             <a:r>
-              <a:rPr sz="1100" i="1" spc="-15" dirty="0">
+              <a:rPr sz="1100" i="1" spc="-15">
                 <a:solidFill>
                   <a:srgbClr val="777879"/>
                 </a:solidFill>
@@ -10192,7 +10250,7 @@
               <a:t>(NAM) </a:t>
             </a:r>
             <a:r>
-              <a:rPr sz="1100" i="1" spc="-10" dirty="0">
+              <a:rPr sz="1100" i="1" spc="-10">
                 <a:solidFill>
                   <a:srgbClr val="777879"/>
                 </a:solidFill>
@@ -10202,7 +10260,7 @@
               <a:t>or </a:t>
             </a:r>
             <a:r>
-              <a:rPr sz="1100" i="1" spc="-15" dirty="0">
+              <a:rPr sz="1100" i="1" spc="-15">
                 <a:solidFill>
                   <a:srgbClr val="777879"/>
                 </a:solidFill>
@@ -10212,7 +10270,7 @@
               <a:t>Customer </a:t>
             </a:r>
             <a:r>
-              <a:rPr sz="1100" i="1" spc="-20" dirty="0">
+              <a:rPr sz="1100" i="1" spc="-20">
                 <a:solidFill>
                   <a:srgbClr val="777879"/>
                 </a:solidFill>
@@ -10222,7 +10280,7 @@
               <a:t>Success</a:t>
             </a:r>
             <a:r>
-              <a:rPr sz="1100" i="1" spc="-180" dirty="0">
+              <a:rPr sz="1100" i="1" spc="-180">
                 <a:solidFill>
                   <a:srgbClr val="777879"/>
                 </a:solidFill>
@@ -10232,7 +10290,7 @@
               <a:t> </a:t>
             </a:r>
             <a:r>
-              <a:rPr sz="1100" i="1" spc="-15" dirty="0">
+              <a:rPr sz="1100" i="1" spc="-15">
                 <a:solidFill>
                   <a:srgbClr val="777879"/>
                 </a:solidFill>
@@ -10241,7 +10299,7 @@
               </a:rPr>
               <a:t>Manager(CSM)</a:t>
             </a:r>
-            <a:endParaRPr sz="1100" dirty="0">
+            <a:endParaRPr sz="1100">
               <a:latin typeface="AdobeClean-LightIt"/>
               <a:cs typeface="AdobeClean-LightIt"/>
             </a:endParaRPr>
@@ -10256,7 +10314,7 @@
               </a:spcBef>
             </a:pPr>
             <a:r>
-              <a:rPr sz="800" spc="-5" dirty="0">
+              <a:rPr sz="800" spc="-5">
                 <a:solidFill>
                   <a:srgbClr val="6D6D6D"/>
                 </a:solidFill>
@@ -10266,7 +10324,7 @@
               <a:t>©202</a:t>
             </a:r>
             <a:r>
-              <a:rPr lang="en-US" sz="800" spc="-5" dirty="0">
+              <a:rPr lang="en-US" sz="800" spc="-5">
                 <a:solidFill>
                   <a:srgbClr val="6D6D6D"/>
                 </a:solidFill>
@@ -10276,7 +10334,7 @@
               <a:t>1</a:t>
             </a:r>
             <a:r>
-              <a:rPr sz="800" spc="-5" dirty="0">
+              <a:rPr sz="800" spc="-5">
                 <a:solidFill>
                   <a:srgbClr val="6D6D6D"/>
                 </a:solidFill>
@@ -10286,7 +10344,7 @@
               <a:t> Adobe. All Rights Reserved. Adobe</a:t>
             </a:r>
             <a:r>
-              <a:rPr sz="800" spc="75" dirty="0">
+              <a:rPr sz="800" spc="75">
                 <a:solidFill>
                   <a:srgbClr val="6D6D6D"/>
                 </a:solidFill>
@@ -10296,7 +10354,7 @@
               <a:t> </a:t>
             </a:r>
             <a:r>
-              <a:rPr sz="800" spc="-5" dirty="0">
+              <a:rPr sz="800" spc="-5">
                 <a:solidFill>
                   <a:srgbClr val="6D6D6D"/>
                 </a:solidFill>
@@ -10305,7 +10363,7 @@
               </a:rPr>
               <a:t>Confidential.</a:t>
             </a:r>
-            <a:endParaRPr sz="800" dirty="0">
+            <a:endParaRPr sz="800">
               <a:latin typeface="Adobe Clean"/>
               <a:cs typeface="Adobe Clean"/>
             </a:endParaRPr>
@@ -10326,50 +10384,55 @@
         </p:nvSpPr>
         <p:spPr>
           <a:xfrm>
-            <a:off x="171129" y="5057379"/>
-            <a:ext cx="6476646" cy="602088"/>
+            <a:off x="197233" y="5031270"/>
+            <a:ext cx="6476646" cy="755976"/>
           </a:xfrm>
           <a:prstGeom prst="rect">
             <a:avLst/>
           </a:prstGeom>
         </p:spPr>
         <p:txBody>
-          <a:bodyPr vert="horz" wrap="square" lIns="0" tIns="116205" rIns="0" bIns="0" rtlCol="0">
+          <a:bodyPr vert="horz" wrap="square" lIns="0" tIns="116205" rIns="0" bIns="0" rtlCol="0" anchor="t">
             <a:spAutoFit/>
           </a:bodyPr>
           <a:lstStyle/>
           <a:p>
-            <a:pPr lvl="0">
+            <a:pPr>
               <a:spcBef>
                 <a:spcPts val="915"/>
               </a:spcBef>
             </a:pPr>
             <a:r>
-              <a:rPr lang="en-US" sz="1400" b="1" spc="-15" dirty="0">
+              <a:rPr lang="en-US" sz="1400" b="1" spc="-15">
                 <a:solidFill>
                   <a:srgbClr val="020302"/>
                 </a:solidFill>
                 <a:latin typeface="Adobe Clean"/>
                 <a:cs typeface="Adobe Clean"/>
               </a:rPr>
-              <a:t>Regional Hours Of Operation And Language Support</a:t>
-            </a:r>
+              <a:t>Regional scope of Adobe Support, Local Hours Of Operation And Language Support</a:t>
+            </a:r>
+            <a:endParaRPr lang="en-US" sz="1400" spc="-15">
+              <a:ea typeface="+mn-lt"/>
+              <a:cs typeface="+mn-lt"/>
+            </a:endParaRPr>
           </a:p>
           <a:p>
-            <a:pPr lvl="0">
+            <a:pPr>
               <a:spcBef>
                 <a:spcPts val="915"/>
               </a:spcBef>
             </a:pPr>
             <a:r>
-              <a:rPr lang="en-US" sz="1000" spc="-15" dirty="0">
+              <a:rPr lang="en-US" sz="1000" spc="-15">
                 <a:solidFill>
                   <a:srgbClr val="1F1F1F"/>
                 </a:solidFill>
                 <a:latin typeface="AdobeClean-Light"/>
               </a:rPr>
-              <a:t>Adobe’s local business hours align to the customer’s billing region</a:t>
-            </a:r>
+              <a:t>The Regional scope of Adobe Support is established by aligning the customer's billing address (via the Sales Order or other Adobe Support purchasing document) to one of the following regions:</a:t>
+            </a:r>
+            <a:endParaRPr lang="en-US"/>
           </a:p>
         </p:txBody>
       </p:sp>
@@ -10388,7 +10451,7 @@
           <p:nvPr>
             <p:extLst>
               <p:ext uri="{D42A27DB-BD31-4B8C-83A1-F6EECF244321}">
-                <p14:modId xmlns:p14="http://schemas.microsoft.com/office/powerpoint/2010/main" val="3996102044"/>
+                <p14:modId xmlns:p14="http://schemas.microsoft.com/office/powerpoint/2010/main" val="2934872093"/>
               </p:ext>
             </p:extLst>
           </p:nvPr>
@@ -10441,7 +10504,7 @@
                     <a:p>
                       <a:pPr algn="ctr"/>
                       <a:r>
-                        <a:rPr lang="en-US" sz="1100" dirty="0">
+                        <a:rPr lang="en-US" sz="1100">
                           <a:solidFill>
                             <a:schemeClr val="tx1"/>
                           </a:solidFill>
@@ -10506,7 +10569,7 @@
                     <a:p>
                       <a:pPr algn="ctr"/>
                       <a:r>
-                        <a:rPr lang="en-US" sz="1100" dirty="0">
+                        <a:rPr lang="en-US" sz="1100">
                           <a:solidFill>
                             <a:schemeClr val="tx1"/>
                           </a:solidFill>
@@ -10571,7 +10634,7 @@
                     <a:p>
                       <a:pPr algn="ctr"/>
                       <a:r>
-                        <a:rPr lang="en-US" sz="1100" dirty="0">
+                        <a:rPr lang="en-US" sz="1100">
                           <a:solidFill>
                             <a:schemeClr val="tx1"/>
                           </a:solidFill>
@@ -10636,7 +10699,7 @@
                     <a:p>
                       <a:pPr algn="ctr"/>
                       <a:r>
-                        <a:rPr lang="en-US" sz="1100" dirty="0">
+                        <a:rPr lang="en-US" sz="1100">
                           <a:solidFill>
                             <a:schemeClr val="tx1"/>
                           </a:solidFill>
@@ -10645,7 +10708,7 @@
                         <a:t>Japan </a:t>
                       </a:r>
                       <a:r>
-                        <a:rPr lang="en-US" sz="1100" baseline="30000" dirty="0">
+                        <a:rPr lang="en-US" sz="1100" baseline="30000">
                           <a:solidFill>
                             <a:schemeClr val="tx1"/>
                           </a:solidFill>
@@ -10653,7 +10716,7 @@
                         </a:rPr>
                         <a:t>1 </a:t>
                       </a:r>
-                      <a:endParaRPr lang="en-US" sz="1100" dirty="0">
+                      <a:endParaRPr lang="en-US" sz="1100">
                         <a:solidFill>
                           <a:schemeClr val="tx1"/>
                         </a:solidFill>
@@ -10723,7 +10786,7 @@
                     <a:p>
                       <a:pPr algn="ctr"/>
                       <a:r>
-                        <a:rPr lang="en-US" sz="1100" dirty="0">
+                        <a:rPr lang="en-US" sz="1100">
                           <a:solidFill>
                             <a:schemeClr val="tx1"/>
                           </a:solidFill>
@@ -10788,7 +10851,7 @@
                     <a:p>
                       <a:pPr algn="ctr"/>
                       <a:r>
-                        <a:rPr lang="en-US" sz="1100" dirty="0">
+                        <a:rPr lang="en-US" sz="1100">
                           <a:solidFill>
                             <a:schemeClr val="tx1"/>
                           </a:solidFill>
@@ -10853,7 +10916,7 @@
                     <a:p>
                       <a:pPr algn="ctr"/>
                       <a:r>
-                        <a:rPr lang="en-US" sz="1100" dirty="0">
+                        <a:rPr lang="en-US" sz="1100">
                           <a:solidFill>
                             <a:schemeClr val="tx1"/>
                           </a:solidFill>
@@ -10918,7 +10981,7 @@
                     <a:p>
                       <a:pPr algn="ctr"/>
                       <a:r>
-                        <a:rPr lang="en-US" sz="1100" dirty="0">
+                        <a:rPr lang="en-US" sz="1100">
                           <a:solidFill>
                             <a:schemeClr val="tx1"/>
                           </a:solidFill>
@@ -11004,7 +11067,7 @@
                         <a:buNone/>
                       </a:pPr>
                       <a:r>
-                        <a:rPr lang="en-US" sz="1100" b="1" i="0" u="none" strike="noStrike" kern="0" cap="none" spc="0" normalizeH="0" baseline="30000" noProof="0" dirty="0">
+                        <a:rPr lang="en-US" sz="1100" b="1" i="0" u="none" strike="noStrike" kern="0" cap="none" spc="0" normalizeH="0" baseline="30000" noProof="0">
                           <a:ln>
                             <a:noFill/>
                           </a:ln>
@@ -11018,15 +11081,15 @@
                         <a:t> </a:t>
                       </a:r>
                       <a:r>
-                        <a:rPr lang="en-US" sz="1100" dirty="0">
+                        <a:rPr lang="en-US" sz="1100">
                           <a:solidFill>
                             <a:schemeClr val="tx1"/>
                           </a:solidFill>
                           <a:latin typeface="Adobe Clean"/>
                         </a:rPr>
-                        <a:t>Language support only available in English and Japanese</a:t>
-                      </a:r>
-                      <a:endParaRPr lang="en-US" dirty="0">
+                        <a:t>Language support is only available in English and Japanese</a:t>
+                      </a:r>
+                      <a:endParaRPr lang="en-US">
                         <a:latin typeface="Adobe Clean"/>
                       </a:endParaRPr>
                     </a:p>
@@ -11047,7 +11110,7 @@
                         <a:buNone/>
                       </a:pPr>
                       <a:r>
-                        <a:rPr lang="en-US" sz="1100" i="1" dirty="0">
+                        <a:rPr lang="en-US" sz="1100" i="1">
                           <a:solidFill>
                             <a:schemeClr val="tx1"/>
                           </a:solidFill>
@@ -11058,7 +11121,7 @@
                     </a:p>
                     <a:p>
                       <a:pPr algn="ctr"/>
-                      <a:endParaRPr kumimoji="0" lang="en-US" sz="1100" b="1" i="0" u="none" strike="noStrike" kern="0" cap="none" spc="0" normalizeH="0" baseline="30000" noProof="0" dirty="0">
+                      <a:endParaRPr kumimoji="0" lang="en-US" sz="1100" b="1" i="0" u="none" strike="noStrike" kern="0" cap="none" spc="0" normalizeH="0" baseline="30000" noProof="0">
                         <a:ln>
                           <a:noFill/>
                         </a:ln>
@@ -11076,41 +11139,38 @@
                     <a:p>
                       <a:pPr algn="ctr"/>
                       <a:r>
-                        <a:rPr lang="en-US" sz="1100" i="0" dirty="0">
+                        <a:rPr lang="en-US" sz="1100" i="0">
                           <a:solidFill>
                             <a:schemeClr val="tx1"/>
                           </a:solidFill>
-                          <a:latin typeface="Adobe Clean" panose="020B0503020404020204" pitchFamily="34" charset="0"/>
-                        </a:rPr>
-                        <a:t> </a:t>
-                      </a:r>
-                      <a:r>
-                        <a:rPr lang="en-US" sz="1100" i="0" baseline="30000" dirty="0">
+                          <a:latin typeface="Adobe Clean"/>
+                        </a:rPr>
+                        <a:t> </a:t>
+                      </a:r>
+                      <a:r>
+                        <a:rPr lang="en-US" sz="1100" i="0" baseline="30000">
                           <a:solidFill>
                             <a:schemeClr val="tx1"/>
                           </a:solidFill>
-                          <a:latin typeface="Adobe Clean" panose="020B0503020404020204" pitchFamily="34" charset="0"/>
+                          <a:latin typeface="Adobe Clean"/>
                         </a:rPr>
                         <a:t>1 </a:t>
                       </a:r>
                       <a:r>
-                        <a:rPr lang="en-US" sz="1100" i="0" dirty="0">
+                        <a:rPr lang="en-US" sz="1100" i="0">
                           <a:solidFill>
                             <a:schemeClr val="tx1"/>
                           </a:solidFill>
-                          <a:latin typeface="Adobe Clean" panose="020B0503020404020204" pitchFamily="34" charset="0"/>
-                        </a:rPr>
-                        <a:t>P2, P3, P4 cases are limited to business hours only </a:t>
-                      </a:r>
-                      <a:r>
-                        <a:rPr lang="en-US" sz="1100" b="1" i="0" dirty="0">
-                          <a:solidFill>
-                            <a:schemeClr val="tx1"/>
-                          </a:solidFill>
-                          <a:latin typeface="Adobe Clean" panose="020B0503020404020204" pitchFamily="34" charset="0"/>
-                        </a:rPr>
-                        <a:t>(JAPAN)</a:t>
-                      </a:r>
+                          <a:latin typeface="Adobe Clean"/>
+                        </a:rPr>
+                        <a:t>P2, P3, P4 cases are limited to business hours only in Japan</a:t>
+                      </a:r>
+                      <a:endParaRPr lang="en-US" sz="1100" b="1" i="0">
+                        <a:solidFill>
+                          <a:schemeClr val="tx1"/>
+                        </a:solidFill>
+                        <a:latin typeface="Adobe Clean"/>
+                      </a:endParaRPr>
                     </a:p>
                   </a:txBody>
                   <a:tcPr anchor="ctr">
@@ -11166,7 +11226,7 @@
                     <a:bodyPr/>
                     <a:lstStyle/>
                     <a:p>
-                      <a:endParaRPr lang="en-US" sz="1100" dirty="0">
+                      <a:endParaRPr lang="en-US" sz="1100">
                         <a:solidFill>
                           <a:schemeClr val="tx1"/>
                         </a:solidFill>
@@ -11227,7 +11287,7 @@
                     <a:bodyPr/>
                     <a:lstStyle/>
                     <a:p>
-                      <a:endParaRPr lang="en-US" sz="1100" dirty="0">
+                      <a:endParaRPr lang="en-US" sz="1100">
                         <a:solidFill>
                           <a:schemeClr val="tx1"/>
                         </a:solidFill>
@@ -11288,7 +11348,7 @@
                     <a:bodyPr/>
                     <a:lstStyle/>
                     <a:p>
-                      <a:endParaRPr lang="en-US" sz="1100" dirty="0">
+                      <a:endParaRPr lang="en-US" sz="1100">
                         <a:solidFill>
                           <a:schemeClr val="tx1"/>
                         </a:solidFill>
@@ -11474,7 +11534,7 @@
               </a:spcBef>
             </a:pPr>
             <a:r>
-              <a:rPr sz="1200" b="1" spc="-15" dirty="0">
+              <a:rPr sz="1200" b="1" spc="-15">
                 <a:solidFill>
                   <a:srgbClr val="FFFFFF"/>
                 </a:solidFill>
@@ -11484,7 +11544,7 @@
               <a:t>U</a:t>
             </a:r>
             <a:r>
-              <a:rPr sz="1200" b="1" spc="-20" dirty="0">
+              <a:rPr sz="1200" b="1" spc="-20">
                 <a:solidFill>
                   <a:srgbClr val="FFFFFF"/>
                 </a:solidFill>
@@ -11494,7 +11554,7 @@
               <a:t>n</a:t>
             </a:r>
             <a:r>
-              <a:rPr sz="1200" b="1" spc="-25" dirty="0">
+              <a:rPr sz="1200" b="1" spc="-25">
                 <a:solidFill>
                   <a:srgbClr val="FFFFFF"/>
                 </a:solidFill>
@@ -11504,7 +11564,7 @@
               <a:t>p</a:t>
             </a:r>
             <a:r>
-              <a:rPr sz="1200" b="1" spc="-15" dirty="0">
+              <a:rPr sz="1200" b="1" spc="-15">
                 <a:solidFill>
                   <a:srgbClr val="FFFFFF"/>
                 </a:solidFill>
@@ -11514,7 +11574,7 @@
               <a:t>a</a:t>
             </a:r>
             <a:r>
-              <a:rPr sz="1200" b="1" spc="-25" dirty="0">
+              <a:rPr sz="1200" b="1" spc="-25">
                 <a:solidFill>
                   <a:srgbClr val="FFFFFF"/>
                 </a:solidFill>
@@ -11524,7 +11584,7 @@
               <a:t>r</a:t>
             </a:r>
             <a:r>
-              <a:rPr sz="1200" b="1" spc="-15" dirty="0">
+              <a:rPr sz="1200" b="1" spc="-15">
                 <a:solidFill>
                   <a:srgbClr val="FFFFFF"/>
                 </a:solidFill>
@@ -11534,7 +11594,7 @@
               <a:t>a</a:t>
             </a:r>
             <a:r>
-              <a:rPr sz="1200" b="1" spc="-30" dirty="0">
+              <a:rPr sz="1200" b="1" spc="-30">
                 <a:solidFill>
                   <a:srgbClr val="FFFFFF"/>
                 </a:solidFill>
@@ -11544,7 +11604,7 @@
               <a:t>ll</a:t>
             </a:r>
             <a:r>
-              <a:rPr sz="1200" b="1" spc="-25" dirty="0">
+              <a:rPr sz="1200" b="1" spc="-25">
                 <a:solidFill>
                   <a:srgbClr val="FFFFFF"/>
                 </a:solidFill>
@@ -11554,7 +11614,7 @@
               <a:t>e</a:t>
             </a:r>
             <a:r>
-              <a:rPr sz="1200" b="1" spc="-30" dirty="0">
+              <a:rPr sz="1200" b="1" spc="-30">
                 <a:solidFill>
                   <a:srgbClr val="FFFFFF"/>
                 </a:solidFill>
@@ -11564,7 +11624,7 @@
               <a:t>l</a:t>
             </a:r>
             <a:r>
-              <a:rPr sz="1200" b="1" spc="-25" dirty="0">
+              <a:rPr sz="1200" b="1" spc="-25">
                 <a:solidFill>
                   <a:srgbClr val="FFFFFF"/>
                 </a:solidFill>
@@ -11574,7 +11634,7 @@
               <a:t>e</a:t>
             </a:r>
             <a:r>
-              <a:rPr sz="1200" b="1" dirty="0">
+              <a:rPr sz="1200" b="1">
                 <a:solidFill>
                   <a:srgbClr val="FFFFFF"/>
                 </a:solidFill>
@@ -11584,7 +11644,7 @@
               <a:t>d  </a:t>
             </a:r>
             <a:r>
-              <a:rPr sz="1200" b="1" spc="-25" dirty="0">
+              <a:rPr sz="1200" b="1" spc="-25">
                 <a:solidFill>
                   <a:srgbClr val="FFFFFF"/>
                 </a:solidFill>
@@ -11593,7 +11653,7 @@
               </a:rPr>
               <a:t>Expertise</a:t>
             </a:r>
-            <a:endParaRPr sz="1200" dirty="0">
+            <a:endParaRPr sz="1200">
               <a:latin typeface="Adobe Clean"/>
               <a:cs typeface="Adobe Clean"/>
             </a:endParaRPr>
@@ -11636,7 +11696,7 @@
               </a:spcBef>
             </a:pPr>
             <a:r>
-              <a:rPr lang="en-US" sz="1200" b="1" spc="-15" dirty="0">
+              <a:rPr lang="en-US" sz="1200" b="1" spc="-15">
                 <a:solidFill>
                   <a:srgbClr val="FFFFFF"/>
                 </a:solidFill>
@@ -11645,7 +11705,7 @@
               </a:rPr>
               <a:t>Accelerated Support</a:t>
             </a:r>
-            <a:endParaRPr sz="1200" dirty="0">
+            <a:endParaRPr sz="1200">
               <a:latin typeface="Adobe Clean"/>
               <a:cs typeface="Adobe Clean"/>
             </a:endParaRPr>
@@ -11688,7 +11748,7 @@
               </a:spcBef>
             </a:pPr>
             <a:r>
-              <a:rPr sz="1200" b="1" spc="-50" dirty="0">
+              <a:rPr sz="1200" b="1" spc="-50">
                 <a:solidFill>
                   <a:srgbClr val="FFFFFF"/>
                 </a:solidFill>
@@ -11698,7 +11758,7 @@
               <a:t>S</a:t>
             </a:r>
             <a:r>
-              <a:rPr sz="1200" b="1" spc="-20" dirty="0">
+              <a:rPr sz="1200" b="1" spc="-20">
                 <a:solidFill>
                   <a:srgbClr val="FFFFFF"/>
                 </a:solidFill>
@@ -11708,7 +11768,7 @@
               <a:t>t</a:t>
             </a:r>
             <a:r>
-              <a:rPr sz="1200" b="1" spc="-75" dirty="0">
+              <a:rPr sz="1200" b="1" spc="-75">
                 <a:solidFill>
                   <a:srgbClr val="FFFFFF"/>
                 </a:solidFill>
@@ -11718,7 +11778,7 @@
               <a:t>r</a:t>
             </a:r>
             <a:r>
-              <a:rPr sz="1200" b="1" spc="-90" dirty="0">
+              <a:rPr sz="1200" b="1" spc="-90">
                 <a:solidFill>
                   <a:srgbClr val="FFFFFF"/>
                 </a:solidFill>
@@ -11728,7 +11788,7 @@
               <a:t>a</a:t>
             </a:r>
             <a:r>
-              <a:rPr sz="1200" b="1" spc="-55" dirty="0">
+              <a:rPr sz="1200" b="1" spc="-55">
                 <a:solidFill>
                   <a:srgbClr val="FFFFFF"/>
                 </a:solidFill>
@@ -11738,7 +11798,7 @@
               <a:t>t</a:t>
             </a:r>
             <a:r>
-              <a:rPr sz="1200" b="1" spc="-100" dirty="0">
+              <a:rPr sz="1200" b="1" spc="-100">
                 <a:solidFill>
                   <a:srgbClr val="FFFFFF"/>
                 </a:solidFill>
@@ -11748,7 +11808,7 @@
               <a:t>e</a:t>
             </a:r>
             <a:r>
-              <a:rPr sz="1200" b="1" spc="-80" dirty="0">
+              <a:rPr sz="1200" b="1" spc="-80">
                 <a:solidFill>
                   <a:srgbClr val="FFFFFF"/>
                 </a:solidFill>
@@ -11758,7 +11818,7 @@
               <a:t>g</a:t>
             </a:r>
             <a:r>
-              <a:rPr sz="1200" b="1" spc="-35" dirty="0">
+              <a:rPr sz="1200" b="1" spc="-35">
                 <a:solidFill>
                   <a:srgbClr val="FFFFFF"/>
                 </a:solidFill>
@@ -11768,7 +11828,7 @@
               <a:t>i</a:t>
             </a:r>
             <a:r>
-              <a:rPr sz="1200" b="1" dirty="0">
+              <a:rPr sz="1200" b="1">
                 <a:solidFill>
                   <a:srgbClr val="FFFFFF"/>
                 </a:solidFill>
@@ -11778,7 +11838,7 @@
               <a:t>c  </a:t>
             </a:r>
             <a:r>
-              <a:rPr sz="1200" b="1" spc="-45" dirty="0">
+              <a:rPr sz="1200" b="1" spc="-45">
                 <a:solidFill>
                   <a:srgbClr val="FFFFFF"/>
                 </a:solidFill>
@@ -11787,7 +11847,7 @@
               </a:rPr>
               <a:t>Advice</a:t>
             </a:r>
-            <a:endParaRPr sz="1200" dirty="0">
+            <a:endParaRPr sz="1200">
               <a:latin typeface="Adobe Clean"/>
               <a:cs typeface="Adobe Clean"/>
             </a:endParaRPr>
@@ -11841,7 +11901,7 @@
                     <a:lstStyle/>
                     <a:p>
                       <a:r>
-                        <a:rPr lang="en-US" sz="1100" b="0" dirty="0">
+                        <a:rPr lang="en-US" sz="1100" b="0">
                           <a:solidFill>
                             <a:schemeClr val="tx1"/>
                           </a:solidFill>
@@ -11852,7 +11912,7 @@
                         </a:rPr>
                         <a:t>Experience League</a:t>
                       </a:r>
-                      <a:endParaRPr lang="en-US" sz="1100" b="0" dirty="0">
+                      <a:endParaRPr lang="en-US" sz="1100" b="0">
                         <a:solidFill>
                           <a:schemeClr val="tx1"/>
                         </a:solidFill>
@@ -11933,7 +11993,7 @@
                         <a:defRPr/>
                       </a:pPr>
                       <a:r>
-                        <a:rPr lang="en-US" sz="1000" b="0" kern="1200" dirty="0">
+                        <a:rPr lang="en-US" sz="1000" b="0" kern="1200">
                           <a:solidFill>
                             <a:srgbClr val="000000"/>
                           </a:solidFill>
@@ -12023,7 +12083,7 @@
                         <a:defRPr/>
                       </a:pPr>
                       <a:r>
-                        <a:rPr lang="en-US" sz="1100" dirty="0">
+                        <a:rPr lang="en-US" sz="1100">
                           <a:solidFill>
                             <a:schemeClr val="dk1"/>
                           </a:solidFill>
@@ -12036,7 +12096,7 @@
                         <a:t>Training</a:t>
                       </a:r>
                       <a:r>
-                        <a:rPr lang="en-US" sz="1100" dirty="0">
+                        <a:rPr lang="en-US" sz="1100">
                           <a:solidFill>
                             <a:schemeClr val="dk1"/>
                           </a:solidFill>
@@ -12047,7 +12107,7 @@
                         </a:rPr>
                         <a:t> </a:t>
                       </a:r>
-                      <a:endParaRPr lang="en-US" sz="1100" dirty="0">
+                      <a:endParaRPr lang="en-US" sz="1100">
                         <a:solidFill>
                           <a:schemeClr val="tx1"/>
                         </a:solidFill>
@@ -12129,7 +12189,7 @@
                         <a:defRPr/>
                       </a:pPr>
                       <a:r>
-                        <a:rPr lang="en-US" sz="1000" kern="1200" dirty="0">
+                        <a:rPr lang="en-US" sz="1000" kern="1200">
                           <a:solidFill>
                             <a:srgbClr val="000000"/>
                           </a:solidFill>
@@ -12219,7 +12279,7 @@
                         <a:defRPr/>
                       </a:pPr>
                       <a:r>
-                        <a:rPr lang="en-US" sz="1100" dirty="0">
+                        <a:rPr lang="en-US" sz="1100">
                           <a:solidFill>
                             <a:schemeClr val="tx1"/>
                           </a:solidFill>
@@ -12231,7 +12291,7 @@
                         </a:rPr>
                         <a:t>Production Issues &amp; System Outages</a:t>
                       </a:r>
-                      <a:endParaRPr lang="en-US" sz="1100" dirty="0">
+                      <a:endParaRPr lang="en-US" sz="1100">
                         <a:solidFill>
                           <a:schemeClr val="tx1"/>
                         </a:solidFill>
@@ -12313,7 +12373,7 @@
                         <a:defRPr/>
                       </a:pPr>
                       <a:r>
-                        <a:rPr lang="en-US" sz="1000" kern="1200" dirty="0">
+                        <a:rPr lang="en-US" sz="1000" kern="1200">
                           <a:solidFill>
                             <a:srgbClr val="000000"/>
                           </a:solidFill>
@@ -12403,7 +12463,7 @@
                         <a:defRPr/>
                       </a:pPr>
                       <a:r>
-                        <a:rPr lang="en-US" sz="1100" b="0" i="0" dirty="0">
+                        <a:rPr lang="en-US" sz="1100" b="0" i="0">
                           <a:solidFill>
                             <a:schemeClr val="dk1"/>
                           </a:solidFill>
@@ -12415,7 +12475,7 @@
                         </a:rPr>
                         <a:t>Business Support Website</a:t>
                       </a:r>
-                      <a:endParaRPr lang="en-US" sz="1100" b="0" i="0" dirty="0">
+                      <a:endParaRPr lang="en-US" sz="1100" b="0" i="0">
                         <a:solidFill>
                           <a:schemeClr val="dk1"/>
                         </a:solidFill>
@@ -12480,7 +12540,7 @@
                     <a:lstStyle/>
                     <a:p>
                       <a:r>
-                        <a:rPr lang="en-US" sz="1000" kern="1200" dirty="0">
+                        <a:rPr lang="en-US" sz="1000" kern="1200">
                           <a:solidFill>
                             <a:srgbClr val="000000"/>
                           </a:solidFill>
@@ -12570,7 +12630,7 @@
                         <a:defRPr/>
                       </a:pPr>
                       <a:r>
-                        <a:rPr lang="en-US" sz="1100" dirty="0">
+                        <a:rPr lang="en-US" sz="1100">
                           <a:solidFill>
                             <a:schemeClr val="tx1"/>
                           </a:solidFill>
@@ -12582,7 +12642,7 @@
                         </a:rPr>
                         <a:t>Terms and Conditions</a:t>
                       </a:r>
-                      <a:endParaRPr lang="en-US" sz="1100" dirty="0">
+                      <a:endParaRPr lang="en-US" sz="1100">
                         <a:solidFill>
                           <a:schemeClr val="tx1"/>
                         </a:solidFill>
@@ -12647,7 +12707,7 @@
                     <a:lstStyle/>
                     <a:p>
                       <a:r>
-                        <a:rPr lang="en-US" sz="1000" kern="1200" dirty="0">
+                        <a:rPr lang="en-US" sz="1000" kern="1200">
                           <a:solidFill>
                             <a:srgbClr val="000000"/>
                           </a:solidFill>
@@ -13657,18 +13717,18 @@
 <file path=customXml/itemProps2.xml><?xml version="1.0" encoding="utf-8"?>
 <ds:datastoreItem xmlns:ds="http://schemas.openxmlformats.org/officeDocument/2006/customXml" ds:itemID="{E0DB8BDF-6DA8-4ABC-A3CA-043AFD674CFC}">
   <ds:schemaRefs>
-    <ds:schemaRef ds:uri="http://schemas.microsoft.com/office/2006/metadata/contentType"/>
-    <ds:schemaRef ds:uri="http://schemas.microsoft.com/office/2006/metadata/properties/metaAttributes"/>
-    <ds:schemaRef ds:uri="http://www.w3.org/2001/XMLSchema"/>
-    <ds:schemaRef ds:uri="http://schemas.microsoft.com/office/2006/metadata/properties"/>
+    <ds:schemaRef ds:uri="6c8368ec-3776-49b5-a5bb-90648cf9530f"/>
     <ds:schemaRef ds:uri="8a053bff-88be-49e4-9a87-e748e18b8b62"/>
-    <ds:schemaRef ds:uri="6c8368ec-3776-49b5-a5bb-90648cf9530f"/>
-    <ds:schemaRef ds:uri="http://schemas.microsoft.com/office/2006/documentManagement/types"/>
-    <ds:schemaRef ds:uri="http://schemas.microsoft.com/office/infopath/2007/PartnerControls"/>
-    <ds:schemaRef ds:uri="http://schemas.openxmlformats.org/package/2006/metadata/core-properties"/>
     <ds:schemaRef ds:uri="http://purl.org/dc/elements/1.1/"/>
     <ds:schemaRef ds:uri="http://purl.org/dc/terms/"/>
     <ds:schemaRef ds:uri="http://schemas.microsoft.com/internal/obd"/>
+    <ds:schemaRef ds:uri="http://schemas.microsoft.com/office/2006/documentManagement/types"/>
+    <ds:schemaRef ds:uri="http://schemas.microsoft.com/office/2006/metadata/contentType"/>
+    <ds:schemaRef ds:uri="http://schemas.microsoft.com/office/2006/metadata/properties"/>
+    <ds:schemaRef ds:uri="http://schemas.microsoft.com/office/2006/metadata/properties/metaAttributes"/>
+    <ds:schemaRef ds:uri="http://schemas.microsoft.com/office/infopath/2007/PartnerControls"/>
+    <ds:schemaRef ds:uri="http://schemas.openxmlformats.org/package/2006/metadata/core-properties"/>
+    <ds:schemaRef ds:uri="http://www.w3.org/2001/XMLSchema"/>
   </ds:schemaRefs>
 </ds:datastoreItem>
 </file>

</xml_diff>

<commit_message>
Translated files from zipFile.zip
</commit_message>
<xml_diff>
--- a/help/data-sheets/assets/BusinessSupportDatasheet.pptx
+++ b/help/data-sheets/assets/BusinessSupportDatasheet.pptx
@@ -143,12 +143,8 @@
 <file path=ppt/revisionInfo.xml><?xml version="1.0" encoding="utf-8"?>
 <p1510:revInfo xmlns:a="http://schemas.openxmlformats.org/drawingml/2006/main" xmlns:r="http://schemas.openxmlformats.org/officeDocument/2006/relationships" xmlns:p1510="http://schemas.microsoft.com/office/powerpoint/2015/10/main">
   <p1510:revLst>
-    <p1510:client id="{06B13378-B080-7F0F-51A5-F9203CEE57ED}" v="370" dt="2021-08-25T22:26:24.850"/>
-    <p1510:client id="{4D8E0410-E0CE-85E2-0F84-C1BF4F647622}" v="27" dt="2021-09-22T22:57:14.395"/>
-    <p1510:client id="{71D6CFBF-0EA2-99B0-93F4-22F19EF0AE4E}" v="2" dt="2021-09-22T19:06:58.732"/>
-    <p1510:client id="{9E385600-BF81-FC49-9ED0-E33BC37F7908}" v="55" dt="2021-08-04T08:16:13.478"/>
-    <p1510:client id="{AFB92C2B-405E-C597-0988-18F97C53104C}" v="37" dt="2021-09-22T18:53:28.028"/>
-    <p1510:client id="{CA5D33DF-AE75-BCA1-B9BC-A7CD44D2F3C7}" v="2" dt="2021-08-25T22:38:18.624"/>
+    <p1510:client id="{61630BD6-9AE9-064C-B39F-AFA945B82B3E}" v="202" dt="2021-10-13T19:21:08.267"/>
+    <p1510:client id="{AC30C20D-1316-8ECC-DADD-39CCEC6A7FCF}" v="9" dt="2021-10-13T19:03:35.035"/>
   </p1510:revLst>
 </p1510:revInfo>
 </file>
@@ -170,6 +166,77 @@
         </pc:sldMkLst>
         <pc:graphicFrameChg chg="mod modGraphic">
           <ac:chgData name="Akilah Johnson" userId="S::akjohnso@adobe.com::2fa3aa60-0c9c-4d06-bae2-795983241227" providerId="AD" clId="Web-{4D8E0410-E0CE-85E2-0F84-C1BF4F647622}" dt="2021-09-22T22:57:04.802" v="5"/>
+          <ac:graphicFrameMkLst>
+            <pc:docMk/>
+            <pc:sldMk cId="1050037809" sldId="261"/>
+            <ac:graphicFrameMk id="25" creationId="{3A91F5B0-3974-A14D-A146-FB590F2AAD18}"/>
+          </ac:graphicFrameMkLst>
+        </pc:graphicFrameChg>
+      </pc:sldChg>
+    </pc:docChg>
+  </pc:docChgLst>
+  <pc:docChgLst>
+    <pc:chgData name="Akilah Johnson" userId="S::akjohnso@adobe.com::2fa3aa60-0c9c-4d06-bae2-795983241227" providerId="AD" clId="Web-{019F6A09-DCDA-BB53-9E3C-5BA3B13E26BB}"/>
+    <pc:docChg chg="modSld">
+      <pc:chgData name="Akilah Johnson" userId="S::akjohnso@adobe.com::2fa3aa60-0c9c-4d06-bae2-795983241227" providerId="AD" clId="Web-{019F6A09-DCDA-BB53-9E3C-5BA3B13E26BB}" dt="2021-10-12T17:10:36.752" v="17" actId="20577"/>
+      <pc:docMkLst>
+        <pc:docMk/>
+      </pc:docMkLst>
+      <pc:sldChg chg="modSp">
+        <pc:chgData name="Akilah Johnson" userId="S::akjohnso@adobe.com::2fa3aa60-0c9c-4d06-bae2-795983241227" providerId="AD" clId="Web-{019F6A09-DCDA-BB53-9E3C-5BA3B13E26BB}" dt="2021-10-12T17:09:32.112" v="2" actId="20577"/>
+        <pc:sldMkLst>
+          <pc:docMk/>
+          <pc:sldMk cId="0" sldId="257"/>
+        </pc:sldMkLst>
+        <pc:spChg chg="mod">
+          <ac:chgData name="Akilah Johnson" userId="S::akjohnso@adobe.com::2fa3aa60-0c9c-4d06-bae2-795983241227" providerId="AD" clId="Web-{019F6A09-DCDA-BB53-9E3C-5BA3B13E26BB}" dt="2021-10-12T17:09:32.112" v="2" actId="20577"/>
+          <ac:spMkLst>
+            <pc:docMk/>
+            <pc:sldMk cId="0" sldId="257"/>
+            <ac:spMk id="46" creationId="{00000000-0000-0000-0000-000000000000}"/>
+          </ac:spMkLst>
+        </pc:spChg>
+      </pc:sldChg>
+      <pc:sldChg chg="modSp">
+        <pc:chgData name="Akilah Johnson" userId="S::akjohnso@adobe.com::2fa3aa60-0c9c-4d06-bae2-795983241227" providerId="AD" clId="Web-{019F6A09-DCDA-BB53-9E3C-5BA3B13E26BB}" dt="2021-10-12T17:10:36.752" v="17" actId="20577"/>
+        <pc:sldMkLst>
+          <pc:docMk/>
+          <pc:sldMk cId="1050037809" sldId="261"/>
+        </pc:sldMkLst>
+        <pc:spChg chg="mod">
+          <ac:chgData name="Akilah Johnson" userId="S::akjohnso@adobe.com::2fa3aa60-0c9c-4d06-bae2-795983241227" providerId="AD" clId="Web-{019F6A09-DCDA-BB53-9E3C-5BA3B13E26BB}" dt="2021-10-12T17:10:36.752" v="17" actId="20577"/>
+          <ac:spMkLst>
+            <pc:docMk/>
+            <pc:sldMk cId="1050037809" sldId="261"/>
+            <ac:spMk id="56" creationId="{00000000-0000-0000-0000-000000000000}"/>
+          </ac:spMkLst>
+        </pc:spChg>
+        <pc:graphicFrameChg chg="mod modGraphic">
+          <ac:chgData name="Akilah Johnson" userId="S::akjohnso@adobe.com::2fa3aa60-0c9c-4d06-bae2-795983241227" providerId="AD" clId="Web-{019F6A09-DCDA-BB53-9E3C-5BA3B13E26BB}" dt="2021-10-12T17:09:41.471" v="6"/>
+          <ac:graphicFrameMkLst>
+            <pc:docMk/>
+            <pc:sldMk cId="1050037809" sldId="261"/>
+            <ac:graphicFrameMk id="111" creationId="{D8653CEC-4213-DE40-9BAF-D1E3318FF89C}"/>
+          </ac:graphicFrameMkLst>
+        </pc:graphicFrameChg>
+      </pc:sldChg>
+    </pc:docChg>
+  </pc:docChgLst>
+  <pc:docChgLst>
+    <pc:chgData name="Andy Witt" userId="S::awitt@adobe.com::e9157bdf-53b2-40e4-9459-936793d75696" providerId="AD" clId="Web-{06B13378-B080-7F0F-51A5-F9203CEE57ED}"/>
+    <pc:docChg chg="modSld">
+      <pc:chgData name="Andy Witt" userId="S::awitt@adobe.com::e9157bdf-53b2-40e4-9459-936793d75696" providerId="AD" clId="Web-{06B13378-B080-7F0F-51A5-F9203CEE57ED}" dt="2021-08-25T22:25:13.647" v="363"/>
+      <pc:docMkLst>
+        <pc:docMk/>
+      </pc:docMkLst>
+      <pc:sldChg chg="modSp">
+        <pc:chgData name="Andy Witt" userId="S::awitt@adobe.com::e9157bdf-53b2-40e4-9459-936793d75696" providerId="AD" clId="Web-{06B13378-B080-7F0F-51A5-F9203CEE57ED}" dt="2021-08-25T22:25:13.647" v="363"/>
+        <pc:sldMkLst>
+          <pc:docMk/>
+          <pc:sldMk cId="1050037809" sldId="261"/>
+        </pc:sldMkLst>
+        <pc:graphicFrameChg chg="mod modGraphic">
+          <ac:chgData name="Andy Witt" userId="S::awitt@adobe.com::e9157bdf-53b2-40e4-9459-936793d75696" providerId="AD" clId="Web-{06B13378-B080-7F0F-51A5-F9203CEE57ED}" dt="2021-08-25T22:25:13.647" v="363"/>
           <ac:graphicFrameMkLst>
             <pc:docMk/>
             <pc:sldMk cId="1050037809" sldId="261"/>
@@ -204,26 +271,58 @@
     </pc:docChg>
   </pc:docChgLst>
   <pc:docChgLst>
-    <pc:chgData name="Andy Witt" userId="S::awitt@adobe.com::e9157bdf-53b2-40e4-9459-936793d75696" providerId="AD" clId="Web-{06B13378-B080-7F0F-51A5-F9203CEE57ED}"/>
+    <pc:chgData name="Akilah Johnson" userId="S::akjohnso@adobe.com::2fa3aa60-0c9c-4d06-bae2-795983241227" providerId="AD" clId="Web-{D428A0AE-54E2-30D2-C574-7A0742876CCF}"/>
     <pc:docChg chg="modSld">
-      <pc:chgData name="Andy Witt" userId="S::awitt@adobe.com::e9157bdf-53b2-40e4-9459-936793d75696" providerId="AD" clId="Web-{06B13378-B080-7F0F-51A5-F9203CEE57ED}" dt="2021-08-25T22:25:13.647" v="363"/>
+      <pc:chgData name="Akilah Johnson" userId="S::akjohnso@adobe.com::2fa3aa60-0c9c-4d06-bae2-795983241227" providerId="AD" clId="Web-{D428A0AE-54E2-30D2-C574-7A0742876CCF}" dt="2021-10-12T19:11:25.330" v="0" actId="20577"/>
       <pc:docMkLst>
         <pc:docMk/>
       </pc:docMkLst>
       <pc:sldChg chg="modSp">
-        <pc:chgData name="Andy Witt" userId="S::awitt@adobe.com::e9157bdf-53b2-40e4-9459-936793d75696" providerId="AD" clId="Web-{06B13378-B080-7F0F-51A5-F9203CEE57ED}" dt="2021-08-25T22:25:13.647" v="363"/>
+        <pc:chgData name="Akilah Johnson" userId="S::akjohnso@adobe.com::2fa3aa60-0c9c-4d06-bae2-795983241227" providerId="AD" clId="Web-{D428A0AE-54E2-30D2-C574-7A0742876CCF}" dt="2021-10-12T19:11:25.330" v="0" actId="20577"/>
         <pc:sldMkLst>
           <pc:docMk/>
-          <pc:sldMk cId="1050037809" sldId="261"/>
+          <pc:sldMk cId="0" sldId="256"/>
         </pc:sldMkLst>
-        <pc:graphicFrameChg chg="mod modGraphic">
-          <ac:chgData name="Andy Witt" userId="S::awitt@adobe.com::e9157bdf-53b2-40e4-9459-936793d75696" providerId="AD" clId="Web-{06B13378-B080-7F0F-51A5-F9203CEE57ED}" dt="2021-08-25T22:25:13.647" v="363"/>
-          <ac:graphicFrameMkLst>
+        <pc:spChg chg="mod">
+          <ac:chgData name="Akilah Johnson" userId="S::akjohnso@adobe.com::2fa3aa60-0c9c-4d06-bae2-795983241227" providerId="AD" clId="Web-{D428A0AE-54E2-30D2-C574-7A0742876CCF}" dt="2021-10-12T19:11:25.330" v="0" actId="20577"/>
+          <ac:spMkLst>
             <pc:docMk/>
-            <pc:sldMk cId="1050037809" sldId="261"/>
-            <ac:graphicFrameMk id="25" creationId="{3A91F5B0-3974-A14D-A146-FB590F2AAD18}"/>
-          </ac:graphicFrameMkLst>
-        </pc:graphicFrameChg>
+            <pc:sldMk cId="0" sldId="256"/>
+            <ac:spMk id="4" creationId="{00000000-0000-0000-0000-000000000000}"/>
+          </ac:spMkLst>
+        </pc:spChg>
+      </pc:sldChg>
+    </pc:docChg>
+  </pc:docChgLst>
+  <pc:docChgLst>
+    <pc:chgData name="Lauren Schutte" userId="S::schutte@adobe.com::6e08b2d3-447a-4d66-86be-444d50df187f" providerId="AD" clId="Web-{AC30C20D-1316-8ECC-DADD-39CCEC6A7FCF}"/>
+    <pc:docChg chg="modSld">
+      <pc:chgData name="Lauren Schutte" userId="S::schutte@adobe.com::6e08b2d3-447a-4d66-86be-444d50df187f" providerId="AD" clId="Web-{AC30C20D-1316-8ECC-DADD-39CCEC6A7FCF}" dt="2021-10-13T19:03:35.035" v="8" actId="1076"/>
+      <pc:docMkLst>
+        <pc:docMk/>
+      </pc:docMkLst>
+      <pc:sldChg chg="modSp">
+        <pc:chgData name="Lauren Schutte" userId="S::schutte@adobe.com::6e08b2d3-447a-4d66-86be-444d50df187f" providerId="AD" clId="Web-{AC30C20D-1316-8ECC-DADD-39CCEC6A7FCF}" dt="2021-10-13T19:03:35.035" v="8" actId="1076"/>
+        <pc:sldMkLst>
+          <pc:docMk/>
+          <pc:sldMk cId="0" sldId="256"/>
+        </pc:sldMkLst>
+        <pc:spChg chg="mod">
+          <ac:chgData name="Lauren Schutte" userId="S::schutte@adobe.com::6e08b2d3-447a-4d66-86be-444d50df187f" providerId="AD" clId="Web-{AC30C20D-1316-8ECC-DADD-39CCEC6A7FCF}" dt="2021-10-13T19:03:27.878" v="7" actId="14100"/>
+          <ac:spMkLst>
+            <pc:docMk/>
+            <pc:sldMk cId="0" sldId="256"/>
+            <ac:spMk id="3" creationId="{00000000-0000-0000-0000-000000000000}"/>
+          </ac:spMkLst>
+        </pc:spChg>
+        <pc:spChg chg="mod">
+          <ac:chgData name="Lauren Schutte" userId="S::schutte@adobe.com::6e08b2d3-447a-4d66-86be-444d50df187f" providerId="AD" clId="Web-{AC30C20D-1316-8ECC-DADD-39CCEC6A7FCF}" dt="2021-10-13T19:03:35.035" v="8" actId="1076"/>
+          <ac:spMkLst>
+            <pc:docMk/>
+            <pc:sldMk cId="0" sldId="256"/>
+            <ac:spMk id="5" creationId="{00000000-0000-0000-0000-000000000000}"/>
+          </ac:spMkLst>
+        </pc:spChg>
       </pc:sldChg>
     </pc:docChg>
   </pc:docChgLst>
@@ -254,6 +353,38 @@
             <pc:docMk/>
             <pc:sldMk cId="1050037809" sldId="261"/>
             <ac:graphicFrameMk id="25" creationId="{3A91F5B0-3974-A14D-A146-FB590F2AAD18}"/>
+          </ac:graphicFrameMkLst>
+        </pc:graphicFrameChg>
+      </pc:sldChg>
+    </pc:docChg>
+  </pc:docChgLst>
+  <pc:docChgLst>
+    <pc:chgData name="Lauren Schutte" userId="6e08b2d3-447a-4d66-86be-444d50df187f" providerId="ADAL" clId="{61630BD6-9AE9-064C-B39F-AFA945B82B3E}"/>
+    <pc:docChg chg="undo custSel modSld">
+      <pc:chgData name="Lauren Schutte" userId="6e08b2d3-447a-4d66-86be-444d50df187f" providerId="ADAL" clId="{61630BD6-9AE9-064C-B39F-AFA945B82B3E}" dt="2021-10-13T19:21:08.267" v="201" actId="20577"/>
+      <pc:docMkLst>
+        <pc:docMk/>
+      </pc:docMkLst>
+      <pc:sldChg chg="modSp mod">
+        <pc:chgData name="Lauren Schutte" userId="6e08b2d3-447a-4d66-86be-444d50df187f" providerId="ADAL" clId="{61630BD6-9AE9-064C-B39F-AFA945B82B3E}" dt="2021-10-13T19:21:08.267" v="201" actId="20577"/>
+        <pc:sldMkLst>
+          <pc:docMk/>
+          <pc:sldMk cId="0" sldId="256"/>
+        </pc:sldMkLst>
+        <pc:spChg chg="mod">
+          <ac:chgData name="Lauren Schutte" userId="6e08b2d3-447a-4d66-86be-444d50df187f" providerId="ADAL" clId="{61630BD6-9AE9-064C-B39F-AFA945B82B3E}" dt="2021-10-13T19:03:44.344" v="3" actId="1076"/>
+          <ac:spMkLst>
+            <pc:docMk/>
+            <pc:sldMk cId="0" sldId="256"/>
+            <ac:spMk id="3" creationId="{00000000-0000-0000-0000-000000000000}"/>
+          </ac:spMkLst>
+        </pc:spChg>
+        <pc:graphicFrameChg chg="mod modGraphic">
+          <ac:chgData name="Lauren Schutte" userId="6e08b2d3-447a-4d66-86be-444d50df187f" providerId="ADAL" clId="{61630BD6-9AE9-064C-B39F-AFA945B82B3E}" dt="2021-10-13T19:21:08.267" v="201" actId="20577"/>
+          <ac:graphicFrameMkLst>
+            <pc:docMk/>
+            <pc:sldMk cId="0" sldId="256"/>
+            <ac:graphicFrameMk id="9" creationId="{00000000-0000-0000-0000-000000000000}"/>
           </ac:graphicFrameMkLst>
         </pc:graphicFrameChg>
       </pc:sldChg>
@@ -368,7 +499,7 @@
           <a:p>
             <a:fld id="{FB81873C-0B24-F04A-98A1-90E0A78F7E8A}" type="datetimeFigureOut">
               <a:rPr lang="en-US" smtClean="0"/>
-              <a:t>9/30/2021</a:t>
+              <a:t>11/12/2021</a:t>
             </a:fld>
             <a:endParaRPr lang="en-US"/>
           </a:p>
@@ -847,7 +978,7 @@
           <a:bodyPr/>
           <a:lstStyle/>
           <a:p>
-            <a:endParaRPr lang="en-US" dirty="0"/>
+            <a:endParaRPr lang="en-US"/>
           </a:p>
         </p:txBody>
       </p:sp>
@@ -991,7 +1122,7 @@
           <a:p>
             <a:fld id="{1D8BD707-D9CF-40AE-B4C6-C98DA3205C09}" type="datetimeFigureOut">
               <a:rPr lang="en-US"/>
-              <a:t>9/30/2021</a:t>
+              <a:t>11/12/2021</a:t>
             </a:fld>
             <a:endParaRPr lang="en-US"/>
           </a:p>
@@ -1183,7 +1314,7 @@
           <a:p>
             <a:fld id="{1D8BD707-D9CF-40AE-B4C6-C98DA3205C09}" type="datetimeFigureOut">
               <a:rPr lang="en-US"/>
-              <a:t>9/30/2021</a:t>
+              <a:t>11/12/2021</a:t>
             </a:fld>
             <a:endParaRPr lang="en-US"/>
           </a:p>
@@ -1501,7 +1632,7 @@
           <a:p>
             <a:fld id="{1D8BD707-D9CF-40AE-B4C6-C98DA3205C09}" type="datetimeFigureOut">
               <a:rPr lang="en-US"/>
-              <a:t>9/30/2021</a:t>
+              <a:t>11/12/2021</a:t>
             </a:fld>
             <a:endParaRPr lang="en-US"/>
           </a:p>
@@ -1755,7 +1886,7 @@
         </p:nvSpPr>
         <p:spPr>
           <a:xfrm>
-            <a:off x="168565" y="7162363"/>
+            <a:off x="168565" y="7054413"/>
             <a:ext cx="2800350" cy="238760"/>
           </a:xfrm>
           <a:prstGeom prst="rect">
@@ -1843,7 +1974,7 @@
           </a:prstGeom>
         </p:spPr>
         <p:txBody>
-          <a:bodyPr vert="horz" wrap="square" lIns="0" tIns="12700" rIns="0" bIns="0" rtlCol="0">
+          <a:bodyPr vert="horz" wrap="square" lIns="0" tIns="12700" rIns="0" bIns="0" rtlCol="0" anchor="t">
             <a:spAutoFit/>
           </a:bodyPr>
           <a:lstStyle/>
@@ -1857,10 +1988,10 @@
               </a:spcBef>
             </a:pPr>
             <a:r>
-              <a:rPr lang="de-DE" sz="2300">
-                <a:latin typeface="Adobe Clean" panose="020B0503020404020204" pitchFamily="34" charset="0"/>
+              <a:rPr lang="de-DE" sz="2300" dirty="0">
+                <a:latin typeface="Adobe Clean"/>
               </a:rPr>
-              <a:t>SUPPORT-ANGEBOT VON ADOBE</a:t>
+              <a:t>SUPPORT-PAKETE VON ADOBE</a:t>
             </a:r>
           </a:p>
         </p:txBody>
@@ -1873,8 +2004,8 @@
         </p:nvSpPr>
         <p:spPr>
           <a:xfrm>
-            <a:off x="121147" y="635935"/>
-            <a:ext cx="5941516" cy="1270476"/>
+            <a:off x="121147" y="531160"/>
+            <a:ext cx="5865216" cy="1424364"/>
           </a:xfrm>
           <a:prstGeom prst="rect">
             <a:avLst/>
@@ -1932,16 +2063,16 @@
               </a:spcBef>
             </a:pPr>
             <a:r>
-              <a:rPr lang="de-DE" sz="900" spc="-30" dirty="0">
+              <a:rPr lang="de-DE" sz="900" dirty="0">
                 <a:solidFill>
                   <a:schemeClr val="bg1"/>
                 </a:solidFill>
                 <a:latin typeface="Adobe Clean SemiLight" panose="020B0403020404020204" pitchFamily="34" charset="0"/>
               </a:rPr>
-              <a:t>Adobe bietet eine umfangreiche Palette an technischen Ressourcen zur Unterstützung Ihres Unternehmens. Diese sind Teil des Experience Cloud-Lizenzabonnements und werden durch das BUSINESS Support-Paket ergänzt. BUSINESS Support bietet über die Adobe Experience League Zugang zu personalisierten Lernpfaden und von Moderatoren betreuten Community-Foren. Darüber hinaus stehen Ihnen unsere umfangreiche technische Produktdokumentation sowie aktuelle Versionshinweise zur Verfügung. BUSINESS-Kunden haben außerdem </a:t>
+              <a:t>Adobe bietet eine umfangreiche Palette an technischen Ressourcen zur Unterstützung Ihres Unternehmens. Diese sind Teil </a:t>
             </a:r>
             <a:br>
-              <a:rPr lang="sk-SK" sz="900" spc="-30" dirty="0">
+              <a:rPr lang="de-DE" sz="900" dirty="0">
                 <a:solidFill>
                   <a:schemeClr val="bg1"/>
                 </a:solidFill>
@@ -1949,13 +2080,30 @@
               </a:rPr>
             </a:br>
             <a:r>
-              <a:rPr lang="de-DE" sz="900" spc="-30" dirty="0">
+              <a:rPr lang="de-DE" sz="900" dirty="0">
                 <a:solidFill>
                   <a:schemeClr val="bg1"/>
                 </a:solidFill>
                 <a:latin typeface="Adobe Clean SemiLight" panose="020B0403020404020204" pitchFamily="34" charset="0"/>
               </a:rPr>
-              <a:t>die Möglichkeit, bei produktbezogenen Fragen unsere technischen Supportteams über Telefon oder das Support-Web-Portal zu kontaktieren. So ist Ihr Unternehmen in kritischen Zeiten geschützt. BUSINESS-Kunden erhalten regelmäßige Informationen und Updates von ihrem Account Support Lead sowie Eskalations-Management für Support-Fälle bei besonders kritischen Support-Anfragen. </a:t>
+              <a:t>des Experience Cloud-Lizenzabonnements und werden durch das BUSINESS Support-Paket ergänzt. BUSINESS Support bietet über die Adobe Experience League Zugang zu personalisierten Lernpfaden und von Moderatoren betreuten Community-Foren. Darüber hinaus stehen Ihnen unsere umfangreiche technische Produktdokumentation sowie aktuelle Versionshinweise </a:t>
+            </a:r>
+            <a:br>
+              <a:rPr lang="de-DE" sz="900" dirty="0">
+                <a:solidFill>
+                  <a:schemeClr val="bg1"/>
+                </a:solidFill>
+                <a:latin typeface="Adobe Clean SemiLight" panose="020B0403020404020204" pitchFamily="34" charset="0"/>
+              </a:rPr>
+            </a:br>
+            <a:r>
+              <a:rPr lang="de-DE" sz="900" dirty="0">
+                <a:solidFill>
+                  <a:schemeClr val="bg1"/>
+                </a:solidFill>
+                <a:latin typeface="Adobe Clean SemiLight" panose="020B0403020404020204" pitchFamily="34" charset="0"/>
+              </a:rPr>
+              <a:t>zur Verfügung. BUSINESS-Kunden haben außerdem die Möglichkeit, bei produktbezogenen Fragen unsere technischen Supportteams über Telefon oder das Support-Web-Portal zu kontaktieren. So ist Ihr Unternehmen in kritischen Zeiten geschützt. BUSINESS-Kunden erhalten regelmäßige Informationen und Updates von ihrem Account Support Lead sowie Eskalations-Management für Support-Fälle bei besonders kritischen Support-Anfragen. </a:t>
             </a:r>
           </a:p>
         </p:txBody>
@@ -2038,14 +2186,14 @@
           <p:nvPr>
             <p:extLst>
               <p:ext uri="{D42A27DB-BD31-4B8C-83A1-F6EECF244321}">
-                <p14:modId xmlns:p14="http://schemas.microsoft.com/office/powerpoint/2010/main" val="2810114461"/>
+                <p14:modId xmlns:p14="http://schemas.microsoft.com/office/powerpoint/2010/main" val="3044149855"/>
               </p:ext>
             </p:extLst>
           </p:nvPr>
         </p:nvGraphicFramePr>
         <p:xfrm>
-          <a:off x="121146" y="7475985"/>
-          <a:ext cx="7498852" cy="2295773"/>
+          <a:off x="118872" y="7368035"/>
+          <a:ext cx="7498851" cy="2375793"/>
         </p:xfrm>
         <a:graphic>
           <a:graphicData uri="http://schemas.openxmlformats.org/drawingml/2006/table">
@@ -2054,7 +2202,7 @@
                 <a:tableStyleId>{2D5ABB26-0587-4C30-8999-92F81FD0307C}</a:tableStyleId>
               </a:tblPr>
               <a:tblGrid>
-                <a:gridCol w="4698745">
+                <a:gridCol w="4698744">
                   <a:extLst>
                     <a:ext uri="{9D8B030D-6E8A-4147-A177-3AD203B41FA5}">
                       <a16:colId xmlns:a16="http://schemas.microsoft.com/office/drawing/2014/main" val="20000"/>
@@ -2076,7 +2224,7 @@
                   </a:extLst>
                 </a:gridCol>
               </a:tblGrid>
-              <a:tr h="274318">
+              <a:tr h="291248">
                 <a:tc>
                   <a:txBody>
                     <a:bodyPr/>
@@ -2102,7 +2250,7 @@
                       </a:r>
                     </a:p>
                   </a:txBody>
-                  <a:tcPr marL="0" marR="0" marT="7620" marB="0" anchor="ctr">
+                  <a:tcPr marL="0" marR="0" marT="7620" marB="0">
                     <a:lnL w="3175">
                       <a:solidFill>
                         <a:srgbClr val="B7B8B8"/>
@@ -2137,27 +2285,37 @@
                     <a:bodyPr/>
                     <a:lstStyle/>
                     <a:p>
-                      <a:pPr marL="135255" algn="ctr">
+                      <a:pPr marL="1588" marR="0" lvl="0" indent="141288" algn="l" defTabSz="914400" eaLnBrk="1" fontAlgn="auto" latinLnBrk="0" hangingPunct="1">
                         <a:lnSpc>
                           <a:spcPct val="100000"/>
                         </a:lnSpc>
                         <a:spcBef>
                           <a:spcPts val="60"/>
                         </a:spcBef>
+                        <a:spcAft>
+                          <a:spcPts val="0"/>
+                        </a:spcAft>
+                        <a:buClrTx/>
+                        <a:buSzTx/>
+                        <a:buFontTx/>
+                        <a:buNone/>
+                        <a:tabLst/>
+                        <a:defRPr/>
                       </a:pPr>
                       <a:r>
-                        <a:rPr lang="de-DE" sz="900">
+                        <a:rPr lang="de-DE" sz="900" dirty="0">
                           <a:solidFill>
-                            <a:srgbClr val="020302"/>
+                            <a:srgbClr val="404040"/>
                           </a:solidFill>
                           <a:latin typeface="Adobe Clean"/>
+                          <a:ea typeface="+mn-ea"/>
                           <a:cs typeface="Adobe Clean"/>
                         </a:rPr>
                         <a:t>Online Support</a:t>
                       </a:r>
                     </a:p>
                   </a:txBody>
-                  <a:tcPr anchor="ctr">
+                  <a:tcPr marL="182880" marT="91440" anchor="ctr">
                     <a:lnL w="3175">
                       <a:solidFill>
                         <a:srgbClr val="B7B8B8"/>
@@ -2212,7 +2370,7 @@
                       </a:r>
                     </a:p>
                   </a:txBody>
-                  <a:tcPr anchor="ctr">
+                  <a:tcPr marL="182880" marT="91440" anchor="ctr">
                     <a:lnL w="3175">
                       <a:solidFill>
                         <a:srgbClr val="B7B8B8"/>
@@ -2248,7 +2406,7 @@
                   </a:ext>
                 </a:extLst>
               </a:tr>
-              <a:tr h="484755">
+              <a:tr h="514672">
                 <a:tc>
                   <a:txBody>
                     <a:bodyPr/>
@@ -2282,7 +2440,7 @@
                           <a:spcPts val="420"/>
                         </a:spcBef>
                         <a:spcAft>
-                          <a:spcPts val="0"/>
+                          <a:spcPts val="600"/>
                         </a:spcAft>
                         <a:buClrTx/>
                         <a:buSzTx/>
@@ -2301,7 +2459,7 @@
                         <a:t>Die Produktionsfunktionen im Unternehmen des Kunden sind ausgefallen oder weisen </a:t>
                       </a:r>
                       <a:br>
-                        <a:rPr lang="sk-SK" sz="900" b="0" i="0" dirty="0">
+                        <a:rPr lang="de-DE" sz="900" b="0" i="0" dirty="0">
                           <a:solidFill>
                             <a:srgbClr val="000000"/>
                           </a:solidFill>
@@ -2319,7 +2477,7 @@
                       </a:r>
                     </a:p>
                   </a:txBody>
-                  <a:tcPr marL="0" marR="0" marT="3810" marB="0">
+                  <a:tcPr marL="0" marR="0" marT="3810" marB="36000">
                     <a:lnL w="3175">
                       <a:solidFill>
                         <a:srgbClr val="B7B8B8"/>
@@ -2367,30 +2525,11 @@
                           <a:latin typeface="AdobeClean-Light"/>
                           <a:cs typeface="AdobeClean-Light"/>
                         </a:rPr>
-                        <a:t>24x7/</a:t>
-                      </a:r>
-                      <a:br>
-                        <a:rPr lang="sk-SK" sz="900" dirty="0">
-                          <a:solidFill>
-                            <a:srgbClr val="020302"/>
-                          </a:solidFill>
-                          <a:latin typeface="AdobeClean-Light"/>
-                          <a:cs typeface="AdobeClean-Light"/>
-                        </a:rPr>
-                      </a:br>
-                      <a:r>
-                        <a:rPr lang="de-DE" sz="900" dirty="0">
-                          <a:solidFill>
-                            <a:srgbClr val="020302"/>
-                          </a:solidFill>
-                          <a:latin typeface="AdobeClean-Light"/>
-                          <a:cs typeface="AdobeClean-Light"/>
-                        </a:rPr>
-                        <a:t>1 Stunde</a:t>
+                        <a:t>24x7/1 Stunde</a:t>
                       </a:r>
                     </a:p>
                   </a:txBody>
-                  <a:tcPr anchor="ctr">
+                  <a:tcPr marL="0" marR="0" marT="91440" marB="91440" anchor="ctr" anchorCtr="1">
                     <a:lnL w="3175">
                       <a:solidFill>
                         <a:srgbClr val="B7B8B8"/>
@@ -2438,30 +2577,11 @@
                           <a:latin typeface="AdobeClean-Light"/>
                           <a:cs typeface="AdobeClean-Light"/>
                         </a:rPr>
-                        <a:t>24x7/</a:t>
-                      </a:r>
-                      <a:br>
-                        <a:rPr lang="sk-SK" sz="900" dirty="0">
-                          <a:solidFill>
-                            <a:srgbClr val="020302"/>
-                          </a:solidFill>
-                          <a:latin typeface="AdobeClean-Light"/>
-                          <a:cs typeface="AdobeClean-Light"/>
-                        </a:rPr>
-                      </a:br>
-                      <a:r>
-                        <a:rPr lang="de-DE" sz="900" dirty="0">
-                          <a:solidFill>
-                            <a:srgbClr val="020302"/>
-                          </a:solidFill>
-                          <a:latin typeface="AdobeClean-Light"/>
-                          <a:cs typeface="AdobeClean-Light"/>
-                        </a:rPr>
-                        <a:t>1 Stunde</a:t>
+                        <a:t>24x7/1 Stunde</a:t>
                       </a:r>
                     </a:p>
                   </a:txBody>
-                  <a:tcPr anchor="ctr">
+                  <a:tcPr marL="0" marR="0" marT="91440" marB="91440" anchor="ctr" anchorCtr="1">
                     <a:lnL w="3175">
                       <a:solidFill>
                         <a:srgbClr val="B7B8B8"/>
@@ -2499,7 +2619,7 @@
                   </a:ext>
                 </a:extLst>
               </a:tr>
-              <a:tr h="484755">
+              <a:tr h="514672">
                 <a:tc>
                   <a:txBody>
                     <a:bodyPr/>
@@ -2543,7 +2663,7 @@
                         <a:t>Die Unternehmensfunktionen des Kunden weisen eine erhebliche Beeinträchtigung des Service </a:t>
                       </a:r>
                       <a:br>
-                        <a:rPr lang="sk-SK" sz="900" b="0" i="0" dirty="0">
+                        <a:rPr lang="de-DE" sz="900" b="0" i="0" dirty="0">
                           <a:solidFill>
                             <a:srgbClr val="000000"/>
                           </a:solidFill>
@@ -2593,7 +2713,7 @@
                     <a:bodyPr/>
                     <a:lstStyle/>
                     <a:p>
-                      <a:pPr marL="316865" marR="184785" indent="-193675" algn="ctr">
+                      <a:pPr marL="180975" marR="184785" indent="0" algn="ctr">
                         <a:lnSpc>
                           <a:spcPct val="100000"/>
                         </a:lnSpc>
@@ -2607,16 +2727,18 @@
                             <a:srgbClr val="020302"/>
                           </a:solidFill>
                           <a:latin typeface="AdobeClean-Light"/>
+                          <a:ea typeface="+mn-ea"/>
                           <a:cs typeface="AdobeClean-Light"/>
                         </a:rPr>
                         <a:t>Geschäftszeiten/</a:t>
                       </a:r>
                       <a:br>
-                        <a:rPr lang="sk-SK" sz="900" dirty="0">
+                        <a:rPr lang="de-DE" sz="900" dirty="0">
                           <a:solidFill>
                             <a:srgbClr val="020302"/>
                           </a:solidFill>
                           <a:latin typeface="AdobeClean-Light"/>
+                          <a:ea typeface="+mn-ea"/>
                           <a:cs typeface="AdobeClean-Light"/>
                         </a:rPr>
                       </a:br>
@@ -2626,13 +2748,14 @@
                             <a:srgbClr val="020302"/>
                           </a:solidFill>
                           <a:latin typeface="AdobeClean-Light"/>
+                          <a:ea typeface="+mn-ea"/>
                           <a:cs typeface="AdobeClean-Light"/>
                         </a:rPr>
                         <a:t>4 Stunden</a:t>
                       </a:r>
                     </a:p>
                   </a:txBody>
-                  <a:tcPr anchor="ctr">
+                  <a:tcPr marL="0" marR="0" marT="91440" marB="91440" anchor="ctr" anchorCtr="1">
                     <a:lnL w="3175">
                       <a:solidFill>
                         <a:srgbClr val="B7B8B8"/>
@@ -2664,12 +2787,12 @@
                     <a:bodyPr/>
                     <a:lstStyle/>
                     <a:p>
-                      <a:pPr marL="317500" marR="184785" indent="-194310" algn="ctr">
+                      <a:pPr marL="180975" marR="184150" indent="0" algn="ctr">
                         <a:lnSpc>
                           <a:spcPct val="100000"/>
                         </a:lnSpc>
                         <a:spcBef>
-                          <a:spcPts val="670"/>
+                          <a:spcPts val="645"/>
                         </a:spcBef>
                       </a:pPr>
                       <a:r>
@@ -2678,16 +2801,18 @@
                             <a:srgbClr val="020302"/>
                           </a:solidFill>
                           <a:latin typeface="AdobeClean-Light"/>
+                          <a:ea typeface="+mn-ea"/>
                           <a:cs typeface="AdobeClean-Light"/>
                         </a:rPr>
                         <a:t>Geschäftszeiten/</a:t>
                       </a:r>
                       <a:br>
-                        <a:rPr lang="sk-SK" sz="900" dirty="0">
+                        <a:rPr lang="de-DE" sz="900" dirty="0">
                           <a:solidFill>
                             <a:srgbClr val="020302"/>
                           </a:solidFill>
                           <a:latin typeface="AdobeClean-Light"/>
+                          <a:ea typeface="+mn-ea"/>
                           <a:cs typeface="AdobeClean-Light"/>
                         </a:rPr>
                       </a:br>
@@ -2697,13 +2822,14 @@
                             <a:srgbClr val="020302"/>
                           </a:solidFill>
                           <a:latin typeface="AdobeClean-Light"/>
+                          <a:ea typeface="+mn-ea"/>
                           <a:cs typeface="AdobeClean-Light"/>
                         </a:rPr>
                         <a:t>2 Stunden</a:t>
                       </a:r>
                     </a:p>
                   </a:txBody>
-                  <a:tcPr anchor="ctr">
+                  <a:tcPr marL="0" marR="0" marT="91440" marB="91440" anchor="ctr" anchorCtr="1">
                     <a:lnL w="3175">
                       <a:solidFill>
                         <a:srgbClr val="B7B8B8"/>
@@ -2741,7 +2867,7 @@
                   </a:ext>
                 </a:extLst>
               </a:tr>
-              <a:tr h="484756">
+              <a:tr h="514673">
                 <a:tc>
                   <a:txBody>
                     <a:bodyPr/>
@@ -2756,7 +2882,7 @@
                         </a:spcBef>
                       </a:pPr>
                       <a:r>
-                        <a:rPr lang="de-DE" sz="900" b="1">
+                        <a:rPr lang="de-DE" sz="900" b="1" dirty="0">
                           <a:solidFill>
                             <a:srgbClr val="020302"/>
                           </a:solidFill>
@@ -2776,7 +2902,7 @@
                         </a:spcBef>
                       </a:pPr>
                       <a:r>
-                        <a:rPr kumimoji="0" lang="de-DE" sz="900" b="0" i="0" u="none" strike="noStrike" cap="none" normalizeH="0" baseline="0" noProof="0">
+                        <a:rPr kumimoji="0" lang="de-DE" sz="900" b="0" i="0" u="none" strike="noStrike" cap="none" normalizeH="0" baseline="0" noProof="0" dirty="0">
                           <a:ln>
                             <a:noFill/>
                           </a:ln>
@@ -2825,7 +2951,7 @@
                     <a:bodyPr/>
                     <a:lstStyle/>
                     <a:p>
-                      <a:pPr marL="313690" marR="184150" indent="-189865" algn="ctr">
+                      <a:pPr marL="180975" marR="184150" indent="0" algn="ctr">
                         <a:lnSpc>
                           <a:spcPct val="100000"/>
                         </a:lnSpc>
@@ -2839,16 +2965,18 @@
                             <a:srgbClr val="020302"/>
                           </a:solidFill>
                           <a:latin typeface="AdobeClean-Light"/>
+                          <a:ea typeface="+mn-ea"/>
                           <a:cs typeface="AdobeClean-Light"/>
                         </a:rPr>
                         <a:t>Geschäftszeiten/</a:t>
                       </a:r>
                       <a:br>
-                        <a:rPr lang="sk-SK" sz="900" dirty="0">
+                        <a:rPr lang="de-DE" sz="900" dirty="0">
                           <a:solidFill>
                             <a:srgbClr val="020302"/>
                           </a:solidFill>
                           <a:latin typeface="AdobeClean-Light"/>
+                          <a:ea typeface="+mn-ea"/>
                           <a:cs typeface="AdobeClean-Light"/>
                         </a:rPr>
                       </a:br>
@@ -2858,13 +2986,14 @@
                             <a:srgbClr val="020302"/>
                           </a:solidFill>
                           <a:latin typeface="AdobeClean-Light"/>
+                          <a:ea typeface="+mn-ea"/>
                           <a:cs typeface="AdobeClean-Light"/>
                         </a:rPr>
                         <a:t>6 Stunden</a:t>
                       </a:r>
                     </a:p>
                   </a:txBody>
-                  <a:tcPr anchor="ctr">
+                  <a:tcPr marL="0" marR="0" marT="91440" marB="91440" anchor="ctr" anchorCtr="1">
                     <a:lnL w="3175">
                       <a:solidFill>
                         <a:srgbClr val="B7B8B8"/>
@@ -2896,7 +3025,7 @@
                     <a:bodyPr/>
                     <a:lstStyle/>
                     <a:p>
-                      <a:pPr marL="316230" marR="185420" indent="-193675" algn="ctr">
+                      <a:pPr marL="180975" marR="184150" indent="0" algn="ctr">
                         <a:lnSpc>
                           <a:spcPct val="100000"/>
                         </a:lnSpc>
@@ -2910,16 +3039,18 @@
                             <a:srgbClr val="020302"/>
                           </a:solidFill>
                           <a:latin typeface="AdobeClean-Light"/>
+                          <a:ea typeface="+mn-ea"/>
                           <a:cs typeface="AdobeClean-Light"/>
                         </a:rPr>
                         <a:t>Geschäftszeiten/</a:t>
                       </a:r>
                       <a:br>
-                        <a:rPr lang="sk-SK" sz="900" dirty="0">
+                        <a:rPr lang="de-DE" sz="900" dirty="0">
                           <a:solidFill>
                             <a:srgbClr val="020302"/>
                           </a:solidFill>
                           <a:latin typeface="AdobeClean-Light"/>
+                          <a:ea typeface="+mn-ea"/>
                           <a:cs typeface="AdobeClean-Light"/>
                         </a:rPr>
                       </a:br>
@@ -2929,13 +3060,14 @@
                             <a:srgbClr val="020302"/>
                           </a:solidFill>
                           <a:latin typeface="AdobeClean-Light"/>
+                          <a:ea typeface="+mn-ea"/>
                           <a:cs typeface="AdobeClean-Light"/>
                         </a:rPr>
                         <a:t>4 Stunden</a:t>
                       </a:r>
                     </a:p>
                   </a:txBody>
-                  <a:tcPr anchor="ctr">
+                  <a:tcPr marL="0" marR="0" marT="91440" marB="91440" anchor="ctr" anchorCtr="1">
                     <a:lnL w="3175">
                       <a:solidFill>
                         <a:srgbClr val="B7B8B8"/>
@@ -2973,7 +3105,7 @@
                   </a:ext>
                 </a:extLst>
               </a:tr>
-              <a:tr h="359998">
+              <a:tr h="388333">
                 <a:tc>
                   <a:txBody>
                     <a:bodyPr/>
@@ -3075,30 +3207,11 @@
                           <a:latin typeface="AdobeClean-Light"/>
                           <a:cs typeface="AdobeClean-Light"/>
                         </a:rPr>
-                        <a:t>Geschäftstage/</a:t>
-                      </a:r>
-                      <a:br>
-                        <a:rPr lang="sk-SK" sz="900" dirty="0">
-                          <a:solidFill>
-                            <a:srgbClr val="020302"/>
-                          </a:solidFill>
-                          <a:latin typeface="AdobeClean-Light"/>
-                          <a:cs typeface="AdobeClean-Light"/>
-                        </a:rPr>
-                      </a:br>
-                      <a:r>
-                        <a:rPr lang="de-DE" sz="900" dirty="0">
-                          <a:solidFill>
-                            <a:srgbClr val="020302"/>
-                          </a:solidFill>
-                          <a:latin typeface="AdobeClean-Light"/>
-                          <a:cs typeface="AdobeClean-Light"/>
-                        </a:rPr>
-                        <a:t>3 Tage</a:t>
+                        <a:t>  Geschäftstage/3 Tage</a:t>
                       </a:r>
                     </a:p>
                   </a:txBody>
-                  <a:tcPr anchor="ctr">
+                  <a:tcPr marL="0" marR="0" marT="91440" marB="91440" anchor="ctr" anchorCtr="1">
                     <a:lnL w="3175">
                       <a:solidFill>
                         <a:srgbClr val="B7B8B8"/>
@@ -3146,31 +3259,11 @@
                           <a:latin typeface="AdobeClean-Light"/>
                           <a:cs typeface="AdobeClean-Light"/>
                         </a:rPr>
-                        <a:t>Geschäftstage/ </a:t>
-                      </a:r>
-                    </a:p>
-                    <a:p>
-                      <a:pPr marL="370840" marR="223520" indent="-202565" algn="ctr">
-                        <a:lnSpc>
-                          <a:spcPct val="100000"/>
-                        </a:lnSpc>
-                        <a:spcBef>
-                          <a:spcPts val="155"/>
-                        </a:spcBef>
-                      </a:pPr>
-                      <a:r>
-                        <a:rPr lang="de-DE" sz="900" dirty="0">
-                          <a:solidFill>
-                            <a:srgbClr val="020302"/>
-                          </a:solidFill>
-                          <a:latin typeface="AdobeClean-Light"/>
-                          <a:cs typeface="AdobeClean-Light"/>
-                        </a:rPr>
-                        <a:t>  1 Tag</a:t>
+                        <a:t>Geschäftstage/1 Tag</a:t>
                       </a:r>
                     </a:p>
                   </a:txBody>
-                  <a:tcPr anchor="ctr">
+                  <a:tcPr marL="0" marR="0" marT="91440" marB="91440" anchor="ctr" anchorCtr="1">
                     <a:lnL w="3175">
                       <a:solidFill>
                         <a:srgbClr val="B7B8B8"/>
@@ -3227,14 +3320,14 @@
           <p:nvPr>
             <p:extLst>
               <p:ext uri="{D42A27DB-BD31-4B8C-83A1-F6EECF244321}">
-                <p14:modId xmlns:p14="http://schemas.microsoft.com/office/powerpoint/2010/main" val="2765821326"/>
+                <p14:modId xmlns:p14="http://schemas.microsoft.com/office/powerpoint/2010/main" val="3826676745"/>
               </p:ext>
             </p:extLst>
           </p:nvPr>
         </p:nvGraphicFramePr>
         <p:xfrm>
           <a:off x="121147" y="2120949"/>
-          <a:ext cx="7498851" cy="4714546"/>
+          <a:ext cx="7498851" cy="4815558"/>
         </p:xfrm>
         <a:graphic>
           <a:graphicData uri="http://schemas.openxmlformats.org/drawingml/2006/table">
@@ -3278,7 +3371,7 @@
                     <a:bodyPr/>
                     <a:lstStyle/>
                     <a:p>
-                      <a:endParaRPr lang="en-US" dirty="0"/>
+                      <a:endParaRPr lang="en-US"/>
                     </a:p>
                   </a:txBody>
                   <a:tcPr/>
@@ -3316,7 +3409,7 @@
                         <a:defRPr/>
                       </a:pPr>
                       <a:r>
-                        <a:rPr lang="de-DE" sz="900">
+                        <a:rPr lang="de-DE" sz="900" dirty="0">
                           <a:solidFill>
                             <a:srgbClr val="404040"/>
                           </a:solidFill>
@@ -3365,7 +3458,7 @@
                         </a:spcBef>
                       </a:pPr>
                       <a:r>
-                        <a:rPr lang="de-DE" sz="900">
+                        <a:rPr lang="de-DE" sz="900" dirty="0">
                           <a:solidFill>
                             <a:srgbClr val="FFFFFF"/>
                           </a:solidFill>
@@ -3519,7 +3612,7 @@
                         <a:defRPr/>
                       </a:pPr>
                       <a:r>
-                        <a:rPr lang="de-DE" sz="800" i="1">
+                        <a:rPr lang="de-DE" sz="800" i="1" dirty="0">
                           <a:solidFill>
                             <a:schemeClr val="bg1"/>
                           </a:solidFill>
@@ -3589,7 +3682,7 @@
                         </a:spcBef>
                       </a:pPr>
                       <a:r>
-                        <a:rPr lang="de-DE" sz="1000" b="1" i="0">
+                        <a:rPr lang="de-DE" sz="1000" b="1" i="0" dirty="0">
                           <a:solidFill>
                             <a:schemeClr val="bg1"/>
                           </a:solidFill>
@@ -3823,7 +3916,7 @@
                         </a:spcBef>
                       </a:pPr>
                       <a:r>
-                        <a:rPr lang="de-DE" sz="900">
+                        <a:rPr lang="de-DE" sz="900" dirty="0">
                           <a:solidFill>
                             <a:srgbClr val="020302"/>
                           </a:solidFill>
@@ -4206,7 +4299,7 @@
                         </a:spcBef>
                       </a:pPr>
                       <a:r>
-                        <a:rPr lang="de-DE" sz="900">
+                        <a:rPr lang="de-DE" sz="900" dirty="0">
                           <a:solidFill>
                             <a:srgbClr val="020302"/>
                           </a:solidFill>
@@ -5352,7 +5445,7 @@
                         </a:spcBef>
                       </a:pPr>
                       <a:r>
-                        <a:rPr lang="de-DE" sz="900">
+                        <a:rPr lang="de-DE" sz="900" dirty="0">
                           <a:solidFill>
                             <a:srgbClr val="020302"/>
                           </a:solidFill>
@@ -5638,14 +5731,33 @@
                         </a:spcBef>
                       </a:pPr>
                       <a:r>
-                        <a:rPr lang="de-DE" sz="900" spc="-30" baseline="0" dirty="0">
+                        <a:rPr lang="de-DE" sz="900" dirty="0">
                           <a:solidFill>
                             <a:srgbClr val="020302"/>
                           </a:solidFill>
                           <a:latin typeface="AdobeClean-Light"/>
                           <a:cs typeface="AdobeClean-Light"/>
                         </a:rPr>
-                        <a:t>Prüfung von Freigabe, Migration, Aktualisierung und Produkt-Roadmap</a:t>
+                        <a:t>Prüfung von Freigabe, Migration, Aktualisierung </a:t>
+                      </a:r>
+                      <a:br>
+                        <a:rPr lang="de-DE" sz="900" dirty="0">
+                          <a:solidFill>
+                            <a:srgbClr val="020302"/>
+                          </a:solidFill>
+                          <a:latin typeface="AdobeClean-Light"/>
+                          <a:cs typeface="AdobeClean-Light"/>
+                        </a:rPr>
+                      </a:br>
+                      <a:r>
+                        <a:rPr lang="de-DE" sz="900" dirty="0">
+                          <a:solidFill>
+                            <a:srgbClr val="020302"/>
+                          </a:solidFill>
+                          <a:latin typeface="AdobeClean-Light"/>
+                          <a:cs typeface="AdobeClean-Light"/>
+                        </a:rPr>
+                        <a:t>und Produkt-Roadmap</a:t>
                       </a:r>
                     </a:p>
                   </a:txBody>
@@ -5787,11 +5899,25 @@
                         </a:spcBef>
                       </a:pPr>
                       <a:r>
-                        <a:rPr lang="de-DE" sz="900">
+                        <a:rPr lang="de-DE" sz="900" dirty="0">
                           <a:latin typeface="AdobeClean-Light"/>
                           <a:cs typeface="AdobeClean-Light"/>
                         </a:rPr>
-                        <a:t>Cloud-Support-Aktivitäten – Experience Manager as a Cloud Service</a:t>
+                        <a:t>Cloud-Support-Aktivitäten – Experience Manager </a:t>
+                      </a:r>
+                      <a:r>
+                        <a:rPr lang="de-DE" sz="900" dirty="0" err="1">
+                          <a:latin typeface="AdobeClean-Light"/>
+                          <a:cs typeface="AdobeClean-Light"/>
+                        </a:rPr>
+                        <a:t>as</a:t>
+                      </a:r>
+                      <a:r>
+                        <a:rPr lang="de-DE" sz="900" dirty="0">
+                          <a:latin typeface="AdobeClean-Light"/>
+                          <a:cs typeface="AdobeClean-Light"/>
+                        </a:rPr>
+                        <a:t> a Cloud Service</a:t>
                       </a:r>
                     </a:p>
                   </a:txBody>
@@ -6451,10 +6577,10 @@
                 </a:solidFill>
                 <a:latin typeface="Adobe Clean Light" panose="020B0303020404020204" pitchFamily="34" charset="0"/>
               </a:rPr>
-              <a:t>Ein spezialisierter Account Support </a:t>
+              <a:t>Ein spezialisierter Account Support Lead überwacht proaktiv Fälle, fördert die Team-übergreifende Zusammenarbeit, stellt Onboarding-Webinare bereit, führt Service-Berichte aus, bietet Unterstützung bei </a:t>
             </a:r>
             <a:br>
-              <a:rPr lang="sk-SK" sz="1000" dirty="0">
+              <a:rPr lang="de-DE" sz="1000" dirty="0">
                 <a:solidFill>
                   <a:srgbClr val="000000"/>
                 </a:solidFill>
@@ -6468,41 +6594,7 @@
                 </a:solidFill>
                 <a:latin typeface="Adobe Clean Light" panose="020B0303020404020204" pitchFamily="34" charset="0"/>
               </a:rPr>
-              <a:t>Lead überwacht proaktiv Fälle, fördert </a:t>
-            </a:r>
-            <a:br>
-              <a:rPr lang="sk-SK" sz="1000" dirty="0">
-                <a:solidFill>
-                  <a:srgbClr val="000000"/>
-                </a:solidFill>
-                <a:latin typeface="Adobe Clean Light" panose="020B0303020404020204" pitchFamily="34" charset="0"/>
-              </a:rPr>
-            </a:br>
-            <a:r>
-              <a:rPr lang="de-DE" sz="1000" dirty="0">
-                <a:solidFill>
-                  <a:srgbClr val="000000"/>
-                </a:solidFill>
-                <a:latin typeface="Adobe Clean Light" panose="020B0303020404020204" pitchFamily="34" charset="0"/>
-              </a:rPr>
-              <a:t>die Team-übergreifende Zusammenarbeit, stellt Onboarding-Webinare bereit, führt Service-Berichte aus, bietet Unterstützung </a:t>
-            </a:r>
-            <a:br>
-              <a:rPr lang="sk-SK" sz="1000" dirty="0">
-                <a:solidFill>
-                  <a:srgbClr val="000000"/>
-                </a:solidFill>
-                <a:latin typeface="Adobe Clean Light" panose="020B0303020404020204" pitchFamily="34" charset="0"/>
-              </a:rPr>
-            </a:br>
-            <a:r>
-              <a:rPr lang="de-DE" sz="1000" dirty="0">
-                <a:solidFill>
-                  <a:srgbClr val="000000"/>
-                </a:solidFill>
-                <a:latin typeface="Adobe Clean Light" panose="020B0303020404020204" pitchFamily="34" charset="0"/>
-              </a:rPr>
-              <a:t>bei nicht-technischem Support und fungiert als Eskalationsstelle und interne Kontaktperson zum Adobe Support.</a:t>
+              <a:t>nicht-technischem Support und fungiert als Eskalationsstelle und interne Kontaktperson zum Adobe Support.</a:t>
             </a:r>
           </a:p>
         </p:txBody>
@@ -6515,7 +6607,7 @@
         </p:nvSpPr>
         <p:spPr>
           <a:xfrm>
-            <a:off x="2836967" y="8618616"/>
+            <a:off x="2836967" y="8508126"/>
             <a:ext cx="2286000" cy="795089"/>
           </a:xfrm>
           <a:prstGeom prst="rect">
@@ -6523,7 +6615,7 @@
           </a:prstGeom>
         </p:spPr>
         <p:txBody>
-          <a:bodyPr vert="horz" wrap="square" lIns="0" tIns="12700" rIns="0" bIns="0" rtlCol="0">
+          <a:bodyPr vert="horz" wrap="square" lIns="0" tIns="12700" rIns="0" bIns="0" rtlCol="0" anchor="t">
             <a:spAutoFit/>
           </a:bodyPr>
           <a:lstStyle/>
@@ -6550,7 +6642,7 @@
               <a:t>Starten Sie eine Chat-Session, </a:t>
             </a:r>
             <a:br>
-              <a:rPr lang="sk-SK" sz="1000" dirty="0">
+              <a:rPr lang="de-DE" sz="1000" dirty="0">
                 <a:solidFill>
                   <a:srgbClr val="020302"/>
                 </a:solidFill>
@@ -6566,14 +6658,30 @@
                 <a:latin typeface="AdobeClean-Light"/>
                 <a:cs typeface="AdobeClean-Light"/>
               </a:rPr>
-              <a:t>um Antworten und Hilfe bei der Fallübermittlung zu erhalten</a:t>
+              <a:t>um Antworten und Hilfe bei </a:t>
+            </a:r>
+            <a:br>
+              <a:rPr lang="de-DE" sz="1000" dirty="0">
+                <a:solidFill>
+                  <a:srgbClr val="020302"/>
+                </a:solidFill>
+                <a:latin typeface="AdobeClean-Light"/>
+                <a:cs typeface="AdobeClean-Light"/>
+              </a:rPr>
+            </a:br>
+            <a:r>
+              <a:rPr lang="de-DE" sz="1000" dirty="0">
+                <a:solidFill>
+                  <a:srgbClr val="020302"/>
+                </a:solidFill>
+                <a:latin typeface="AdobeClean-Light"/>
+                <a:cs typeface="AdobeClean-Light"/>
+              </a:rPr>
+              <a:t>der Fallübermittlung zu erhalten.</a:t>
             </a:r>
           </a:p>
           <a:p>
             <a:pPr marL="33020" marR="159385">
-              <a:lnSpc>
-                <a:spcPct val="100000"/>
-              </a:lnSpc>
               <a:spcBef>
                 <a:spcPts val="100"/>
               </a:spcBef>
@@ -6589,10 +6697,10 @@
                 <a:latin typeface="AdobeClean-LightIt"/>
                 <a:cs typeface="AdobeClean-LightIt"/>
               </a:rPr>
-              <a:t>*Nicht alle Produkte verfügen </a:t>
+              <a:t>*Nicht alle Produkte verfügen über </a:t>
             </a:r>
             <a:br>
-              <a:rPr lang="sk-SK" sz="1000" i="1" dirty="0">
+              <a:rPr lang="de-DE" sz="1000" i="1" dirty="0">
                 <a:solidFill>
                   <a:srgbClr val="7A7A7A"/>
                 </a:solidFill>
@@ -6608,7 +6716,7 @@
                 <a:latin typeface="AdobeClean-LightIt"/>
                 <a:cs typeface="AdobeClean-LightIt"/>
               </a:rPr>
-              <a:t>über Live-Chat-Support</a:t>
+              <a:t>Live-Chat-Support</a:t>
             </a:r>
             <a:r>
               <a:rPr lang="de-DE" sz="900" i="1" dirty="0">
@@ -6618,7 +6726,7 @@
                 <a:latin typeface="AdobeClean-LightIt"/>
                 <a:cs typeface="AdobeClean-LightIt"/>
               </a:rPr>
-              <a:t>.  </a:t>
+              <a:t>.  </a:t>
             </a:r>
           </a:p>
         </p:txBody>
@@ -6790,7 +6898,7 @@
               <a:t>Kontinuierlicher Online-Zugriff auf eine wachsende Datenbank technischer Lösungen, Produktdokumentationen, FAQs und mehr. Tausende von Kunden können sich über </a:t>
             </a:r>
             <a:br>
-              <a:rPr lang="sk-SK" sz="1000" dirty="0">
+              <a:rPr lang="de-DE" sz="1000" dirty="0">
                 <a:solidFill>
                   <a:srgbClr val="000000"/>
                 </a:solidFill>
@@ -6825,8 +6933,8 @@
         </p:nvSpPr>
         <p:spPr>
           <a:xfrm>
-            <a:off x="5851290" y="6277305"/>
-            <a:ext cx="1316707" cy="184666"/>
+            <a:off x="5809380" y="6277305"/>
+            <a:ext cx="1647054" cy="184666"/>
           </a:xfrm>
           <a:prstGeom prst="rect">
             <a:avLst/>
@@ -6847,12 +6955,20 @@
               </a:spcAft>
             </a:pPr>
             <a:r>
-              <a:rPr lang="de-DE" sz="1200" b="1">
+              <a:rPr lang="de-DE" sz="1200" b="1" spc="-20" dirty="0" err="1">
                 <a:latin typeface="+mj-lt"/>
                 <a:ea typeface="Open Sans" pitchFamily="34" charset="0"/>
                 <a:cs typeface="Open Sans" pitchFamily="34" charset="0"/>
               </a:rPr>
-              <a:t>Journeys für die Selbsthilfe</a:t>
+              <a:t>Journeys</a:t>
+            </a:r>
+            <a:r>
+              <a:rPr lang="de-DE" sz="1200" b="1" spc="-20" dirty="0">
+                <a:latin typeface="+mj-lt"/>
+                <a:ea typeface="Open Sans" pitchFamily="34" charset="0"/>
+                <a:cs typeface="Open Sans" pitchFamily="34" charset="0"/>
+              </a:rPr>
+              <a:t> für die Selbsthilfe</a:t>
             </a:r>
           </a:p>
         </p:txBody>
@@ -6891,10 +7007,10 @@
                 </a:solidFill>
                 <a:latin typeface="Adobe Clean Light" panose="020B0303020404020204" pitchFamily="34" charset="0"/>
               </a:rPr>
-              <a:t>Experience Maker entstehen in </a:t>
+              <a:t>Experience Maker entstehen in der </a:t>
             </a:r>
             <a:br>
-              <a:rPr lang="sk-SK" sz="1000" dirty="0">
+              <a:rPr lang="de-DE" sz="1000" dirty="0">
                 <a:solidFill>
                   <a:srgbClr val="000000"/>
                 </a:solidFill>
@@ -6908,10 +7024,10 @@
                 </a:solidFill>
                 <a:latin typeface="Adobe Clean Light" panose="020B0303020404020204" pitchFamily="34" charset="0"/>
               </a:rPr>
-              <a:t>der Experience League. Kunden können </a:t>
+              <a:t>Experience League. Kunden können durch personalisiertes Lernen ihre Customer-Experience-Management-Fähigkeiten entwickeln, mit einer globalen Community anderer Anwender interagieren und so </a:t>
             </a:r>
             <a:br>
-              <a:rPr lang="sk-SK" sz="1000" dirty="0">
+              <a:rPr lang="de-DE" sz="1000" dirty="0">
                 <a:solidFill>
                   <a:srgbClr val="000000"/>
                 </a:solidFill>
@@ -6925,24 +7041,7 @@
                 </a:solidFill>
                 <a:latin typeface="Adobe Clean Light" panose="020B0303020404020204" pitchFamily="34" charset="0"/>
               </a:rPr>
-              <a:t>durch personalisiertes Lernen ihre Customer-Experience-Management-Fähigkeiten entwickeln, mit einer globalen Community anderer Anwender interagieren und </a:t>
-            </a:r>
-            <a:br>
-              <a:rPr lang="sk-SK" sz="1000" dirty="0">
-                <a:solidFill>
-                  <a:srgbClr val="000000"/>
-                </a:solidFill>
-                <a:latin typeface="Adobe Clean Light" panose="020B0303020404020204" pitchFamily="34" charset="0"/>
-              </a:rPr>
-            </a:br>
-            <a:r>
-              <a:rPr lang="de-DE" sz="1000" dirty="0">
-                <a:solidFill>
-                  <a:srgbClr val="000000"/>
-                </a:solidFill>
-                <a:latin typeface="Adobe Clean Light" panose="020B0303020404020204" pitchFamily="34" charset="0"/>
-              </a:rPr>
-              <a:t>so ihre eigene Karriere fördern.</a:t>
+              <a:t>ihre eigene Karriere fördern.</a:t>
             </a:r>
           </a:p>
         </p:txBody>
@@ -6963,7 +7062,7 @@
         </p:nvSpPr>
         <p:spPr>
           <a:xfrm>
-            <a:off x="3215895" y="8150141"/>
+            <a:off x="3215895" y="8039651"/>
             <a:ext cx="2520000" cy="184666"/>
           </a:xfrm>
           <a:prstGeom prst="rect">
@@ -7016,7 +7115,7 @@
         </p:nvSpPr>
         <p:spPr>
           <a:xfrm>
-            <a:off x="3198434" y="8373543"/>
+            <a:off x="3198434" y="8263053"/>
             <a:ext cx="840166" cy="184666"/>
           </a:xfrm>
           <a:prstGeom prst="rect">
@@ -7192,7 +7291,7 @@
               <a:t> können Probleme über </a:t>
             </a:r>
             <a:br>
-              <a:rPr lang="sk-SK" sz="1000" dirty="0">
+              <a:rPr lang="de-DE" sz="1000" dirty="0">
                 <a:latin typeface="Adobe Clean Light" panose="020B0303020404020204" pitchFamily="34" charset="0"/>
               </a:rPr>
             </a:br>
@@ -7203,7 +7302,7 @@
               <a:t>alle verfügbaren Kanäle (einschließlich </a:t>
             </a:r>
             <a:br>
-              <a:rPr lang="sk-SK" sz="1000" dirty="0">
+              <a:rPr lang="de-DE" sz="1000" dirty="0">
                 <a:latin typeface="Adobe Clean Light" panose="020B0303020404020204" pitchFamily="34" charset="0"/>
               </a:rPr>
             </a:br>
@@ -7326,7 +7425,7 @@
         <p:spPr>
           <a:xfrm>
             <a:off x="401995" y="5785009"/>
-            <a:ext cx="1848207" cy="45719"/>
+            <a:ext cx="2122130" cy="52875"/>
           </a:xfrm>
           <a:custGeom>
             <a:avLst/>
@@ -7421,8 +7520,8 @@
         </p:nvSpPr>
         <p:spPr>
           <a:xfrm>
-            <a:off x="384421" y="774495"/>
-            <a:ext cx="2011680" cy="0"/>
+            <a:off x="384420" y="774494"/>
+            <a:ext cx="2258767" cy="45719"/>
           </a:xfrm>
           <a:custGeom>
             <a:avLst/>
@@ -7469,7 +7568,7 @@
         </p:nvSpPr>
         <p:spPr>
           <a:xfrm>
-            <a:off x="240424" y="429188"/>
+            <a:off x="278524" y="429188"/>
             <a:ext cx="2163221" cy="307777"/>
           </a:xfrm>
           <a:prstGeom prst="rect">
@@ -7518,7 +7617,7 @@
         <p:spPr>
           <a:xfrm>
             <a:off x="2836967" y="1370913"/>
-            <a:ext cx="2286000" cy="1456681"/>
+            <a:ext cx="2286000" cy="1638462"/>
           </a:xfrm>
           <a:prstGeom prst="rect">
             <a:avLst/>
@@ -7542,7 +7641,29 @@
               <a:rPr lang="de-DE" sz="1000" dirty="0">
                 <a:latin typeface="Adobe Clean Light" panose="020B0303020404020204" pitchFamily="34" charset="0"/>
               </a:rPr>
-              <a:t>Kunden können Support-Fälle für Probleme der Kategorien P2, P3 und P4 während der regionalen Support-Zeit telefonisch melden. Es gibt keine Obergrenze für die Anzahl der Anrufe beim Support. Kunden können auch um einen Rückruf vom Support bitten oder ein Meeting über eine Remote-Desktop-Session anfordern, in der ein Problem demonstriert und gelöst werden kann.</a:t>
+              <a:t>Kunden können Support-Fälle für Probleme der Kategorien P2, P3 und P4 während der regionalen Support-Zeit telefonisch melden. Es gibt keine Obergrenze für die Anzahl </a:t>
+            </a:r>
+            <a:br>
+              <a:rPr lang="de-DE" sz="1000" dirty="0">
+                <a:latin typeface="Adobe Clean Light" panose="020B0303020404020204" pitchFamily="34" charset="0"/>
+              </a:rPr>
+            </a:br>
+            <a:r>
+              <a:rPr lang="de-DE" sz="1000" dirty="0">
+                <a:latin typeface="Adobe Clean Light" panose="020B0303020404020204" pitchFamily="34" charset="0"/>
+              </a:rPr>
+              <a:t>der Anrufe beim Support. Kunden können auch um einen Rückruf vom Support bitten </a:t>
+            </a:r>
+            <a:br>
+              <a:rPr lang="de-DE" sz="1000" dirty="0">
+                <a:latin typeface="Adobe Clean Light" panose="020B0303020404020204" pitchFamily="34" charset="0"/>
+              </a:rPr>
+            </a:br>
+            <a:r>
+              <a:rPr lang="de-DE" sz="1000" dirty="0">
+                <a:latin typeface="Adobe Clean Light" panose="020B0303020404020204" pitchFamily="34" charset="0"/>
+              </a:rPr>
+              <a:t>oder ein Meeting über eine Remote-Desktop-Session anfordern, in der ein Problem demonstriert und gelöst werden kann.</a:t>
             </a:r>
           </a:p>
         </p:txBody>
@@ -7632,7 +7753,7 @@
               </a:spcBef>
             </a:pPr>
             <a:r>
-              <a:rPr lang="de-DE" sz="1000">
+              <a:rPr lang="de-DE" sz="1000" dirty="0">
                 <a:solidFill>
                   <a:srgbClr val="4B4B4B"/>
                 </a:solidFill>
@@ -7681,7 +7802,7 @@
               </a:spcAft>
             </a:pPr>
             <a:r>
-              <a:rPr lang="de-DE" sz="1200" b="1">
+              <a:rPr lang="de-DE" sz="1200" b="1" dirty="0">
                 <a:solidFill>
                   <a:srgbClr val="020302"/>
                 </a:solidFill>
@@ -7708,7 +7829,7 @@
         </p:nvSpPr>
         <p:spPr>
           <a:xfrm>
-            <a:off x="838200" y="8148121"/>
+            <a:off x="838200" y="8037631"/>
             <a:ext cx="2520000" cy="184666"/>
           </a:xfrm>
           <a:prstGeom prst="rect">
@@ -7761,7 +7882,7 @@
         </p:nvSpPr>
         <p:spPr>
           <a:xfrm>
-            <a:off x="838200" y="8373543"/>
+            <a:off x="838200" y="8263053"/>
             <a:ext cx="604974" cy="184666"/>
           </a:xfrm>
           <a:prstGeom prst="rect">
@@ -7807,7 +7928,7 @@
         </p:nvSpPr>
         <p:spPr>
           <a:xfrm>
-            <a:off x="370040" y="8618616"/>
+            <a:off x="370040" y="8508126"/>
             <a:ext cx="2286000" cy="959237"/>
           </a:xfrm>
           <a:prstGeom prst="rect">
@@ -7830,7 +7951,7 @@
               <a:t>„Office Hours“ ist eine Initiative des Adobe Support-Teams. In diesen Sessions erhalten Teilnehmer Informationen, Hilfestellungen </a:t>
             </a:r>
             <a:br>
-              <a:rPr lang="sk-SK" sz="1000" dirty="0">
+              <a:rPr lang="de-DE" sz="1000" dirty="0">
                 <a:solidFill>
                   <a:srgbClr val="000000"/>
                 </a:solidFill>
@@ -7844,7 +7965,24 @@
                 </a:solidFill>
                 <a:latin typeface="Adobe Clean Light" panose="020B0303020404020204" pitchFamily="34" charset="0"/>
               </a:rPr>
-              <a:t>bei Problemen sowie Tipps und Tricks zur erfolgreichen Verwendung von Adobe Experience Cloud.</a:t>
+              <a:t>bei Problemen sowie Tipps und Tricks </a:t>
+            </a:r>
+            <a:br>
+              <a:rPr lang="de-DE" sz="1000" dirty="0">
+                <a:solidFill>
+                  <a:srgbClr val="000000"/>
+                </a:solidFill>
+                <a:latin typeface="Adobe Clean Light" panose="020B0303020404020204" pitchFamily="34" charset="0"/>
+              </a:rPr>
+            </a:br>
+            <a:r>
+              <a:rPr lang="de-DE" sz="1000" dirty="0">
+                <a:solidFill>
+                  <a:srgbClr val="000000"/>
+                </a:solidFill>
+                <a:latin typeface="Adobe Clean Light" panose="020B0303020404020204" pitchFamily="34" charset="0"/>
+              </a:rPr>
+              <a:t>zur erfolgreichen Verwendung von Adobe Experience Cloud.</a:t>
             </a:r>
           </a:p>
         </p:txBody>
@@ -7865,7 +8003,7 @@
         </p:nvSpPr>
         <p:spPr>
           <a:xfrm>
-            <a:off x="5851290" y="8373543"/>
+            <a:off x="5851290" y="8263053"/>
             <a:ext cx="1267206" cy="184666"/>
           </a:xfrm>
           <a:prstGeom prst="rect">
@@ -7911,7 +8049,7 @@
         </p:nvSpPr>
         <p:spPr>
           <a:xfrm>
-            <a:off x="5376301" y="8618616"/>
+            <a:off x="5376301" y="8508126"/>
             <a:ext cx="2286000" cy="1113125"/>
           </a:xfrm>
           <a:prstGeom prst="rect">
@@ -7931,24 +8069,7 @@
                 </a:solidFill>
                 <a:latin typeface="Adobe Clean Light" panose="020B0303020404020204" pitchFamily="34" charset="0"/>
               </a:rPr>
-              <a:t>On-Demand-Zugriff auf </a:t>
-            </a:r>
-            <a:br>
-              <a:rPr lang="sk-SK" sz="1000" dirty="0">
-                <a:solidFill>
-                  <a:srgbClr val="000000"/>
-                </a:solidFill>
-                <a:latin typeface="Adobe Clean Light" panose="020B0303020404020204" pitchFamily="34" charset="0"/>
-              </a:rPr>
-            </a:br>
-            <a:r>
-              <a:rPr lang="de-DE" sz="1000" dirty="0">
-                <a:solidFill>
-                  <a:srgbClr val="000000"/>
-                </a:solidFill>
-                <a:latin typeface="Adobe Clean Light" panose="020B0303020404020204" pitchFamily="34" charset="0"/>
-              </a:rPr>
-              <a:t>das Online-Selbsthilfe-Support-Portal, </a:t>
+              <a:t>On-Demand-Zugriff auf das Online-</a:t>
             </a:r>
             <a:br>
               <a:rPr lang="de-DE" sz="1000" dirty="0">
@@ -7965,10 +8086,10 @@
                 </a:solidFill>
                 <a:latin typeface="Adobe Clean Light" panose="020B0303020404020204" pitchFamily="34" charset="0"/>
               </a:rPr>
-              <a:t>um Support-Anfragen einzureichen, </a:t>
+              <a:t>Selbsthilfe-Support-Portal, um Support-Anfragen einzureichen, den Fallstatus </a:t>
             </a:r>
             <a:br>
-              <a:rPr lang="sk-SK" sz="1000" dirty="0">
+              <a:rPr lang="de-DE" sz="1000" dirty="0">
                 <a:solidFill>
                   <a:srgbClr val="000000"/>
                 </a:solidFill>
@@ -7982,10 +8103,10 @@
                 </a:solidFill>
                 <a:latin typeface="Adobe Clean Light" panose="020B0303020404020204" pitchFamily="34" charset="0"/>
               </a:rPr>
-              <a:t>den Fallstatus zu überprüfen und andere Ressourcen zu durchsuchen, z. B. unsere Wissensdatenbank, Neuigkeiten </a:t>
+              <a:t>zu überprüfen und andere Ressourcen zu durchsuchen, z. B. unsere Wissensdatenbank, Neuigkeiten und Hinweise, spezielle Tipps </a:t>
             </a:r>
             <a:br>
-              <a:rPr lang="sk-SK" sz="1000" dirty="0">
+              <a:rPr lang="de-DE" sz="1000" dirty="0">
                 <a:solidFill>
                   <a:srgbClr val="000000"/>
                 </a:solidFill>
@@ -7999,7 +8120,7 @@
                 </a:solidFill>
                 <a:latin typeface="Adobe Clean Light" panose="020B0303020404020204" pitchFamily="34" charset="0"/>
               </a:rPr>
-              <a:t>und Hinweise, spezielle Tipps und mehr.</a:t>
+              <a:t>und mehr.</a:t>
             </a:r>
           </a:p>
         </p:txBody>
@@ -8111,7 +8232,7 @@
           <a:lstStyle/>
           <a:p>
             <a:r>
-              <a:rPr lang="de-DE" sz="1200" b="1">
+              <a:rPr lang="de-DE" sz="1200" b="1" dirty="0">
                 <a:latin typeface="+mj-lt"/>
               </a:rPr>
               <a:t>Business Services</a:t>
@@ -8134,7 +8255,7 @@
         <p:spPr>
           <a:xfrm>
             <a:off x="370040" y="3875832"/>
-            <a:ext cx="2335059" cy="558999"/>
+            <a:ext cx="2342679" cy="558999"/>
           </a:xfrm>
           <a:prstGeom prst="rect">
             <a:avLst/>
@@ -8177,7 +8298,7 @@
         </p:nvSpPr>
         <p:spPr>
           <a:xfrm rot="5400000" flipH="1">
-            <a:off x="3863341" y="302967"/>
+            <a:off x="3863341" y="428697"/>
             <a:ext cx="45719" cy="5577840"/>
           </a:xfrm>
           <a:custGeom>
@@ -8288,7 +8409,7 @@
         </p:blipFill>
         <p:spPr>
           <a:xfrm>
-            <a:off x="2794208" y="8146218"/>
+            <a:off x="2794208" y="8035728"/>
             <a:ext cx="411480" cy="411480"/>
           </a:xfrm>
           <a:prstGeom prst="rect">
@@ -8483,7 +8604,7 @@
         </p:blipFill>
         <p:spPr>
           <a:xfrm>
-            <a:off x="5372908" y="8146218"/>
+            <a:off x="5372908" y="8035728"/>
             <a:ext cx="411480" cy="411480"/>
           </a:xfrm>
           <a:prstGeom prst="rect">
@@ -8522,7 +8643,7 @@
         </p:blipFill>
         <p:spPr>
           <a:xfrm>
-            <a:off x="384421" y="8146218"/>
+            <a:off x="384421" y="8035728"/>
             <a:ext cx="411480" cy="411480"/>
           </a:xfrm>
           <a:prstGeom prst="rect">
@@ -8544,7 +8665,7 @@
         </p:nvSpPr>
         <p:spPr>
           <a:xfrm rot="5400000" flipH="1">
-            <a:off x="3863341" y="4967117"/>
+            <a:off x="3863341" y="4997597"/>
             <a:ext cx="45719" cy="5577840"/>
           </a:xfrm>
           <a:custGeom>
@@ -8601,7 +8722,7 @@
         </p:nvSpPr>
         <p:spPr>
           <a:xfrm>
-            <a:off x="5851290" y="8150141"/>
+            <a:off x="5851290" y="8039651"/>
             <a:ext cx="2520000" cy="184666"/>
           </a:xfrm>
           <a:prstGeom prst="rect">
@@ -8654,7 +8775,7 @@
         </p:nvSpPr>
         <p:spPr>
           <a:xfrm>
-            <a:off x="5851290" y="6046398"/>
+            <a:off x="5809380" y="6046398"/>
             <a:ext cx="2520000" cy="184666"/>
           </a:xfrm>
           <a:prstGeom prst="rect">
@@ -8681,7 +8802,7 @@
               <a:defRPr/>
             </a:pPr>
             <a:r>
-              <a:rPr lang="de-DE" sz="1200">
+              <a:rPr lang="de-DE" sz="1200" dirty="0">
                 <a:solidFill>
                   <a:srgbClr val="000000"/>
                 </a:solidFill>
@@ -8890,7 +9011,7 @@
         <p:spPr>
           <a:xfrm>
             <a:off x="6754821" y="9283729"/>
-            <a:ext cx="930275" cy="662305"/>
+            <a:ext cx="1017579" cy="662305"/>
           </a:xfrm>
           <a:prstGeom prst="rect">
             <a:avLst/>
@@ -8911,7 +9032,7 @@
               </a:spcBef>
             </a:pPr>
             <a:r>
-              <a:rPr lang="de-DE" sz="800">
+              <a:rPr lang="de-DE" sz="800" dirty="0">
                 <a:solidFill>
                   <a:srgbClr val="777879"/>
                 </a:solidFill>
@@ -8928,7 +9049,7 @@
               </a:lnSpc>
             </a:pPr>
             <a:r>
-              <a:rPr lang="de-DE" sz="800">
+              <a:rPr lang="de-DE" sz="800" dirty="0">
                 <a:solidFill>
                   <a:srgbClr val="777879"/>
                 </a:solidFill>
@@ -8945,7 +9066,7 @@
               </a:lnSpc>
             </a:pPr>
             <a:r>
-              <a:rPr lang="de-DE" sz="800">
+              <a:rPr lang="de-DE" sz="800" dirty="0">
                 <a:solidFill>
                   <a:srgbClr val="777879"/>
                 </a:solidFill>
@@ -8965,7 +9086,7 @@
               </a:spcBef>
             </a:pPr>
             <a:r>
-              <a:rPr lang="de-DE" sz="800">
+              <a:rPr lang="de-DE" sz="800" dirty="0">
                 <a:solidFill>
                   <a:srgbClr val="777879"/>
                 </a:solidFill>
@@ -8985,7 +9106,7 @@
               </a:spcBef>
             </a:pPr>
             <a:r>
-              <a:rPr lang="de-DE" sz="800" u="sng">
+              <a:rPr lang="de-DE" sz="800" u="sng" dirty="0">
                 <a:solidFill>
                   <a:srgbClr val="5F5F5F"/>
                 </a:solidFill>
@@ -9153,14 +9274,14 @@
         <p:spPr>
           <a:xfrm>
             <a:off x="75947" y="9437110"/>
-            <a:ext cx="5809358" cy="570865"/>
+            <a:ext cx="5896662" cy="570865"/>
           </a:xfrm>
           <a:prstGeom prst="rect">
             <a:avLst/>
           </a:prstGeom>
         </p:spPr>
         <p:txBody>
-          <a:bodyPr vert="horz" wrap="square" lIns="0" tIns="29845" rIns="0" bIns="0" rtlCol="0">
+          <a:bodyPr vert="horz" wrap="square" lIns="0" tIns="29845" rIns="0" bIns="0" rtlCol="0" anchor="t">
             <a:spAutoFit/>
           </a:bodyPr>
           <a:lstStyle/>
@@ -9181,7 +9302,27 @@
                 <a:latin typeface="AdobeClean-LightIt"/>
                 <a:cs typeface="AdobeClean-LightIt"/>
               </a:rPr>
-              <a:t>Weitere Informationen zum Support-Angebot von Adobe sowie zum für Ihre Bedürfnisse geeigneten Support-Level erhalten Sie bei Ihrem spezifischen Account-Manager (NAM) oder Ihrem Customer Success Manager(CSM)</a:t>
+              <a:t>Weitere Informationen zum Support-Angebot von Adobe sowie zum für Ihre Bedürfnisse geeigneten Support-Level erhalten Sie bei Ihrem spezifischen Account-Manager (NAM) oder Ihrem Customer </a:t>
+            </a:r>
+            <a:r>
+              <a:rPr lang="de-DE" sz="1100" i="1" dirty="0" err="1">
+                <a:solidFill>
+                  <a:srgbClr val="777879"/>
+                </a:solidFill>
+                <a:latin typeface="AdobeClean-LightIt"/>
+                <a:cs typeface="AdobeClean-LightIt"/>
+              </a:rPr>
+              <a:t>Success</a:t>
+            </a:r>
+            <a:r>
+              <a:rPr lang="de-DE" sz="1100" i="1" dirty="0">
+                <a:solidFill>
+                  <a:srgbClr val="777879"/>
+                </a:solidFill>
+                <a:latin typeface="AdobeClean-LightIt"/>
+                <a:cs typeface="AdobeClean-LightIt"/>
+              </a:rPr>
+              <a:t> Manager (CSM).</a:t>
             </a:r>
           </a:p>
           <a:p>
@@ -9201,7 +9342,47 @@
                 <a:latin typeface="Adobe Clean"/>
                 <a:cs typeface="Adobe Clean"/>
               </a:rPr>
-              <a:t>©2021 Adobe. All Rights Reserved. Adobe Confidential.</a:t>
+              <a:t>©2021 Adobe. All Rights </a:t>
+            </a:r>
+            <a:r>
+              <a:rPr lang="de-DE" sz="800" dirty="0" err="1">
+                <a:solidFill>
+                  <a:srgbClr val="6D6D6D"/>
+                </a:solidFill>
+                <a:latin typeface="Adobe Clean"/>
+                <a:cs typeface="Adobe Clean"/>
+              </a:rPr>
+              <a:t>Reserved</a:t>
+            </a:r>
+            <a:r>
+              <a:rPr lang="de-DE" sz="800" dirty="0">
+                <a:solidFill>
+                  <a:srgbClr val="6D6D6D"/>
+                </a:solidFill>
+                <a:latin typeface="Adobe Clean"/>
+                <a:cs typeface="Adobe Clean"/>
+              </a:rPr>
+              <a:t>. Adobe </a:t>
+            </a:r>
+            <a:r>
+              <a:rPr lang="de-DE" sz="800" dirty="0" err="1">
+                <a:solidFill>
+                  <a:srgbClr val="6D6D6D"/>
+                </a:solidFill>
+                <a:latin typeface="Adobe Clean"/>
+                <a:cs typeface="Adobe Clean"/>
+              </a:rPr>
+              <a:t>Confidential</a:t>
+            </a:r>
+            <a:r>
+              <a:rPr lang="de-DE" sz="800" dirty="0">
+                <a:solidFill>
+                  <a:srgbClr val="6D6D6D"/>
+                </a:solidFill>
+                <a:latin typeface="Adobe Clean"/>
+                <a:cs typeface="Adobe Clean"/>
+              </a:rPr>
+              <a:t>.</a:t>
             </a:r>
           </a:p>
         </p:txBody>
@@ -9220,8 +9401,8 @@
         </p:nvSpPr>
         <p:spPr>
           <a:xfrm>
-            <a:off x="197233" y="5031270"/>
-            <a:ext cx="6956476" cy="755976"/>
+            <a:off x="197232" y="5031270"/>
+            <a:ext cx="7171307" cy="755976"/>
           </a:xfrm>
           <a:prstGeom prst="rect">
             <a:avLst/>
@@ -9265,7 +9446,7 @@
               <a:t>Das regionale Support-Angebot von Adobe wird durch Abgleich der Rechnungsadresse des Kunden (entsprechend dem Kundenauftrag </a:t>
             </a:r>
             <a:br>
-              <a:rPr lang="sk-SK" sz="1000" dirty="0">
+              <a:rPr lang="de-DE" sz="1000" dirty="0">
                 <a:solidFill>
                   <a:srgbClr val="1F1F1F"/>
                 </a:solidFill>
@@ -9299,7 +9480,7 @@
           <p:nvPr>
             <p:extLst>
               <p:ext uri="{D42A27DB-BD31-4B8C-83A1-F6EECF244321}">
-                <p14:modId xmlns:p14="http://schemas.microsoft.com/office/powerpoint/2010/main" val="3733326230"/>
+                <p14:modId xmlns:p14="http://schemas.microsoft.com/office/powerpoint/2010/main" val="1415246440"/>
               </p:ext>
             </p:extLst>
           </p:nvPr>
@@ -9426,7 +9607,7 @@
                         <a:t>Europa, Naher Osten </a:t>
                       </a:r>
                       <a:br>
-                        <a:rPr lang="sk-SK" sz="1100" dirty="0">
+                        <a:rPr lang="de-DE" sz="1100" dirty="0">
                           <a:solidFill>
                             <a:schemeClr val="tx1"/>
                           </a:solidFill>
@@ -10363,8 +10544,8 @@
         </p:nvSpPr>
         <p:spPr>
           <a:xfrm>
-            <a:off x="2678946" y="8528519"/>
-            <a:ext cx="1121529" cy="385445"/>
+            <a:off x="2534047" y="8528519"/>
+            <a:ext cx="1424544" cy="385445"/>
           </a:xfrm>
           <a:prstGeom prst="rect">
             <a:avLst/>
@@ -10376,7 +10557,7 @@
           </a:bodyPr>
           <a:lstStyle/>
           <a:p>
-            <a:pPr marL="139065" marR="5080" indent="-139065" algn="ctr">
+            <a:pPr marR="5080" algn="ctr">
               <a:lnSpc>
                 <a:spcPts val="1390"/>
               </a:lnSpc>
@@ -10411,8 +10592,8 @@
         </p:nvSpPr>
         <p:spPr>
           <a:xfrm>
-            <a:off x="4400550" y="8541244"/>
-            <a:ext cx="1314450" cy="203261"/>
+            <a:off x="4701855" y="8541244"/>
+            <a:ext cx="872176" cy="382797"/>
           </a:xfrm>
           <a:prstGeom prst="rect">
             <a:avLst/>
@@ -10424,7 +10605,7 @@
           </a:bodyPr>
           <a:lstStyle/>
           <a:p>
-            <a:pPr marL="139065" marR="5080" indent="-139065" algn="ctr">
+            <a:pPr marR="5080" algn="ctr">
               <a:lnSpc>
                 <a:spcPts val="1390"/>
               </a:lnSpc>
@@ -10440,27 +10621,7 @@
                 <a:latin typeface="Adobe Clean"/>
                 <a:cs typeface="Adobe Clean"/>
               </a:rPr>
-              <a:t>Schneller</a:t>
-            </a:r>
-            <a:r>
-              <a:rPr lang="sk-SK" sz="1200" b="1" dirty="0">
-                <a:solidFill>
-                  <a:srgbClr val="FFFFFF"/>
-                </a:solidFill>
-                <a:latin typeface="Adobe Clean"/>
-                <a:cs typeface="Adobe Clean"/>
-              </a:rPr>
-              <a:t> </a:t>
-            </a:r>
-            <a:r>
-              <a:rPr lang="de-DE" sz="1200" b="1" dirty="0">
-                <a:solidFill>
-                  <a:srgbClr val="FFFFFF"/>
-                </a:solidFill>
-                <a:latin typeface="Adobe Clean"/>
-                <a:cs typeface="Adobe Clean"/>
-              </a:rPr>
-              <a:t>Support</a:t>
+              <a:t>Schneller Support</a:t>
             </a:r>
           </a:p>
         </p:txBody>
@@ -10479,8 +10640,8 @@
         </p:nvSpPr>
         <p:spPr>
           <a:xfrm>
-            <a:off x="6466639" y="8543943"/>
-            <a:ext cx="810895" cy="385445"/>
+            <a:off x="6317295" y="8543943"/>
+            <a:ext cx="1124188" cy="385445"/>
           </a:xfrm>
           <a:prstGeom prst="rect">
             <a:avLst/>
@@ -10492,7 +10653,7 @@
           </a:bodyPr>
           <a:lstStyle/>
           <a:p>
-            <a:pPr marL="50800" marR="5080" indent="-51435">
+            <a:pPr marR="5080" algn="ctr">
               <a:lnSpc>
                 <a:spcPts val="1390"/>
               </a:lnSpc>
@@ -10528,7 +10689,7 @@
           <p:nvPr>
             <p:extLst>
               <p:ext uri="{D42A27DB-BD31-4B8C-83A1-F6EECF244321}">
-                <p14:modId xmlns:p14="http://schemas.microsoft.com/office/powerpoint/2010/main" val="2242981354"/>
+                <p14:modId xmlns:p14="http://schemas.microsoft.com/office/powerpoint/2010/main" val="1373196523"/>
               </p:ext>
             </p:extLst>
           </p:nvPr>
@@ -10544,14 +10705,14 @@
                 <a:tableStyleId>{5C22544A-7EE6-4342-B048-85BDC9FD1C3A}</a:tableStyleId>
               </a:tblPr>
               <a:tblGrid>
-                <a:gridCol w="3691964">
+                <a:gridCol w="3608144">
                   <a:extLst>
                     <a:ext uri="{9D8B030D-6E8A-4147-A177-3AD203B41FA5}">
                       <a16:colId xmlns:a16="http://schemas.microsoft.com/office/drawing/2014/main" val="2364693614"/>
                     </a:ext>
                   </a:extLst>
                 </a:gridCol>
-                <a:gridCol w="3676327">
+                <a:gridCol w="3760147">
                   <a:extLst>
                     <a:ext uri="{9D8B030D-6E8A-4147-A177-3AD203B41FA5}">
                       <a16:colId xmlns:a16="http://schemas.microsoft.com/office/drawing/2014/main" val="1545335406"/>
@@ -10570,7 +10731,7 @@
                           <a:solidFill>
                             <a:schemeClr val="tx1"/>
                           </a:solidFill>
-                          <a:latin typeface="Adobe Clean" panose="020B0503020404020204" pitchFamily="34" charset="0"/>
+                          <a:latin typeface="Adobe Clean"/>
                           <a:ea typeface="+mn-ea"/>
                           <a:cs typeface="+mn-cs"/>
                           <a:hlinkClick r:id="rId7"/>
@@ -10632,7 +10793,7 @@
                     <a:bodyPr/>
                     <a:lstStyle/>
                     <a:p>
-                      <a:pPr marL="0" marR="0" lvl="0" indent="0" defTabSz="914400" eaLnBrk="1" fontAlgn="auto" latinLnBrk="0" hangingPunct="1">
+                      <a:pPr marL="0" marR="0" lvl="0" indent="0" eaLnBrk="1" fontAlgn="auto" latinLnBrk="0" hangingPunct="1">
                         <a:lnSpc>
                           <a:spcPct val="100000"/>
                         </a:lnSpc>
@@ -10646,103 +10807,17 @@
                         <a:buSzTx/>
                         <a:buFontTx/>
                         <a:buNone/>
-                        <a:tabLst/>
-                        <a:defRPr/>
                       </a:pPr>
                       <a:r>
-                        <a:rPr lang="de-DE" sz="1000" b="0" spc="-20" baseline="0" dirty="0">
+                        <a:rPr lang="de-DE" sz="1000" b="0" dirty="0">
                           <a:solidFill>
                             <a:srgbClr val="000000"/>
                           </a:solidFill>
-                          <a:latin typeface="Adobe Clean Light" panose="020B0303020404020204" pitchFamily="34" charset="0"/>
+                          <a:latin typeface="Adobe Clean Light"/>
                           <a:ea typeface="+mn-ea"/>
                           <a:cs typeface="+mn-cs"/>
                         </a:rPr>
-                        <a:t>Mit der Experience League unterstützt Adobe Unternehmen dabei, </a:t>
-                      </a:r>
-                      <a:br>
-                        <a:rPr lang="sk-SK" sz="1000" b="0" spc="-20" baseline="0" dirty="0">
-                          <a:solidFill>
-                            <a:srgbClr val="000000"/>
-                          </a:solidFill>
-                          <a:latin typeface="Adobe Clean Light" panose="020B0303020404020204" pitchFamily="34" charset="0"/>
-                          <a:ea typeface="+mn-ea"/>
-                          <a:cs typeface="+mn-cs"/>
-                        </a:rPr>
-                      </a:br>
-                      <a:r>
-                        <a:rPr lang="de-DE" sz="1000" b="0" spc="-20" baseline="0" dirty="0">
-                          <a:solidFill>
-                            <a:srgbClr val="000000"/>
-                          </a:solidFill>
-                          <a:latin typeface="Adobe Clean Light" panose="020B0303020404020204" pitchFamily="34" charset="0"/>
-                          <a:ea typeface="+mn-ea"/>
-                          <a:cs typeface="+mn-cs"/>
-                        </a:rPr>
-                        <a:t>mit ihren Investitionen in Adobe optimale Ergebnisse zu erzielen. </a:t>
-                      </a:r>
-                      <a:br>
-                        <a:rPr lang="sk-SK" sz="1000" b="0" spc="-20" baseline="0" dirty="0">
-                          <a:solidFill>
-                            <a:srgbClr val="000000"/>
-                          </a:solidFill>
-                          <a:latin typeface="Adobe Clean Light" panose="020B0303020404020204" pitchFamily="34" charset="0"/>
-                          <a:ea typeface="+mn-ea"/>
-                          <a:cs typeface="+mn-cs"/>
-                        </a:rPr>
-                      </a:br>
-                      <a:r>
-                        <a:rPr lang="de-DE" sz="1000" b="0" spc="-20" baseline="0" dirty="0">
-                          <a:solidFill>
-                            <a:srgbClr val="000000"/>
-                          </a:solidFill>
-                          <a:latin typeface="Adobe Clean Light" panose="020B0303020404020204" pitchFamily="34" charset="0"/>
-                          <a:ea typeface="+mn-ea"/>
-                          <a:cs typeface="+mn-cs"/>
-                        </a:rPr>
-                        <a:t>An diesem zentralen Ort können Kunden auf einem personalisierten </a:t>
-                      </a:r>
-                      <a:br>
-                        <a:rPr lang="sk-SK" sz="1000" b="0" spc="-20" baseline="0" dirty="0">
-                          <a:solidFill>
-                            <a:srgbClr val="000000"/>
-                          </a:solidFill>
-                          <a:latin typeface="Adobe Clean Light" panose="020B0303020404020204" pitchFamily="34" charset="0"/>
-                          <a:ea typeface="+mn-ea"/>
-                          <a:cs typeface="+mn-cs"/>
-                        </a:rPr>
-                      </a:br>
-                      <a:r>
-                        <a:rPr lang="de-DE" sz="1000" b="0" spc="-20" baseline="0" dirty="0">
-                          <a:solidFill>
-                            <a:srgbClr val="000000"/>
-                          </a:solidFill>
-                          <a:latin typeface="Adobe Clean Light" panose="020B0303020404020204" pitchFamily="34" charset="0"/>
-                          <a:ea typeface="+mn-ea"/>
-                          <a:cs typeface="+mn-cs"/>
-                        </a:rPr>
-                        <a:t>Weg zum Erfolg lernen, Kontakte knüpfen und sich weiterentwickeln. </a:t>
-                      </a:r>
-                      <a:br>
-                        <a:rPr lang="sk-SK" sz="1000" b="0" spc="-20" baseline="0" dirty="0">
-                          <a:solidFill>
-                            <a:srgbClr val="000000"/>
-                          </a:solidFill>
-                          <a:latin typeface="Adobe Clean Light" panose="020B0303020404020204" pitchFamily="34" charset="0"/>
-                          <a:ea typeface="+mn-ea"/>
-                          <a:cs typeface="+mn-cs"/>
-                        </a:rPr>
-                      </a:br>
-                      <a:r>
-                        <a:rPr lang="de-DE" sz="1000" b="0" spc="-20" baseline="0" dirty="0">
-                          <a:solidFill>
-                            <a:srgbClr val="000000"/>
-                          </a:solidFill>
-                          <a:latin typeface="Adobe Clean Light" panose="020B0303020404020204" pitchFamily="34" charset="0"/>
-                          <a:ea typeface="+mn-ea"/>
-                          <a:cs typeface="+mn-cs"/>
-                        </a:rPr>
-                        <a:t>Dafür nutzen sie Selbsthilfe-Tutorials, Produktdokumentation, von Kursleitern geführte Schulungen, Community und technischen Support. </a:t>
+                        <a:t>Mit der Experience League unterstützt Adobe Unternehmen dabei, mit ihren Investitionen in Adobe optimale Ergebnisse zu erzielen. An diesem zentralen Ort können Kunden auf einem personalisierten Weg zum Erfolg lernen, Kontakte knüpfen und sich weiterentwickeln. Dafür nutzen sie Selbsthilfe-Tutorials, Produktdokumentation, von Kursleitern geführte Schulungen, Community und technischen Support. </a:t>
                       </a:r>
                     </a:p>
                   </a:txBody>
@@ -10828,7 +10903,7 @@
                           <a:solidFill>
                             <a:schemeClr val="dk1"/>
                           </a:solidFill>
-                          <a:latin typeface="Adobe Clean" panose="020B0503020404020204" pitchFamily="34" charset="0"/>
+                          <a:latin typeface="Adobe Clean"/>
                           <a:ea typeface="+mn-ea"/>
                           <a:cs typeface="+mn-cs"/>
                           <a:hlinkClick r:id="rId8"/>
@@ -10840,7 +10915,7 @@
                           <a:solidFill>
                             <a:schemeClr val="dk1"/>
                           </a:solidFill>
-                          <a:latin typeface="Adobe Clean" panose="020B0503020404020204" pitchFamily="34" charset="0"/>
+                          <a:latin typeface="Adobe Clean"/>
                           <a:ea typeface="+mn-ea"/>
                           <a:cs typeface="+mn-cs"/>
                         </a:rPr>
@@ -10923,18 +10998,18 @@
                           <a:solidFill>
                             <a:srgbClr val="000000"/>
                           </a:solidFill>
-                          <a:latin typeface="Adobe Clean Light" panose="020B0303020404020204" pitchFamily="34" charset="0"/>
+                          <a:latin typeface="Adobe Clean Light"/>
                           <a:ea typeface="+mn-ea"/>
                           <a:cs typeface="+mn-cs"/>
                         </a:rPr>
-                        <a:t>Adobe Digital Learning Services-Kurse sind über die Experience </a:t>
+                        <a:t>Adobe Digital Learning Services-Kurse sind über die Experience League verfügbar. Das Angebot umfasst sowohl On-Demand- als auch </a:t>
                       </a:r>
                       <a:br>
-                        <a:rPr lang="sk-SK" sz="1000" dirty="0">
+                        <a:rPr lang="de-DE" sz="1000" dirty="0">
                           <a:solidFill>
                             <a:srgbClr val="000000"/>
                           </a:solidFill>
-                          <a:latin typeface="Adobe Clean Light" panose="020B0303020404020204" pitchFamily="34" charset="0"/>
+                          <a:latin typeface="Adobe Clean Light"/>
                           <a:ea typeface="+mn-ea"/>
                           <a:cs typeface="+mn-cs"/>
                         </a:rPr>
@@ -10944,53 +11019,11 @@
                           <a:solidFill>
                             <a:srgbClr val="000000"/>
                           </a:solidFill>
-                          <a:latin typeface="Adobe Clean Light" panose="020B0303020404020204" pitchFamily="34" charset="0"/>
+                          <a:latin typeface="Adobe Clean Light"/>
                           <a:ea typeface="+mn-ea"/>
                           <a:cs typeface="+mn-cs"/>
                         </a:rPr>
-                        <a:t>League verfügbar. Das Angebot umfasst sowohl On-Demand- als auch </a:t>
-                      </a:r>
-                      <a:br>
-                        <a:rPr lang="sk-SK" sz="1000" dirty="0">
-                          <a:solidFill>
-                            <a:srgbClr val="000000"/>
-                          </a:solidFill>
-                          <a:latin typeface="Adobe Clean Light" panose="020B0303020404020204" pitchFamily="34" charset="0"/>
-                          <a:ea typeface="+mn-ea"/>
-                          <a:cs typeface="+mn-cs"/>
-                        </a:rPr>
-                      </a:br>
-                      <a:r>
-                        <a:rPr lang="de-DE" sz="1000" dirty="0">
-                          <a:solidFill>
-                            <a:srgbClr val="000000"/>
-                          </a:solidFill>
-                          <a:latin typeface="Adobe Clean Light" panose="020B0303020404020204" pitchFamily="34" charset="0"/>
-                          <a:ea typeface="+mn-ea"/>
-                          <a:cs typeface="+mn-cs"/>
-                        </a:rPr>
-                        <a:t>von Kursleiter geführte Schulungen.  Hier können Sie Kompetenzen erwerben, die auf dem Markt anerkannt sind und den Erfolg </a:t>
-                      </a:r>
-                      <a:br>
-                        <a:rPr lang="sk-SK" sz="1000" dirty="0">
-                          <a:solidFill>
-                            <a:srgbClr val="000000"/>
-                          </a:solidFill>
-                          <a:latin typeface="Adobe Clean Light" panose="020B0303020404020204" pitchFamily="34" charset="0"/>
-                          <a:ea typeface="+mn-ea"/>
-                          <a:cs typeface="+mn-cs"/>
-                        </a:rPr>
-                      </a:br>
-                      <a:r>
-                        <a:rPr lang="de-DE" sz="1000" dirty="0">
-                          <a:solidFill>
-                            <a:srgbClr val="000000"/>
-                          </a:solidFill>
-                          <a:latin typeface="Adobe Clean Light" panose="020B0303020404020204" pitchFamily="34" charset="0"/>
-                          <a:ea typeface="+mn-ea"/>
-                          <a:cs typeface="+mn-cs"/>
-                        </a:rPr>
-                        <a:t>im Unternehmen vorantreiben.</a:t>
+                        <a:t>von Kursleiter geführte Schulungen.  Hier können Sie Kompetenzen erwerben, die auf dem Markt anerkannt sind und den Erfolg im Unternehmen vorantreiben.</a:t>
                       </a:r>
                     </a:p>
                   </a:txBody>
@@ -11076,7 +11109,7 @@
                           <a:solidFill>
                             <a:schemeClr val="tx1"/>
                           </a:solidFill>
-                          <a:latin typeface="Adobe Clean" panose="020B0503020404020204" pitchFamily="34" charset="0"/>
+                          <a:latin typeface="Adobe Clean"/>
                           <a:ea typeface="+mn-ea"/>
                           <a:cs typeface="+mn-cs"/>
                           <a:hlinkClick r:id="rId9"/>
@@ -11138,7 +11171,7 @@
                     <a:bodyPr/>
                     <a:lstStyle/>
                     <a:p>
-                      <a:pPr marL="0" marR="0" lvl="0" indent="0" defTabSz="914400" eaLnBrk="1" fontAlgn="auto" latinLnBrk="0" hangingPunct="1">
+                      <a:pPr marL="0" marR="0" lvl="0" indent="0" eaLnBrk="1" fontAlgn="auto" latinLnBrk="0" hangingPunct="1">
                         <a:lnSpc>
                           <a:spcPct val="100000"/>
                         </a:lnSpc>
@@ -11152,26 +11185,24 @@
                         <a:buSzTx/>
                         <a:buFontTx/>
                         <a:buNone/>
-                        <a:tabLst/>
-                        <a:defRPr/>
                       </a:pPr>
                       <a:r>
                         <a:rPr lang="de-DE" sz="1000" dirty="0">
                           <a:solidFill>
                             <a:srgbClr val="000000"/>
                           </a:solidFill>
-                          <a:latin typeface="Adobe Clean Light" panose="020B0303020404020204" pitchFamily="34" charset="0"/>
+                          <a:latin typeface="Adobe Clean Light"/>
                           <a:ea typeface="+mn-ea"/>
                           <a:cs typeface="+mn-cs"/>
                         </a:rPr>
-                        <a:t>Status.adobe.com übermittelt die Statusinformationen sämtlicher Adobe-Produkte und -Services, die in Umgebungen mit mehreren Mandanten implementiert sind. Kunden können Voreinstellungen für ihr Abonnement auswählen und E-Mail-Benachrichtigungen erhalten, wenn Adobe ein Produktereignis erstellt, aktualisiert oder löst. </a:t>
+                        <a:t>Status.adobe.com übermittelt die Statusinformationen sämtlicher Adobe-Produkte und -Services, die in Umgebungen mit mehreren Mandanten implementiert sind. Kunden können Voreinstellungen für </a:t>
                       </a:r>
                       <a:br>
-                        <a:rPr lang="sk-SK" sz="1000" dirty="0">
+                        <a:rPr lang="de-DE" sz="1000" dirty="0">
                           <a:solidFill>
                             <a:srgbClr val="000000"/>
                           </a:solidFill>
-                          <a:latin typeface="Adobe Clean Light" panose="020B0303020404020204" pitchFamily="34" charset="0"/>
+                          <a:latin typeface="Adobe Clean Light"/>
                           <a:ea typeface="+mn-ea"/>
                           <a:cs typeface="+mn-cs"/>
                         </a:rPr>
@@ -11181,11 +11212,32 @@
                           <a:solidFill>
                             <a:srgbClr val="000000"/>
                           </a:solidFill>
-                          <a:latin typeface="Adobe Clean Light" panose="020B0303020404020204" pitchFamily="34" charset="0"/>
+                          <a:latin typeface="Adobe Clean Light"/>
                           <a:ea typeface="+mn-ea"/>
                           <a:cs typeface="+mn-cs"/>
                         </a:rPr>
-                        <a:t>Dies kann geplante Wartungen oder Service-Probleme unterschiedlichen Schweregrads umfassen. </a:t>
+                        <a:t>ihr Abonnement auswählen und E-Mail-Benachrichtigungen erhalten, wenn Adobe ein Produktereignis erstellt, aktualisiert oder löst. </a:t>
+                      </a:r>
+                      <a:br>
+                        <a:rPr lang="de-DE" sz="1000" dirty="0">
+                          <a:solidFill>
+                            <a:srgbClr val="000000"/>
+                          </a:solidFill>
+                          <a:latin typeface="Adobe Clean Light"/>
+                          <a:ea typeface="+mn-ea"/>
+                          <a:cs typeface="+mn-cs"/>
+                        </a:rPr>
+                      </a:br>
+                      <a:r>
+                        <a:rPr lang="de-DE" sz="1000" dirty="0">
+                          <a:solidFill>
+                            <a:srgbClr val="000000"/>
+                          </a:solidFill>
+                          <a:latin typeface="Adobe Clean Light"/>
+                          <a:ea typeface="+mn-ea"/>
+                          <a:cs typeface="+mn-cs"/>
+                        </a:rPr>
+                        <a:t>Dies kann geplante Wartungen oder Service-Probleme unterschiedlichen Schweregrads umfassen. </a:t>
                       </a:r>
                     </a:p>
                   </a:txBody>
@@ -11271,7 +11323,7 @@
                           <a:solidFill>
                             <a:schemeClr val="dk1"/>
                           </a:solidFill>
-                          <a:latin typeface="Adobe Clean" panose="020B0503020404020204" pitchFamily="34" charset="0"/>
+                          <a:latin typeface="Adobe Clean"/>
                           <a:ea typeface="+mn-ea"/>
                           <a:cs typeface="+mn-cs"/>
                           <a:hlinkClick r:id="rId10" tooltip="https://helpx.adobe.com/de/support/programs/enterprise-support-programs/premier-support-business.html"/>
@@ -11338,11 +11390,11 @@
                           <a:solidFill>
                             <a:srgbClr val="000000"/>
                           </a:solidFill>
-                          <a:latin typeface="Adobe Clean Light" panose="020B0303020404020204" pitchFamily="34" charset="0"/>
+                          <a:latin typeface="Adobe Clean Light"/>
                           <a:ea typeface="+mn-ea"/>
                           <a:cs typeface="+mn-cs"/>
                         </a:rPr>
-                        <a:t>Website für Adobe Business Support</a:t>
+                        <a:t>Website für Adobe Business Support.</a:t>
                       </a:r>
                     </a:p>
                   </a:txBody>
@@ -11428,7 +11480,7 @@
                           <a:solidFill>
                             <a:schemeClr val="tx1"/>
                           </a:solidFill>
-                          <a:latin typeface="Adobe Clean" panose="020B0503020404020204" pitchFamily="34" charset="0"/>
+                          <a:latin typeface="Adobe Clean"/>
                           <a:ea typeface="+mn-ea"/>
                           <a:cs typeface="+mn-cs"/>
                           <a:hlinkClick r:id="rId11"/>
@@ -11495,18 +11547,18 @@
                           <a:solidFill>
                             <a:srgbClr val="000000"/>
                           </a:solidFill>
-                          <a:latin typeface="Adobe Clean Light" panose="020B0303020404020204" pitchFamily="34" charset="0"/>
+                          <a:latin typeface="Adobe Clean Light"/>
                           <a:ea typeface="+mn-ea"/>
                           <a:cs typeface="+mn-cs"/>
                         </a:rPr>
                         <a:t>Allgemeine Geschäftsbedingungen mit detaillierten Informationen </a:t>
                       </a:r>
                       <a:br>
-                        <a:rPr lang="sk-SK" sz="1000" dirty="0">
+                        <a:rPr lang="de-DE" sz="1000" dirty="0">
                           <a:solidFill>
                             <a:srgbClr val="000000"/>
                           </a:solidFill>
-                          <a:latin typeface="Adobe Clean Light" panose="020B0303020404020204" pitchFamily="34" charset="0"/>
+                          <a:latin typeface="Adobe Clean Light"/>
                           <a:ea typeface="+mn-ea"/>
                           <a:cs typeface="+mn-cs"/>
                         </a:rPr>
@@ -11516,11 +11568,11 @@
                           <a:solidFill>
                             <a:srgbClr val="000000"/>
                           </a:solidFill>
-                          <a:latin typeface="Adobe Clean Light" panose="020B0303020404020204" pitchFamily="34" charset="0"/>
+                          <a:latin typeface="Adobe Clean Light"/>
                           <a:ea typeface="+mn-ea"/>
                           <a:cs typeface="+mn-cs"/>
                         </a:rPr>
-                        <a:t>zu den angebotenen Support-Services</a:t>
+                        <a:t>zu den angebotenen Support-Services.</a:t>
                       </a:r>
                     </a:p>
                   </a:txBody>
@@ -12291,12 +12343,6 @@
 </file>
 
 <file path=customXml/item1.xml><?xml version="1.0" encoding="utf-8"?>
-<p:properties xmlns:p="http://schemas.microsoft.com/office/2006/metadata/properties" xmlns:xsi="http://www.w3.org/2001/XMLSchema-instance" xmlns:pc="http://schemas.microsoft.com/office/infopath/2007/PartnerControls">
-  <documentManagement/>
-</p:properties>
-</file>
-
-<file path=customXml/item2.xml><?xml version="1.0" encoding="utf-8"?>
 <ct:contentTypeSchema xmlns:ct="http://schemas.microsoft.com/office/2006/metadata/contentType" xmlns:ma="http://schemas.microsoft.com/office/2006/metadata/properties/metaAttributes" ct:_="" ma:_="" ma:contentTypeName="Document" ma:contentTypeID="0x010100E783BF6876BCC646A459363AF21A7736" ma:contentTypeVersion="10" ma:contentTypeDescription="Create a new document." ma:contentTypeScope="" ma:versionID="c4ffda7f4f415767600769e454c2ea87">
   <xsd:schema xmlns:xsd="http://www.w3.org/2001/XMLSchema" xmlns:xs="http://www.w3.org/2001/XMLSchema" xmlns:p="http://schemas.microsoft.com/office/2006/metadata/properties" xmlns:ns2="8a053bff-88be-49e4-9a87-e748e18b8b62" xmlns:ns3="6c8368ec-3776-49b5-a5bb-90648cf9530f" targetNamespace="http://schemas.microsoft.com/office/2006/metadata/properties" ma:root="true" ma:fieldsID="df3ec33bccc23e23bce7bc897fad43d1" ns2:_="" ns3:_="">
     <xsd:import namespace="8a053bff-88be-49e4-9a87-e748e18b8b62"/>
@@ -12501,7 +12547,7 @@
 </ct:contentTypeSchema>
 </file>
 
-<file path=customXml/item3.xml><?xml version="1.0" encoding="utf-8"?>
+<file path=customXml/item2.xml><?xml version="1.0" encoding="utf-8"?>
 <?mso-contentType ?>
 <FormTemplates xmlns="http://schemas.microsoft.com/sharepoint/v3/contenttype/forms">
   <Display>DocumentLibraryForm</Display>
@@ -12510,16 +12556,13 @@
 </FormTemplates>
 </file>
 
-<file path=customXml/itemProps1.xml><?xml version="1.0" encoding="utf-8"?>
-<ds:datastoreItem xmlns:ds="http://schemas.openxmlformats.org/officeDocument/2006/customXml" ds:itemID="{10FC3CAF-E6F1-40E3-87D4-6B781C97D6B4}">
-  <ds:schemaRefs>
-    <ds:schemaRef ds:uri="http://schemas.microsoft.com/office/2006/metadata/properties"/>
-    <ds:schemaRef ds:uri="http://schemas.microsoft.com/office/infopath/2007/PartnerControls"/>
-  </ds:schemaRefs>
-</ds:datastoreItem>
+<file path=customXml/item3.xml><?xml version="1.0" encoding="utf-8"?>
+<p:properties xmlns:p="http://schemas.microsoft.com/office/2006/metadata/properties" xmlns:xsi="http://www.w3.org/2001/XMLSchema-instance" xmlns:pc="http://schemas.microsoft.com/office/infopath/2007/PartnerControls">
+  <documentManagement/>
+</p:properties>
 </file>
 
-<file path=customXml/itemProps2.xml><?xml version="1.0" encoding="utf-8"?>
+<file path=customXml/itemProps1.xml><?xml version="1.0" encoding="utf-8"?>
 <ds:datastoreItem xmlns:ds="http://schemas.openxmlformats.org/officeDocument/2006/customXml" ds:itemID="{E0DB8BDF-6DA8-4ABC-A3CA-043AFD674CFC}">
   <ds:schemaRefs>
     <ds:schemaRef ds:uri="6c8368ec-3776-49b5-a5bb-90648cf9530f"/>
@@ -12538,10 +12581,27 @@
 </ds:datastoreItem>
 </file>
 
-<file path=customXml/itemProps3.xml><?xml version="1.0" encoding="utf-8"?>
+<file path=customXml/itemProps2.xml><?xml version="1.0" encoding="utf-8"?>
 <ds:datastoreItem xmlns:ds="http://schemas.openxmlformats.org/officeDocument/2006/customXml" ds:itemID="{95AE3B0B-E909-400C-B0B3-909FB50E07DE}">
   <ds:schemaRefs>
     <ds:schemaRef ds:uri="http://schemas.microsoft.com/sharepoint/v3/contenttype/forms"/>
   </ds:schemaRefs>
 </ds:datastoreItem>
+</file>
+
+<file path=customXml/itemProps3.xml><?xml version="1.0" encoding="utf-8"?>
+<ds:datastoreItem xmlns:ds="http://schemas.openxmlformats.org/officeDocument/2006/customXml" ds:itemID="{10FC3CAF-E6F1-40E3-87D4-6B781C97D6B4}">
+  <ds:schemaRefs>
+    <ds:schemaRef ds:uri="6c8368ec-3776-49b5-a5bb-90648cf9530f"/>
+    <ds:schemaRef ds:uri="8a053bff-88be-49e4-9a87-e748e18b8b62"/>
+    <ds:schemaRef ds:uri="http://purl.org/dc/dcmitype/"/>
+    <ds:schemaRef ds:uri="http://purl.org/dc/elements/1.1/"/>
+    <ds:schemaRef ds:uri="http://purl.org/dc/terms/"/>
+    <ds:schemaRef ds:uri="http://schemas.microsoft.com/office/2006/documentManagement/types"/>
+    <ds:schemaRef ds:uri="http://schemas.microsoft.com/office/2006/metadata/properties"/>
+    <ds:schemaRef ds:uri="http://schemas.microsoft.com/office/infopath/2007/PartnerControls"/>
+    <ds:schemaRef ds:uri="http://schemas.openxmlformats.org/package/2006/metadata/core-properties"/>
+    <ds:schemaRef ds:uri="http://www.w3.org/XML/1998/namespace"/>
+  </ds:schemaRefs>
+</ds:datastoreItem>
 </file>
</xml_diff>